<commit_message>
[TASK] Added diagrams for board actions
</commit_message>
<xml_diff>
--- a/diagrams/game_play.pptx
+++ b/diagrams/game_play.pptx
@@ -6,9 +6,10 @@
   </p:sldMasterIdLst>
   <p:sldIdLst>
     <p:sldId id="256" r:id="rId2"/>
-    <p:sldId id="257" r:id="rId3"/>
-    <p:sldId id="258" r:id="rId4"/>
-    <p:sldId id="259" r:id="rId5"/>
+    <p:sldId id="260" r:id="rId3"/>
+    <p:sldId id="257" r:id="rId4"/>
+    <p:sldId id="258" r:id="rId5"/>
+    <p:sldId id="259" r:id="rId6"/>
   </p:sldIdLst>
   <p:sldSz cx="12192000" cy="6858000"/>
   <p:notesSz cx="6858000" cy="9144000"/>
@@ -107,6 +108,11 @@
       </a:defRPr>
     </a:lvl9pPr>
   </p:defaultTextStyle>
+  <p:extLst>
+    <p:ext uri="{EFAFB233-063F-42B5-8137-9DF3F51BA10A}">
+      <p15:sldGuideLst xmlns:p15="http://schemas.microsoft.com/office/powerpoint/2012/main"/>
+    </p:ext>
+  </p:extLst>
 </p:presentation>
 </file>
 
@@ -257,7 +263,7 @@
           <a:p>
             <a:fld id="{A24774F0-CFF4-432D-81EC-80FC546292F2}" type="datetimeFigureOut">
               <a:rPr lang="en-US" smtClean="0"/>
-              <a:t>03-Dec-18</a:t>
+              <a:t>07-Dec-18</a:t>
             </a:fld>
             <a:endParaRPr lang="en-US"/>
           </a:p>
@@ -455,7 +461,7 @@
           <a:p>
             <a:fld id="{A24774F0-CFF4-432D-81EC-80FC546292F2}" type="datetimeFigureOut">
               <a:rPr lang="en-US" smtClean="0"/>
-              <a:t>03-Dec-18</a:t>
+              <a:t>07-Dec-18</a:t>
             </a:fld>
             <a:endParaRPr lang="en-US"/>
           </a:p>
@@ -663,7 +669,7 @@
           <a:p>
             <a:fld id="{A24774F0-CFF4-432D-81EC-80FC546292F2}" type="datetimeFigureOut">
               <a:rPr lang="en-US" smtClean="0"/>
-              <a:t>03-Dec-18</a:t>
+              <a:t>07-Dec-18</a:t>
             </a:fld>
             <a:endParaRPr lang="en-US"/>
           </a:p>
@@ -861,7 +867,7 @@
           <a:p>
             <a:fld id="{A24774F0-CFF4-432D-81EC-80FC546292F2}" type="datetimeFigureOut">
               <a:rPr lang="en-US" smtClean="0"/>
-              <a:t>03-Dec-18</a:t>
+              <a:t>07-Dec-18</a:t>
             </a:fld>
             <a:endParaRPr lang="en-US"/>
           </a:p>
@@ -1136,7 +1142,7 @@
           <a:p>
             <a:fld id="{A24774F0-CFF4-432D-81EC-80FC546292F2}" type="datetimeFigureOut">
               <a:rPr lang="en-US" smtClean="0"/>
-              <a:t>03-Dec-18</a:t>
+              <a:t>07-Dec-18</a:t>
             </a:fld>
             <a:endParaRPr lang="en-US"/>
           </a:p>
@@ -1401,7 +1407,7 @@
           <a:p>
             <a:fld id="{A24774F0-CFF4-432D-81EC-80FC546292F2}" type="datetimeFigureOut">
               <a:rPr lang="en-US" smtClean="0"/>
-              <a:t>03-Dec-18</a:t>
+              <a:t>07-Dec-18</a:t>
             </a:fld>
             <a:endParaRPr lang="en-US"/>
           </a:p>
@@ -1813,7 +1819,7 @@
           <a:p>
             <a:fld id="{A24774F0-CFF4-432D-81EC-80FC546292F2}" type="datetimeFigureOut">
               <a:rPr lang="en-US" smtClean="0"/>
-              <a:t>03-Dec-18</a:t>
+              <a:t>07-Dec-18</a:t>
             </a:fld>
             <a:endParaRPr lang="en-US"/>
           </a:p>
@@ -1954,7 +1960,7 @@
           <a:p>
             <a:fld id="{A24774F0-CFF4-432D-81EC-80FC546292F2}" type="datetimeFigureOut">
               <a:rPr lang="en-US" smtClean="0"/>
-              <a:t>03-Dec-18</a:t>
+              <a:t>07-Dec-18</a:t>
             </a:fld>
             <a:endParaRPr lang="en-US"/>
           </a:p>
@@ -2067,7 +2073,7 @@
           <a:p>
             <a:fld id="{A24774F0-CFF4-432D-81EC-80FC546292F2}" type="datetimeFigureOut">
               <a:rPr lang="en-US" smtClean="0"/>
-              <a:t>03-Dec-18</a:t>
+              <a:t>07-Dec-18</a:t>
             </a:fld>
             <a:endParaRPr lang="en-US"/>
           </a:p>
@@ -2378,7 +2384,7 @@
           <a:p>
             <a:fld id="{A24774F0-CFF4-432D-81EC-80FC546292F2}" type="datetimeFigureOut">
               <a:rPr lang="en-US" smtClean="0"/>
-              <a:t>03-Dec-18</a:t>
+              <a:t>07-Dec-18</a:t>
             </a:fld>
             <a:endParaRPr lang="en-US"/>
           </a:p>
@@ -2666,7 +2672,7 @@
           <a:p>
             <a:fld id="{A24774F0-CFF4-432D-81EC-80FC546292F2}" type="datetimeFigureOut">
               <a:rPr lang="en-US" smtClean="0"/>
-              <a:t>03-Dec-18</a:t>
+              <a:t>07-Dec-18</a:t>
             </a:fld>
             <a:endParaRPr lang="en-US"/>
           </a:p>
@@ -2907,7 +2913,7 @@
           <a:p>
             <a:fld id="{A24774F0-CFF4-432D-81EC-80FC546292F2}" type="datetimeFigureOut">
               <a:rPr lang="en-US" smtClean="0"/>
-              <a:t>03-Dec-18</a:t>
+              <a:t>07-Dec-18</a:t>
             </a:fld>
             <a:endParaRPr lang="en-US"/>
           </a:p>
@@ -4791,6 +4797,2523 @@
       </p:grpSpPr>
       <p:graphicFrame>
         <p:nvGraphicFramePr>
+          <p:cNvPr id="5" name="Table 4">
+            <a:extLst>
+              <a:ext uri="{FF2B5EF4-FFF2-40B4-BE49-F238E27FC236}">
+                <a16:creationId xmlns:a16="http://schemas.microsoft.com/office/drawing/2014/main" id="{D6D0186D-FC48-4355-B654-F26B3644C651}"/>
+              </a:ext>
+            </a:extLst>
+          </p:cNvPr>
+          <p:cNvGraphicFramePr>
+            <a:graphicFrameLocks noGrp="1"/>
+          </p:cNvGraphicFramePr>
+          <p:nvPr>
+            <p:extLst/>
+          </p:nvPr>
+        </p:nvGraphicFramePr>
+        <p:xfrm>
+          <a:off x="2032000" y="719665"/>
+          <a:ext cx="8128008" cy="3210464"/>
+        </p:xfrm>
+        <a:graphic>
+          <a:graphicData uri="http://schemas.openxmlformats.org/drawingml/2006/table">
+            <a:tbl>
+              <a:tblPr firstRow="1" bandRow="1">
+                <a:tableStyleId>{5940675A-B579-460E-94D1-54222C63F5DA}</a:tableStyleId>
+              </a:tblPr>
+              <a:tblGrid>
+                <a:gridCol w="903112">
+                  <a:extLst>
+                    <a:ext uri="{9D8B030D-6E8A-4147-A177-3AD203B41FA5}">
+                      <a16:colId xmlns:a16="http://schemas.microsoft.com/office/drawing/2014/main" val="663328804"/>
+                    </a:ext>
+                  </a:extLst>
+                </a:gridCol>
+                <a:gridCol w="903112">
+                  <a:extLst>
+                    <a:ext uri="{9D8B030D-6E8A-4147-A177-3AD203B41FA5}">
+                      <a16:colId xmlns:a16="http://schemas.microsoft.com/office/drawing/2014/main" val="3402578565"/>
+                    </a:ext>
+                  </a:extLst>
+                </a:gridCol>
+                <a:gridCol w="903112">
+                  <a:extLst>
+                    <a:ext uri="{9D8B030D-6E8A-4147-A177-3AD203B41FA5}">
+                      <a16:colId xmlns:a16="http://schemas.microsoft.com/office/drawing/2014/main" val="3655898552"/>
+                    </a:ext>
+                  </a:extLst>
+                </a:gridCol>
+                <a:gridCol w="903112">
+                  <a:extLst>
+                    <a:ext uri="{9D8B030D-6E8A-4147-A177-3AD203B41FA5}">
+                      <a16:colId xmlns:a16="http://schemas.microsoft.com/office/drawing/2014/main" val="4139193611"/>
+                    </a:ext>
+                  </a:extLst>
+                </a:gridCol>
+                <a:gridCol w="903112">
+                  <a:extLst>
+                    <a:ext uri="{9D8B030D-6E8A-4147-A177-3AD203B41FA5}">
+                      <a16:colId xmlns:a16="http://schemas.microsoft.com/office/drawing/2014/main" val="2572578159"/>
+                    </a:ext>
+                  </a:extLst>
+                </a:gridCol>
+                <a:gridCol w="903112">
+                  <a:extLst>
+                    <a:ext uri="{9D8B030D-6E8A-4147-A177-3AD203B41FA5}">
+                      <a16:colId xmlns:a16="http://schemas.microsoft.com/office/drawing/2014/main" val="845486880"/>
+                    </a:ext>
+                  </a:extLst>
+                </a:gridCol>
+                <a:gridCol w="903112">
+                  <a:extLst>
+                    <a:ext uri="{9D8B030D-6E8A-4147-A177-3AD203B41FA5}">
+                      <a16:colId xmlns:a16="http://schemas.microsoft.com/office/drawing/2014/main" val="520765485"/>
+                    </a:ext>
+                  </a:extLst>
+                </a:gridCol>
+                <a:gridCol w="903112">
+                  <a:extLst>
+                    <a:ext uri="{9D8B030D-6E8A-4147-A177-3AD203B41FA5}">
+                      <a16:colId xmlns:a16="http://schemas.microsoft.com/office/drawing/2014/main" val="4200181324"/>
+                    </a:ext>
+                  </a:extLst>
+                </a:gridCol>
+                <a:gridCol w="903112">
+                  <a:extLst>
+                    <a:ext uri="{9D8B030D-6E8A-4147-A177-3AD203B41FA5}">
+                      <a16:colId xmlns:a16="http://schemas.microsoft.com/office/drawing/2014/main" val="3663462352"/>
+                    </a:ext>
+                  </a:extLst>
+                </a:gridCol>
+              </a:tblGrid>
+              <a:tr h="802616">
+                <a:tc>
+                  <a:txBody>
+                    <a:bodyPr/>
+                    <a:lstStyle/>
+                    <a:p>
+                      <a:pPr algn="ctr"/>
+                      <a:r>
+                        <a:rPr lang="en-US" sz="3600" dirty="0"/>
+                        <a:t>a</a:t>
+                      </a:r>
+                    </a:p>
+                  </a:txBody>
+                  <a:tcPr>
+                    <a:lnL w="12700" cmpd="sng">
+                      <a:noFill/>
+                    </a:lnL>
+                    <a:lnR w="12700" cap="flat" cmpd="sng" algn="ctr">
+                      <a:solidFill>
+                        <a:schemeClr val="tx1"/>
+                      </a:solidFill>
+                      <a:prstDash val="solid"/>
+                      <a:round/>
+                      <a:headEnd type="none" w="med" len="med"/>
+                      <a:tailEnd type="none" w="med" len="med"/>
+                    </a:lnR>
+                    <a:lnT w="12700" cmpd="sng">
+                      <a:noFill/>
+                    </a:lnT>
+                    <a:lnB w="12700" cmpd="sng">
+                      <a:noFill/>
+                    </a:lnB>
+                    <a:lnTlToBr w="12700" cmpd="sng">
+                      <a:noFill/>
+                      <a:prstDash val="solid"/>
+                    </a:lnTlToBr>
+                    <a:lnBlToTr w="12700" cmpd="sng">
+                      <a:noFill/>
+                      <a:prstDash val="solid"/>
+                    </a:lnBlToTr>
+                  </a:tcPr>
+                </a:tc>
+                <a:tc>
+                  <a:txBody>
+                    <a:bodyPr/>
+                    <a:lstStyle/>
+                    <a:p>
+                      <a:endParaRPr lang="en-US" dirty="0"/>
+                    </a:p>
+                  </a:txBody>
+                  <a:tcPr>
+                    <a:lnL w="12700" cap="flat" cmpd="sng" algn="ctr">
+                      <a:solidFill>
+                        <a:schemeClr val="tx1"/>
+                      </a:solidFill>
+                      <a:prstDash val="solid"/>
+                      <a:round/>
+                      <a:headEnd type="none" w="med" len="med"/>
+                      <a:tailEnd type="none" w="med" len="med"/>
+                    </a:lnL>
+                  </a:tcPr>
+                </a:tc>
+                <a:tc>
+                  <a:txBody>
+                    <a:bodyPr/>
+                    <a:lstStyle/>
+                    <a:p>
+                      <a:endParaRPr lang="en-US" dirty="0"/>
+                    </a:p>
+                  </a:txBody>
+                  <a:tcPr/>
+                </a:tc>
+                <a:tc>
+                  <a:txBody>
+                    <a:bodyPr/>
+                    <a:lstStyle/>
+                    <a:p>
+                      <a:endParaRPr lang="en-US"/>
+                    </a:p>
+                  </a:txBody>
+                  <a:tcPr/>
+                </a:tc>
+                <a:tc>
+                  <a:txBody>
+                    <a:bodyPr/>
+                    <a:lstStyle/>
+                    <a:p>
+                      <a:endParaRPr lang="en-US"/>
+                    </a:p>
+                  </a:txBody>
+                  <a:tcPr>
+                    <a:lnR w="12700" cap="flat" cmpd="sng" algn="ctr">
+                      <a:solidFill>
+                        <a:schemeClr val="tx1"/>
+                      </a:solidFill>
+                      <a:prstDash val="solid"/>
+                      <a:round/>
+                      <a:headEnd type="none" w="med" len="med"/>
+                      <a:tailEnd type="none" w="med" len="med"/>
+                    </a:lnR>
+                  </a:tcPr>
+                </a:tc>
+                <a:tc>
+                  <a:txBody>
+                    <a:bodyPr/>
+                    <a:lstStyle/>
+                    <a:p>
+                      <a:endParaRPr lang="en-US" dirty="0"/>
+                    </a:p>
+                  </a:txBody>
+                  <a:tcPr>
+                    <a:lnL w="12700" cap="flat" cmpd="sng" algn="ctr">
+                      <a:solidFill>
+                        <a:schemeClr val="tx1"/>
+                      </a:solidFill>
+                      <a:prstDash val="solid"/>
+                      <a:round/>
+                      <a:headEnd type="none" w="med" len="med"/>
+                      <a:tailEnd type="none" w="med" len="med"/>
+                    </a:lnL>
+                    <a:lnR w="12700" cap="flat" cmpd="sng" algn="ctr">
+                      <a:noFill/>
+                      <a:prstDash val="solid"/>
+                      <a:round/>
+                      <a:headEnd type="none" w="med" len="med"/>
+                      <a:tailEnd type="none" w="med" len="med"/>
+                    </a:lnR>
+                    <a:lnT w="12700" cmpd="sng">
+                      <a:noFill/>
+                    </a:lnT>
+                    <a:lnB w="12700" cap="flat" cmpd="sng" algn="ctr">
+                      <a:solidFill>
+                        <a:schemeClr val="tx1"/>
+                      </a:solidFill>
+                      <a:prstDash val="solid"/>
+                      <a:round/>
+                      <a:headEnd type="none" w="med" len="med"/>
+                      <a:tailEnd type="none" w="med" len="med"/>
+                    </a:lnB>
+                    <a:lnTlToBr w="12700" cmpd="sng">
+                      <a:noFill/>
+                      <a:prstDash val="solid"/>
+                    </a:lnTlToBr>
+                    <a:lnBlToTr w="12700" cmpd="sng">
+                      <a:noFill/>
+                      <a:prstDash val="solid"/>
+                    </a:lnBlToTr>
+                  </a:tcPr>
+                </a:tc>
+                <a:tc>
+                  <a:txBody>
+                    <a:bodyPr/>
+                    <a:lstStyle/>
+                    <a:p>
+                      <a:endParaRPr lang="en-US" dirty="0"/>
+                    </a:p>
+                  </a:txBody>
+                  <a:tcPr>
+                    <a:lnL w="12700" cap="flat" cmpd="sng" algn="ctr">
+                      <a:noFill/>
+                      <a:prstDash val="solid"/>
+                      <a:round/>
+                      <a:headEnd type="none" w="med" len="med"/>
+                      <a:tailEnd type="none" w="med" len="med"/>
+                    </a:lnL>
+                    <a:lnR w="12700" cap="flat" cmpd="sng" algn="ctr">
+                      <a:solidFill>
+                        <a:schemeClr val="tx1"/>
+                      </a:solidFill>
+                      <a:prstDash val="solid"/>
+                      <a:round/>
+                      <a:headEnd type="none" w="med" len="med"/>
+                      <a:tailEnd type="none" w="med" len="med"/>
+                    </a:lnR>
+                    <a:lnT w="12700" cmpd="sng">
+                      <a:noFill/>
+                    </a:lnT>
+                    <a:lnB w="12700" cap="flat" cmpd="sng" algn="ctr">
+                      <a:solidFill>
+                        <a:schemeClr val="tx1"/>
+                      </a:solidFill>
+                      <a:prstDash val="solid"/>
+                      <a:round/>
+                      <a:headEnd type="none" w="med" len="med"/>
+                      <a:tailEnd type="none" w="med" len="med"/>
+                    </a:lnB>
+                    <a:lnTlToBr w="12700" cmpd="sng">
+                      <a:noFill/>
+                      <a:prstDash val="solid"/>
+                    </a:lnTlToBr>
+                    <a:lnBlToTr w="12700" cmpd="sng">
+                      <a:noFill/>
+                      <a:prstDash val="solid"/>
+                    </a:lnBlToTr>
+                  </a:tcPr>
+                </a:tc>
+                <a:tc>
+                  <a:txBody>
+                    <a:bodyPr/>
+                    <a:lstStyle/>
+                    <a:p>
+                      <a:endParaRPr lang="en-US"/>
+                    </a:p>
+                  </a:txBody>
+                  <a:tcPr>
+                    <a:lnL w="12700" cap="flat" cmpd="sng" algn="ctr">
+                      <a:solidFill>
+                        <a:schemeClr val="tx1"/>
+                      </a:solidFill>
+                      <a:prstDash val="solid"/>
+                      <a:round/>
+                      <a:headEnd type="none" w="med" len="med"/>
+                      <a:tailEnd type="none" w="med" len="med"/>
+                    </a:lnL>
+                  </a:tcPr>
+                </a:tc>
+                <a:tc>
+                  <a:txBody>
+                    <a:bodyPr/>
+                    <a:lstStyle/>
+                    <a:p>
+                      <a:endParaRPr lang="en-US"/>
+                    </a:p>
+                  </a:txBody>
+                  <a:tcPr/>
+                </a:tc>
+                <a:extLst>
+                  <a:ext uri="{0D108BD9-81ED-4DB2-BD59-A6C34878D82A}">
+                    <a16:rowId xmlns:a16="http://schemas.microsoft.com/office/drawing/2014/main" val="903490451"/>
+                  </a:ext>
+                </a:extLst>
+              </a:tr>
+              <a:tr h="802616">
+                <a:tc>
+                  <a:txBody>
+                    <a:bodyPr/>
+                    <a:lstStyle/>
+                    <a:p>
+                      <a:pPr algn="ctr"/>
+                      <a:r>
+                        <a:rPr lang="en-US" sz="3600" dirty="0"/>
+                        <a:t>b</a:t>
+                      </a:r>
+                    </a:p>
+                  </a:txBody>
+                  <a:tcPr>
+                    <a:lnL w="12700" cmpd="sng">
+                      <a:noFill/>
+                    </a:lnL>
+                    <a:lnR w="12700" cap="flat" cmpd="sng" algn="ctr">
+                      <a:solidFill>
+                        <a:schemeClr val="tx1"/>
+                      </a:solidFill>
+                      <a:prstDash val="solid"/>
+                      <a:round/>
+                      <a:headEnd type="none" w="med" len="med"/>
+                      <a:tailEnd type="none" w="med" len="med"/>
+                    </a:lnR>
+                    <a:lnT w="12700" cmpd="sng">
+                      <a:noFill/>
+                    </a:lnT>
+                    <a:lnB w="12700" cmpd="sng">
+                      <a:noFill/>
+                    </a:lnB>
+                    <a:lnTlToBr w="12700" cmpd="sng">
+                      <a:noFill/>
+                      <a:prstDash val="solid"/>
+                    </a:lnTlToBr>
+                    <a:lnBlToTr w="12700" cmpd="sng">
+                      <a:noFill/>
+                      <a:prstDash val="solid"/>
+                    </a:lnBlToTr>
+                  </a:tcPr>
+                </a:tc>
+                <a:tc>
+                  <a:txBody>
+                    <a:bodyPr/>
+                    <a:lstStyle/>
+                    <a:p>
+                      <a:endParaRPr lang="en-US" dirty="0"/>
+                    </a:p>
+                  </a:txBody>
+                  <a:tcPr>
+                    <a:lnL w="12700" cap="flat" cmpd="sng" algn="ctr">
+                      <a:solidFill>
+                        <a:schemeClr val="tx1"/>
+                      </a:solidFill>
+                      <a:prstDash val="solid"/>
+                      <a:round/>
+                      <a:headEnd type="none" w="med" len="med"/>
+                      <a:tailEnd type="none" w="med" len="med"/>
+                    </a:lnL>
+                  </a:tcPr>
+                </a:tc>
+                <a:tc>
+                  <a:txBody>
+                    <a:bodyPr/>
+                    <a:lstStyle/>
+                    <a:p>
+                      <a:endParaRPr lang="en-US" dirty="0"/>
+                    </a:p>
+                  </a:txBody>
+                  <a:tcPr/>
+                </a:tc>
+                <a:tc>
+                  <a:txBody>
+                    <a:bodyPr/>
+                    <a:lstStyle/>
+                    <a:p>
+                      <a:endParaRPr lang="en-US"/>
+                    </a:p>
+                  </a:txBody>
+                  <a:tcPr/>
+                </a:tc>
+                <a:tc>
+                  <a:txBody>
+                    <a:bodyPr/>
+                    <a:lstStyle/>
+                    <a:p>
+                      <a:endParaRPr lang="en-US"/>
+                    </a:p>
+                  </a:txBody>
+                  <a:tcPr/>
+                </a:tc>
+                <a:tc>
+                  <a:txBody>
+                    <a:bodyPr/>
+                    <a:lstStyle/>
+                    <a:p>
+                      <a:endParaRPr lang="en-US"/>
+                    </a:p>
+                  </a:txBody>
+                  <a:tcPr>
+                    <a:lnT w="12700" cap="flat" cmpd="sng" algn="ctr">
+                      <a:solidFill>
+                        <a:schemeClr val="tx1"/>
+                      </a:solidFill>
+                      <a:prstDash val="solid"/>
+                      <a:round/>
+                      <a:headEnd type="none" w="med" len="med"/>
+                      <a:tailEnd type="none" w="med" len="med"/>
+                    </a:lnT>
+                    <a:lnB w="12700" cap="flat" cmpd="sng" algn="ctr">
+                      <a:solidFill>
+                        <a:schemeClr val="tx1"/>
+                      </a:solidFill>
+                      <a:prstDash val="solid"/>
+                      <a:round/>
+                      <a:headEnd type="none" w="med" len="med"/>
+                      <a:tailEnd type="none" w="med" len="med"/>
+                    </a:lnB>
+                  </a:tcPr>
+                </a:tc>
+                <a:tc>
+                  <a:txBody>
+                    <a:bodyPr/>
+                    <a:lstStyle/>
+                    <a:p>
+                      <a:endParaRPr lang="en-US"/>
+                    </a:p>
+                  </a:txBody>
+                  <a:tcPr>
+                    <a:lnT w="12700" cap="flat" cmpd="sng" algn="ctr">
+                      <a:solidFill>
+                        <a:schemeClr val="tx1"/>
+                      </a:solidFill>
+                      <a:prstDash val="solid"/>
+                      <a:round/>
+                      <a:headEnd type="none" w="med" len="med"/>
+                      <a:tailEnd type="none" w="med" len="med"/>
+                    </a:lnT>
+                    <a:lnB w="12700" cap="flat" cmpd="sng" algn="ctr">
+                      <a:solidFill>
+                        <a:schemeClr val="tx1"/>
+                      </a:solidFill>
+                      <a:prstDash val="solid"/>
+                      <a:round/>
+                      <a:headEnd type="none" w="med" len="med"/>
+                      <a:tailEnd type="none" w="med" len="med"/>
+                    </a:lnB>
+                  </a:tcPr>
+                </a:tc>
+                <a:tc>
+                  <a:txBody>
+                    <a:bodyPr/>
+                    <a:lstStyle/>
+                    <a:p>
+                      <a:endParaRPr lang="en-US"/>
+                    </a:p>
+                  </a:txBody>
+                  <a:tcPr/>
+                </a:tc>
+                <a:tc>
+                  <a:txBody>
+                    <a:bodyPr/>
+                    <a:lstStyle/>
+                    <a:p>
+                      <a:endParaRPr lang="en-US"/>
+                    </a:p>
+                  </a:txBody>
+                  <a:tcPr/>
+                </a:tc>
+                <a:extLst>
+                  <a:ext uri="{0D108BD9-81ED-4DB2-BD59-A6C34878D82A}">
+                    <a16:rowId xmlns:a16="http://schemas.microsoft.com/office/drawing/2014/main" val="3633229203"/>
+                  </a:ext>
+                </a:extLst>
+              </a:tr>
+              <a:tr h="802616">
+                <a:tc>
+                  <a:txBody>
+                    <a:bodyPr/>
+                    <a:lstStyle/>
+                    <a:p>
+                      <a:pPr algn="ctr"/>
+                      <a:r>
+                        <a:rPr lang="en-US" sz="3600" dirty="0"/>
+                        <a:t>c</a:t>
+                      </a:r>
+                    </a:p>
+                  </a:txBody>
+                  <a:tcPr>
+                    <a:lnL w="12700" cmpd="sng">
+                      <a:noFill/>
+                    </a:lnL>
+                    <a:lnR w="12700" cap="flat" cmpd="sng" algn="ctr">
+                      <a:solidFill>
+                        <a:schemeClr val="tx1"/>
+                      </a:solidFill>
+                      <a:prstDash val="solid"/>
+                      <a:round/>
+                      <a:headEnd type="none" w="med" len="med"/>
+                      <a:tailEnd type="none" w="med" len="med"/>
+                    </a:lnR>
+                    <a:lnT w="12700" cmpd="sng">
+                      <a:noFill/>
+                    </a:lnT>
+                    <a:lnB w="12700" cmpd="sng">
+                      <a:noFill/>
+                    </a:lnB>
+                    <a:lnTlToBr w="12700" cmpd="sng">
+                      <a:noFill/>
+                      <a:prstDash val="solid"/>
+                    </a:lnTlToBr>
+                    <a:lnBlToTr w="12700" cmpd="sng">
+                      <a:noFill/>
+                      <a:prstDash val="solid"/>
+                    </a:lnBlToTr>
+                  </a:tcPr>
+                </a:tc>
+                <a:tc>
+                  <a:txBody>
+                    <a:bodyPr/>
+                    <a:lstStyle/>
+                    <a:p>
+                      <a:endParaRPr lang="en-US" dirty="0"/>
+                    </a:p>
+                  </a:txBody>
+                  <a:tcPr>
+                    <a:lnL w="12700" cap="flat" cmpd="sng" algn="ctr">
+                      <a:solidFill>
+                        <a:schemeClr val="tx1"/>
+                      </a:solidFill>
+                      <a:prstDash val="solid"/>
+                      <a:round/>
+                      <a:headEnd type="none" w="med" len="med"/>
+                      <a:tailEnd type="none" w="med" len="med"/>
+                    </a:lnL>
+                    <a:lnB w="12700" cap="flat" cmpd="sng" algn="ctr">
+                      <a:solidFill>
+                        <a:schemeClr val="tx1"/>
+                      </a:solidFill>
+                      <a:prstDash val="solid"/>
+                      <a:round/>
+                      <a:headEnd type="none" w="med" len="med"/>
+                      <a:tailEnd type="none" w="med" len="med"/>
+                    </a:lnB>
+                  </a:tcPr>
+                </a:tc>
+                <a:tc>
+                  <a:txBody>
+                    <a:bodyPr/>
+                    <a:lstStyle/>
+                    <a:p>
+                      <a:endParaRPr lang="en-US" dirty="0"/>
+                    </a:p>
+                  </a:txBody>
+                  <a:tcPr>
+                    <a:lnB w="12700" cap="flat" cmpd="sng" algn="ctr">
+                      <a:solidFill>
+                        <a:schemeClr val="tx1"/>
+                      </a:solidFill>
+                      <a:prstDash val="solid"/>
+                      <a:round/>
+                      <a:headEnd type="none" w="med" len="med"/>
+                      <a:tailEnd type="none" w="med" len="med"/>
+                    </a:lnB>
+                  </a:tcPr>
+                </a:tc>
+                <a:tc>
+                  <a:txBody>
+                    <a:bodyPr/>
+                    <a:lstStyle/>
+                    <a:p>
+                      <a:endParaRPr lang="en-US" dirty="0"/>
+                    </a:p>
+                  </a:txBody>
+                  <a:tcPr>
+                    <a:lnB w="12700" cap="flat" cmpd="sng" algn="ctr">
+                      <a:solidFill>
+                        <a:schemeClr val="tx1"/>
+                      </a:solidFill>
+                      <a:prstDash val="solid"/>
+                      <a:round/>
+                      <a:headEnd type="none" w="med" len="med"/>
+                      <a:tailEnd type="none" w="med" len="med"/>
+                    </a:lnB>
+                  </a:tcPr>
+                </a:tc>
+                <a:tc>
+                  <a:txBody>
+                    <a:bodyPr/>
+                    <a:lstStyle/>
+                    <a:p>
+                      <a:endParaRPr lang="en-US" dirty="0"/>
+                    </a:p>
+                  </a:txBody>
+                  <a:tcPr>
+                    <a:lnR w="12700" cap="flat" cmpd="sng" algn="ctr">
+                      <a:solidFill>
+                        <a:schemeClr val="tx1"/>
+                      </a:solidFill>
+                      <a:prstDash val="solid"/>
+                      <a:round/>
+                      <a:headEnd type="none" w="med" len="med"/>
+                      <a:tailEnd type="none" w="med" len="med"/>
+                    </a:lnR>
+                    <a:lnB w="12700" cap="flat" cmpd="sng" algn="ctr">
+                      <a:solidFill>
+                        <a:schemeClr val="tx1"/>
+                      </a:solidFill>
+                      <a:prstDash val="solid"/>
+                      <a:round/>
+                      <a:headEnd type="none" w="med" len="med"/>
+                      <a:tailEnd type="none" w="med" len="med"/>
+                    </a:lnB>
+                  </a:tcPr>
+                </a:tc>
+                <a:tc>
+                  <a:txBody>
+                    <a:bodyPr/>
+                    <a:lstStyle/>
+                    <a:p>
+                      <a:endParaRPr lang="en-US" dirty="0"/>
+                    </a:p>
+                  </a:txBody>
+                  <a:tcPr>
+                    <a:lnL w="12700" cap="flat" cmpd="sng" algn="ctr">
+                      <a:solidFill>
+                        <a:schemeClr val="tx1"/>
+                      </a:solidFill>
+                      <a:prstDash val="solid"/>
+                      <a:round/>
+                      <a:headEnd type="none" w="med" len="med"/>
+                      <a:tailEnd type="none" w="med" len="med"/>
+                    </a:lnL>
+                    <a:lnR w="12700" cmpd="sng">
+                      <a:noFill/>
+                    </a:lnR>
+                    <a:lnT w="12700" cap="flat" cmpd="sng" algn="ctr">
+                      <a:solidFill>
+                        <a:schemeClr val="tx1"/>
+                      </a:solidFill>
+                      <a:prstDash val="solid"/>
+                      <a:round/>
+                      <a:headEnd type="none" w="med" len="med"/>
+                      <a:tailEnd type="none" w="med" len="med"/>
+                    </a:lnT>
+                    <a:lnB w="12700" cap="flat" cmpd="sng" algn="ctr">
+                      <a:noFill/>
+                      <a:prstDash val="solid"/>
+                      <a:round/>
+                      <a:headEnd type="none" w="med" len="med"/>
+                      <a:tailEnd type="none" w="med" len="med"/>
+                    </a:lnB>
+                    <a:lnTlToBr w="12700" cmpd="sng">
+                      <a:noFill/>
+                      <a:prstDash val="solid"/>
+                    </a:lnTlToBr>
+                    <a:lnBlToTr w="12700" cmpd="sng">
+                      <a:noFill/>
+                      <a:prstDash val="solid"/>
+                    </a:lnBlToTr>
+                  </a:tcPr>
+                </a:tc>
+                <a:tc>
+                  <a:txBody>
+                    <a:bodyPr/>
+                    <a:lstStyle/>
+                    <a:p>
+                      <a:endParaRPr lang="en-US" dirty="0"/>
+                    </a:p>
+                  </a:txBody>
+                  <a:tcPr>
+                    <a:lnL w="12700" cmpd="sng">
+                      <a:noFill/>
+                    </a:lnL>
+                    <a:lnR w="12700" cap="flat" cmpd="sng" algn="ctr">
+                      <a:solidFill>
+                        <a:schemeClr val="tx1"/>
+                      </a:solidFill>
+                      <a:prstDash val="solid"/>
+                      <a:round/>
+                      <a:headEnd type="none" w="med" len="med"/>
+                      <a:tailEnd type="none" w="med" len="med"/>
+                    </a:lnR>
+                    <a:lnT w="12700" cap="flat" cmpd="sng" algn="ctr">
+                      <a:solidFill>
+                        <a:schemeClr val="tx1"/>
+                      </a:solidFill>
+                      <a:prstDash val="solid"/>
+                      <a:round/>
+                      <a:headEnd type="none" w="med" len="med"/>
+                      <a:tailEnd type="none" w="med" len="med"/>
+                    </a:lnT>
+                    <a:lnB w="12700" cap="flat" cmpd="sng" algn="ctr">
+                      <a:noFill/>
+                      <a:prstDash val="solid"/>
+                      <a:round/>
+                      <a:headEnd type="none" w="med" len="med"/>
+                      <a:tailEnd type="none" w="med" len="med"/>
+                    </a:lnB>
+                    <a:lnTlToBr w="12700" cmpd="sng">
+                      <a:noFill/>
+                      <a:prstDash val="solid"/>
+                    </a:lnTlToBr>
+                    <a:lnBlToTr w="12700" cmpd="sng">
+                      <a:noFill/>
+                      <a:prstDash val="solid"/>
+                    </a:lnBlToTr>
+                  </a:tcPr>
+                </a:tc>
+                <a:tc>
+                  <a:txBody>
+                    <a:bodyPr/>
+                    <a:lstStyle/>
+                    <a:p>
+                      <a:endParaRPr lang="en-US"/>
+                    </a:p>
+                  </a:txBody>
+                  <a:tcPr>
+                    <a:lnL w="12700" cap="flat" cmpd="sng" algn="ctr">
+                      <a:solidFill>
+                        <a:schemeClr val="tx1"/>
+                      </a:solidFill>
+                      <a:prstDash val="solid"/>
+                      <a:round/>
+                      <a:headEnd type="none" w="med" len="med"/>
+                      <a:tailEnd type="none" w="med" len="med"/>
+                    </a:lnL>
+                    <a:lnB w="12700" cap="flat" cmpd="sng" algn="ctr">
+                      <a:solidFill>
+                        <a:schemeClr val="tx1"/>
+                      </a:solidFill>
+                      <a:prstDash val="solid"/>
+                      <a:round/>
+                      <a:headEnd type="none" w="med" len="med"/>
+                      <a:tailEnd type="none" w="med" len="med"/>
+                    </a:lnB>
+                  </a:tcPr>
+                </a:tc>
+                <a:tc>
+                  <a:txBody>
+                    <a:bodyPr/>
+                    <a:lstStyle/>
+                    <a:p>
+                      <a:endParaRPr lang="en-US" dirty="0"/>
+                    </a:p>
+                  </a:txBody>
+                  <a:tcPr>
+                    <a:lnB w="12700" cap="flat" cmpd="sng" algn="ctr">
+                      <a:solidFill>
+                        <a:schemeClr val="tx1"/>
+                      </a:solidFill>
+                      <a:prstDash val="solid"/>
+                      <a:round/>
+                      <a:headEnd type="none" w="med" len="med"/>
+                      <a:tailEnd type="none" w="med" len="med"/>
+                    </a:lnB>
+                  </a:tcPr>
+                </a:tc>
+                <a:extLst>
+                  <a:ext uri="{0D108BD9-81ED-4DB2-BD59-A6C34878D82A}">
+                    <a16:rowId xmlns:a16="http://schemas.microsoft.com/office/drawing/2014/main" val="1632319378"/>
+                  </a:ext>
+                </a:extLst>
+              </a:tr>
+              <a:tr h="802616">
+                <a:tc>
+                  <a:txBody>
+                    <a:bodyPr/>
+                    <a:lstStyle/>
+                    <a:p>
+                      <a:endParaRPr lang="en-US" dirty="0"/>
+                    </a:p>
+                  </a:txBody>
+                  <a:tcPr>
+                    <a:lnL w="12700" cmpd="sng">
+                      <a:noFill/>
+                    </a:lnL>
+                    <a:lnR w="12700" cap="flat" cmpd="sng" algn="ctr">
+                      <a:noFill/>
+                      <a:prstDash val="solid"/>
+                      <a:round/>
+                      <a:headEnd type="none" w="med" len="med"/>
+                      <a:tailEnd type="none" w="med" len="med"/>
+                    </a:lnR>
+                    <a:lnT w="12700" cmpd="sng">
+                      <a:noFill/>
+                    </a:lnT>
+                    <a:lnB w="12700" cmpd="sng">
+                      <a:noFill/>
+                    </a:lnB>
+                    <a:lnTlToBr w="12700" cmpd="sng">
+                      <a:noFill/>
+                      <a:prstDash val="solid"/>
+                    </a:lnTlToBr>
+                    <a:lnBlToTr w="12700" cmpd="sng">
+                      <a:noFill/>
+                      <a:prstDash val="solid"/>
+                    </a:lnBlToTr>
+                  </a:tcPr>
+                </a:tc>
+                <a:tc>
+                  <a:txBody>
+                    <a:bodyPr/>
+                    <a:lstStyle/>
+                    <a:p>
+                      <a:pPr algn="ctr"/>
+                      <a:r>
+                        <a:rPr lang="en-US" sz="3600" dirty="0"/>
+                        <a:t>1</a:t>
+                      </a:r>
+                    </a:p>
+                  </a:txBody>
+                  <a:tcPr>
+                    <a:lnL w="12700" cap="flat" cmpd="sng" algn="ctr">
+                      <a:noFill/>
+                      <a:prstDash val="solid"/>
+                      <a:round/>
+                      <a:headEnd type="none" w="med" len="med"/>
+                      <a:tailEnd type="none" w="med" len="med"/>
+                    </a:lnL>
+                    <a:lnR w="12700" cmpd="sng">
+                      <a:noFill/>
+                    </a:lnR>
+                    <a:lnT w="12700" cap="flat" cmpd="sng" algn="ctr">
+                      <a:solidFill>
+                        <a:schemeClr val="tx1"/>
+                      </a:solidFill>
+                      <a:prstDash val="solid"/>
+                      <a:round/>
+                      <a:headEnd type="none" w="med" len="med"/>
+                      <a:tailEnd type="none" w="med" len="med"/>
+                    </a:lnT>
+                    <a:lnB w="12700" cmpd="sng">
+                      <a:noFill/>
+                    </a:lnB>
+                    <a:lnTlToBr w="12700" cmpd="sng">
+                      <a:noFill/>
+                      <a:prstDash val="solid"/>
+                    </a:lnTlToBr>
+                    <a:lnBlToTr w="12700" cmpd="sng">
+                      <a:noFill/>
+                      <a:prstDash val="solid"/>
+                    </a:lnBlToTr>
+                  </a:tcPr>
+                </a:tc>
+                <a:tc>
+                  <a:txBody>
+                    <a:bodyPr/>
+                    <a:lstStyle/>
+                    <a:p>
+                      <a:pPr algn="ctr"/>
+                      <a:r>
+                        <a:rPr lang="en-US" sz="3600" dirty="0"/>
+                        <a:t>2</a:t>
+                      </a:r>
+                    </a:p>
+                  </a:txBody>
+                  <a:tcPr>
+                    <a:lnL w="12700" cmpd="sng">
+                      <a:noFill/>
+                    </a:lnL>
+                    <a:lnR w="12700" cmpd="sng">
+                      <a:noFill/>
+                    </a:lnR>
+                    <a:lnT w="12700" cap="flat" cmpd="sng" algn="ctr">
+                      <a:solidFill>
+                        <a:schemeClr val="tx1"/>
+                      </a:solidFill>
+                      <a:prstDash val="solid"/>
+                      <a:round/>
+                      <a:headEnd type="none" w="med" len="med"/>
+                      <a:tailEnd type="none" w="med" len="med"/>
+                    </a:lnT>
+                    <a:lnB w="12700" cmpd="sng">
+                      <a:noFill/>
+                    </a:lnB>
+                    <a:lnTlToBr w="12700" cmpd="sng">
+                      <a:noFill/>
+                      <a:prstDash val="solid"/>
+                    </a:lnTlToBr>
+                    <a:lnBlToTr w="12700" cmpd="sng">
+                      <a:noFill/>
+                      <a:prstDash val="solid"/>
+                    </a:lnBlToTr>
+                  </a:tcPr>
+                </a:tc>
+                <a:tc>
+                  <a:txBody>
+                    <a:bodyPr/>
+                    <a:lstStyle/>
+                    <a:p>
+                      <a:pPr algn="ctr"/>
+                      <a:r>
+                        <a:rPr lang="en-US" sz="3600" dirty="0"/>
+                        <a:t>3</a:t>
+                      </a:r>
+                    </a:p>
+                  </a:txBody>
+                  <a:tcPr>
+                    <a:lnL w="12700" cmpd="sng">
+                      <a:noFill/>
+                    </a:lnL>
+                    <a:lnR w="12700" cmpd="sng">
+                      <a:noFill/>
+                    </a:lnR>
+                    <a:lnT w="12700" cap="flat" cmpd="sng" algn="ctr">
+                      <a:solidFill>
+                        <a:schemeClr val="tx1"/>
+                      </a:solidFill>
+                      <a:prstDash val="solid"/>
+                      <a:round/>
+                      <a:headEnd type="none" w="med" len="med"/>
+                      <a:tailEnd type="none" w="med" len="med"/>
+                    </a:lnT>
+                    <a:lnB w="12700" cmpd="sng">
+                      <a:noFill/>
+                    </a:lnB>
+                    <a:lnTlToBr w="12700" cmpd="sng">
+                      <a:noFill/>
+                      <a:prstDash val="solid"/>
+                    </a:lnTlToBr>
+                    <a:lnBlToTr w="12700" cmpd="sng">
+                      <a:noFill/>
+                      <a:prstDash val="solid"/>
+                    </a:lnBlToTr>
+                  </a:tcPr>
+                </a:tc>
+                <a:tc>
+                  <a:txBody>
+                    <a:bodyPr/>
+                    <a:lstStyle/>
+                    <a:p>
+                      <a:pPr algn="ctr"/>
+                      <a:r>
+                        <a:rPr lang="en-US" sz="3600" dirty="0"/>
+                        <a:t>4</a:t>
+                      </a:r>
+                    </a:p>
+                  </a:txBody>
+                  <a:tcPr>
+                    <a:lnL w="12700" cmpd="sng">
+                      <a:noFill/>
+                    </a:lnL>
+                    <a:lnR w="12700" cap="flat" cmpd="sng" algn="ctr">
+                      <a:noFill/>
+                      <a:prstDash val="solid"/>
+                      <a:round/>
+                      <a:headEnd type="none" w="med" len="med"/>
+                      <a:tailEnd type="none" w="med" len="med"/>
+                    </a:lnR>
+                    <a:lnT w="12700" cap="flat" cmpd="sng" algn="ctr">
+                      <a:solidFill>
+                        <a:schemeClr val="tx1"/>
+                      </a:solidFill>
+                      <a:prstDash val="solid"/>
+                      <a:round/>
+                      <a:headEnd type="none" w="med" len="med"/>
+                      <a:tailEnd type="none" w="med" len="med"/>
+                    </a:lnT>
+                    <a:lnB w="12700" cmpd="sng">
+                      <a:noFill/>
+                    </a:lnB>
+                    <a:lnTlToBr w="12700" cmpd="sng">
+                      <a:noFill/>
+                      <a:prstDash val="solid"/>
+                    </a:lnTlToBr>
+                    <a:lnBlToTr w="12700" cmpd="sng">
+                      <a:noFill/>
+                      <a:prstDash val="solid"/>
+                    </a:lnBlToTr>
+                  </a:tcPr>
+                </a:tc>
+                <a:tc>
+                  <a:txBody>
+                    <a:bodyPr/>
+                    <a:lstStyle/>
+                    <a:p>
+                      <a:pPr algn="ctr"/>
+                      <a:r>
+                        <a:rPr lang="en-US" sz="3600" dirty="0"/>
+                        <a:t>5</a:t>
+                      </a:r>
+                    </a:p>
+                  </a:txBody>
+                  <a:tcPr>
+                    <a:lnL w="12700" cap="flat" cmpd="sng" algn="ctr">
+                      <a:noFill/>
+                      <a:prstDash val="solid"/>
+                      <a:round/>
+                      <a:headEnd type="none" w="med" len="med"/>
+                      <a:tailEnd type="none" w="med" len="med"/>
+                    </a:lnL>
+                    <a:lnR w="12700" cmpd="sng">
+                      <a:noFill/>
+                    </a:lnR>
+                    <a:lnT w="12700" cap="flat" cmpd="sng" algn="ctr">
+                      <a:noFill/>
+                      <a:prstDash val="solid"/>
+                      <a:round/>
+                      <a:headEnd type="none" w="med" len="med"/>
+                      <a:tailEnd type="none" w="med" len="med"/>
+                    </a:lnT>
+                    <a:lnB w="12700" cap="flat" cmpd="sng" algn="ctr">
+                      <a:noFill/>
+                      <a:prstDash val="solid"/>
+                      <a:round/>
+                      <a:headEnd type="none" w="med" len="med"/>
+                      <a:tailEnd type="none" w="med" len="med"/>
+                    </a:lnB>
+                    <a:lnTlToBr w="12700" cmpd="sng">
+                      <a:noFill/>
+                      <a:prstDash val="solid"/>
+                    </a:lnTlToBr>
+                    <a:lnBlToTr w="12700" cmpd="sng">
+                      <a:noFill/>
+                      <a:prstDash val="solid"/>
+                    </a:lnBlToTr>
+                  </a:tcPr>
+                </a:tc>
+                <a:tc>
+                  <a:txBody>
+                    <a:bodyPr/>
+                    <a:lstStyle/>
+                    <a:p>
+                      <a:pPr algn="ctr"/>
+                      <a:r>
+                        <a:rPr lang="en-US" sz="3600" dirty="0"/>
+                        <a:t>6</a:t>
+                      </a:r>
+                    </a:p>
+                  </a:txBody>
+                  <a:tcPr>
+                    <a:lnL w="12700" cmpd="sng">
+                      <a:noFill/>
+                    </a:lnL>
+                    <a:lnR w="12700" cap="flat" cmpd="sng" algn="ctr">
+                      <a:noFill/>
+                      <a:prstDash val="solid"/>
+                      <a:round/>
+                      <a:headEnd type="none" w="med" len="med"/>
+                      <a:tailEnd type="none" w="med" len="med"/>
+                    </a:lnR>
+                    <a:lnT w="12700" cap="flat" cmpd="sng" algn="ctr">
+                      <a:noFill/>
+                      <a:prstDash val="solid"/>
+                      <a:round/>
+                      <a:headEnd type="none" w="med" len="med"/>
+                      <a:tailEnd type="none" w="med" len="med"/>
+                    </a:lnT>
+                    <a:lnB w="12700" cap="flat" cmpd="sng" algn="ctr">
+                      <a:noFill/>
+                      <a:prstDash val="solid"/>
+                      <a:round/>
+                      <a:headEnd type="none" w="med" len="med"/>
+                      <a:tailEnd type="none" w="med" len="med"/>
+                    </a:lnB>
+                    <a:lnTlToBr w="12700" cmpd="sng">
+                      <a:noFill/>
+                      <a:prstDash val="solid"/>
+                    </a:lnTlToBr>
+                    <a:lnBlToTr w="12700" cmpd="sng">
+                      <a:noFill/>
+                      <a:prstDash val="solid"/>
+                    </a:lnBlToTr>
+                  </a:tcPr>
+                </a:tc>
+                <a:tc>
+                  <a:txBody>
+                    <a:bodyPr/>
+                    <a:lstStyle/>
+                    <a:p>
+                      <a:pPr algn="ctr"/>
+                      <a:r>
+                        <a:rPr lang="en-US" sz="3600" dirty="0"/>
+                        <a:t>7</a:t>
+                      </a:r>
+                    </a:p>
+                  </a:txBody>
+                  <a:tcPr>
+                    <a:lnL w="12700" cap="flat" cmpd="sng" algn="ctr">
+                      <a:noFill/>
+                      <a:prstDash val="solid"/>
+                      <a:round/>
+                      <a:headEnd type="none" w="med" len="med"/>
+                      <a:tailEnd type="none" w="med" len="med"/>
+                    </a:lnL>
+                    <a:lnR w="12700" cmpd="sng">
+                      <a:noFill/>
+                    </a:lnR>
+                    <a:lnT w="12700" cap="flat" cmpd="sng" algn="ctr">
+                      <a:solidFill>
+                        <a:schemeClr val="tx1"/>
+                      </a:solidFill>
+                      <a:prstDash val="solid"/>
+                      <a:round/>
+                      <a:headEnd type="none" w="med" len="med"/>
+                      <a:tailEnd type="none" w="med" len="med"/>
+                    </a:lnT>
+                    <a:lnB w="12700" cmpd="sng">
+                      <a:noFill/>
+                    </a:lnB>
+                    <a:lnTlToBr w="12700" cmpd="sng">
+                      <a:noFill/>
+                      <a:prstDash val="solid"/>
+                    </a:lnTlToBr>
+                    <a:lnBlToTr w="12700" cmpd="sng">
+                      <a:noFill/>
+                      <a:prstDash val="solid"/>
+                    </a:lnBlToTr>
+                  </a:tcPr>
+                </a:tc>
+                <a:tc>
+                  <a:txBody>
+                    <a:bodyPr/>
+                    <a:lstStyle/>
+                    <a:p>
+                      <a:pPr algn="ctr"/>
+                      <a:r>
+                        <a:rPr lang="en-US" sz="3600" dirty="0"/>
+                        <a:t>8</a:t>
+                      </a:r>
+                    </a:p>
+                  </a:txBody>
+                  <a:tcPr>
+                    <a:lnL w="12700" cmpd="sng">
+                      <a:noFill/>
+                    </a:lnL>
+                    <a:lnR w="12700" cmpd="sng">
+                      <a:noFill/>
+                    </a:lnR>
+                    <a:lnT w="12700" cap="flat" cmpd="sng" algn="ctr">
+                      <a:solidFill>
+                        <a:schemeClr val="tx1"/>
+                      </a:solidFill>
+                      <a:prstDash val="solid"/>
+                      <a:round/>
+                      <a:headEnd type="none" w="med" len="med"/>
+                      <a:tailEnd type="none" w="med" len="med"/>
+                    </a:lnT>
+                    <a:lnB w="12700" cmpd="sng">
+                      <a:noFill/>
+                    </a:lnB>
+                    <a:lnTlToBr w="12700" cmpd="sng">
+                      <a:noFill/>
+                      <a:prstDash val="solid"/>
+                    </a:lnTlToBr>
+                    <a:lnBlToTr w="12700" cmpd="sng">
+                      <a:noFill/>
+                      <a:prstDash val="solid"/>
+                    </a:lnBlToTr>
+                  </a:tcPr>
+                </a:tc>
+                <a:extLst>
+                  <a:ext uri="{0D108BD9-81ED-4DB2-BD59-A6C34878D82A}">
+                    <a16:rowId xmlns:a16="http://schemas.microsoft.com/office/drawing/2014/main" val="461059762"/>
+                  </a:ext>
+                </a:extLst>
+              </a:tr>
+            </a:tbl>
+          </a:graphicData>
+        </a:graphic>
+      </p:graphicFrame>
+      <p:sp>
+        <p:nvSpPr>
+          <p:cNvPr id="6" name="Star: 5 Points 5">
+            <a:extLst>
+              <a:ext uri="{FF2B5EF4-FFF2-40B4-BE49-F238E27FC236}">
+                <a16:creationId xmlns:a16="http://schemas.microsoft.com/office/drawing/2014/main" id="{3E1F51B6-3B4C-4A73-9098-785F3A6D45B4}"/>
+              </a:ext>
+            </a:extLst>
+          </p:cNvPr>
+          <p:cNvSpPr/>
+          <p:nvPr/>
+        </p:nvSpPr>
+        <p:spPr>
+          <a:xfrm>
+            <a:off x="5837582" y="1669774"/>
+            <a:ext cx="516835" cy="437322"/>
+          </a:xfrm>
+          <a:prstGeom prst="star5">
+            <a:avLst/>
+          </a:prstGeom>
+          <a:solidFill>
+            <a:schemeClr val="tx1"/>
+          </a:solidFill>
+        </p:spPr>
+        <p:style>
+          <a:lnRef idx="2">
+            <a:schemeClr val="accent1">
+              <a:shade val="50000"/>
+            </a:schemeClr>
+          </a:lnRef>
+          <a:fillRef idx="1">
+            <a:schemeClr val="accent1"/>
+          </a:fillRef>
+          <a:effectRef idx="0">
+            <a:schemeClr val="accent1"/>
+          </a:effectRef>
+          <a:fontRef idx="minor">
+            <a:schemeClr val="lt1"/>
+          </a:fontRef>
+        </p:style>
+        <p:txBody>
+          <a:bodyPr rtlCol="0" anchor="ctr"/>
+          <a:lstStyle/>
+          <a:p>
+            <a:pPr algn="ctr"/>
+            <a:endParaRPr lang="en-US"/>
+          </a:p>
+        </p:txBody>
+      </p:sp>
+      <p:sp>
+        <p:nvSpPr>
+          <p:cNvPr id="7" name="Star: 5 Points 6">
+            <a:extLst>
+              <a:ext uri="{FF2B5EF4-FFF2-40B4-BE49-F238E27FC236}">
+                <a16:creationId xmlns:a16="http://schemas.microsoft.com/office/drawing/2014/main" id="{3F26B050-491B-457D-A2A8-C0A57956E169}"/>
+              </a:ext>
+            </a:extLst>
+          </p:cNvPr>
+          <p:cNvSpPr/>
+          <p:nvPr/>
+        </p:nvSpPr>
+        <p:spPr>
+          <a:xfrm>
+            <a:off x="3094382" y="921026"/>
+            <a:ext cx="516835" cy="437322"/>
+          </a:xfrm>
+          <a:prstGeom prst="star5">
+            <a:avLst/>
+          </a:prstGeom>
+          <a:solidFill>
+            <a:schemeClr val="tx1"/>
+          </a:solidFill>
+        </p:spPr>
+        <p:style>
+          <a:lnRef idx="2">
+            <a:schemeClr val="accent1">
+              <a:shade val="50000"/>
+            </a:schemeClr>
+          </a:lnRef>
+          <a:fillRef idx="1">
+            <a:schemeClr val="accent1"/>
+          </a:fillRef>
+          <a:effectRef idx="0">
+            <a:schemeClr val="accent1"/>
+          </a:effectRef>
+          <a:fontRef idx="minor">
+            <a:schemeClr val="lt1"/>
+          </a:fontRef>
+        </p:style>
+        <p:txBody>
+          <a:bodyPr rtlCol="0" anchor="ctr"/>
+          <a:lstStyle/>
+          <a:p>
+            <a:pPr algn="ctr"/>
+            <a:endParaRPr lang="en-US"/>
+          </a:p>
+        </p:txBody>
+      </p:sp>
+      <p:sp>
+        <p:nvSpPr>
+          <p:cNvPr id="8" name="Star: 5 Points 7">
+            <a:extLst>
+              <a:ext uri="{FF2B5EF4-FFF2-40B4-BE49-F238E27FC236}">
+                <a16:creationId xmlns:a16="http://schemas.microsoft.com/office/drawing/2014/main" id="{370BE5D4-8542-4FBC-83BA-DF9093092A63}"/>
+              </a:ext>
+            </a:extLst>
+          </p:cNvPr>
+          <p:cNvSpPr/>
+          <p:nvPr/>
+        </p:nvSpPr>
+        <p:spPr>
+          <a:xfrm>
+            <a:off x="3094383" y="2491409"/>
+            <a:ext cx="516835" cy="437322"/>
+          </a:xfrm>
+          <a:prstGeom prst="star5">
+            <a:avLst/>
+          </a:prstGeom>
+          <a:solidFill>
+            <a:schemeClr val="tx1"/>
+          </a:solidFill>
+        </p:spPr>
+        <p:style>
+          <a:lnRef idx="2">
+            <a:schemeClr val="accent1">
+              <a:shade val="50000"/>
+            </a:schemeClr>
+          </a:lnRef>
+          <a:fillRef idx="1">
+            <a:schemeClr val="accent1"/>
+          </a:fillRef>
+          <a:effectRef idx="0">
+            <a:schemeClr val="accent1"/>
+          </a:effectRef>
+          <a:fontRef idx="minor">
+            <a:schemeClr val="lt1"/>
+          </a:fontRef>
+        </p:style>
+        <p:txBody>
+          <a:bodyPr rtlCol="0" anchor="ctr"/>
+          <a:lstStyle/>
+          <a:p>
+            <a:pPr algn="ctr"/>
+            <a:endParaRPr lang="en-US"/>
+          </a:p>
+        </p:txBody>
+      </p:sp>
+      <p:sp>
+        <p:nvSpPr>
+          <p:cNvPr id="9" name="Star: 5 Points 8">
+            <a:extLst>
+              <a:ext uri="{FF2B5EF4-FFF2-40B4-BE49-F238E27FC236}">
+                <a16:creationId xmlns:a16="http://schemas.microsoft.com/office/drawing/2014/main" id="{89C293A4-7F1E-43FA-B459-ADFBB1669E98}"/>
+              </a:ext>
+            </a:extLst>
+          </p:cNvPr>
+          <p:cNvSpPr/>
+          <p:nvPr/>
+        </p:nvSpPr>
+        <p:spPr>
+          <a:xfrm>
+            <a:off x="8534401" y="921026"/>
+            <a:ext cx="516835" cy="437322"/>
+          </a:xfrm>
+          <a:prstGeom prst="star5">
+            <a:avLst/>
+          </a:prstGeom>
+          <a:solidFill>
+            <a:schemeClr val="tx1"/>
+          </a:solidFill>
+        </p:spPr>
+        <p:style>
+          <a:lnRef idx="2">
+            <a:schemeClr val="accent1">
+              <a:shade val="50000"/>
+            </a:schemeClr>
+          </a:lnRef>
+          <a:fillRef idx="1">
+            <a:schemeClr val="accent1"/>
+          </a:fillRef>
+          <a:effectRef idx="0">
+            <a:schemeClr val="accent1"/>
+          </a:effectRef>
+          <a:fontRef idx="minor">
+            <a:schemeClr val="lt1"/>
+          </a:fontRef>
+        </p:style>
+        <p:txBody>
+          <a:bodyPr rtlCol="0" anchor="ctr"/>
+          <a:lstStyle/>
+          <a:p>
+            <a:pPr algn="ctr"/>
+            <a:endParaRPr lang="en-US"/>
+          </a:p>
+        </p:txBody>
+      </p:sp>
+      <p:sp>
+        <p:nvSpPr>
+          <p:cNvPr id="10" name="Star: 5 Points 9">
+            <a:extLst>
+              <a:ext uri="{FF2B5EF4-FFF2-40B4-BE49-F238E27FC236}">
+                <a16:creationId xmlns:a16="http://schemas.microsoft.com/office/drawing/2014/main" id="{C9DB6C8F-C031-4CB0-9D00-915D5E1F51DA}"/>
+              </a:ext>
+            </a:extLst>
+          </p:cNvPr>
+          <p:cNvSpPr/>
+          <p:nvPr/>
+        </p:nvSpPr>
+        <p:spPr>
+          <a:xfrm>
+            <a:off x="8534402" y="2471531"/>
+            <a:ext cx="516835" cy="437322"/>
+          </a:xfrm>
+          <a:prstGeom prst="star5">
+            <a:avLst/>
+          </a:prstGeom>
+          <a:solidFill>
+            <a:schemeClr val="tx1"/>
+          </a:solidFill>
+        </p:spPr>
+        <p:style>
+          <a:lnRef idx="2">
+            <a:schemeClr val="accent1">
+              <a:shade val="50000"/>
+            </a:schemeClr>
+          </a:lnRef>
+          <a:fillRef idx="1">
+            <a:schemeClr val="accent1"/>
+          </a:fillRef>
+          <a:effectRef idx="0">
+            <a:schemeClr val="accent1"/>
+          </a:effectRef>
+          <a:fontRef idx="minor">
+            <a:schemeClr val="lt1"/>
+          </a:fontRef>
+        </p:style>
+        <p:txBody>
+          <a:bodyPr rtlCol="0" anchor="ctr"/>
+          <a:lstStyle/>
+          <a:p>
+            <a:pPr algn="ctr"/>
+            <a:endParaRPr lang="en-US"/>
+          </a:p>
+        </p:txBody>
+      </p:sp>
+      <p:sp>
+        <p:nvSpPr>
+          <p:cNvPr id="2" name="TextBox 1">
+            <a:extLst>
+              <a:ext uri="{FF2B5EF4-FFF2-40B4-BE49-F238E27FC236}">
+                <a16:creationId xmlns:a16="http://schemas.microsoft.com/office/drawing/2014/main" id="{407C7B18-ABCA-4FE1-88D9-D6DD834D46DB}"/>
+              </a:ext>
+            </a:extLst>
+          </p:cNvPr>
+          <p:cNvSpPr txBox="1"/>
+          <p:nvPr/>
+        </p:nvSpPr>
+        <p:spPr>
+          <a:xfrm>
+            <a:off x="3933689" y="2454597"/>
+            <a:ext cx="682486" cy="646331"/>
+          </a:xfrm>
+          <a:prstGeom prst="rect">
+            <a:avLst/>
+          </a:prstGeom>
+          <a:noFill/>
+        </p:spPr>
+        <p:txBody>
+          <a:bodyPr wrap="square" rtlCol="0">
+            <a:spAutoFit/>
+          </a:bodyPr>
+          <a:lstStyle/>
+          <a:p>
+            <a:r>
+              <a:rPr lang="en-IN" sz="3600" b="1" dirty="0">
+                <a:solidFill>
+                  <a:srgbClr val="FF0000"/>
+                </a:solidFill>
+              </a:rPr>
+              <a:t>18</a:t>
+            </a:r>
+            <a:endParaRPr lang="en-US" sz="3600" b="1" dirty="0">
+              <a:solidFill>
+                <a:srgbClr val="FF0000"/>
+              </a:solidFill>
+            </a:endParaRPr>
+          </a:p>
+        </p:txBody>
+      </p:sp>
+      <p:sp>
+        <p:nvSpPr>
+          <p:cNvPr id="11" name="TextBox 10">
+            <a:extLst>
+              <a:ext uri="{FF2B5EF4-FFF2-40B4-BE49-F238E27FC236}">
+                <a16:creationId xmlns:a16="http://schemas.microsoft.com/office/drawing/2014/main" id="{2DEADA16-0000-410F-B554-487C9633E39A}"/>
+              </a:ext>
+            </a:extLst>
+          </p:cNvPr>
+          <p:cNvSpPr txBox="1"/>
+          <p:nvPr/>
+        </p:nvSpPr>
+        <p:spPr>
+          <a:xfrm>
+            <a:off x="4156764" y="810549"/>
+            <a:ext cx="516835" cy="646331"/>
+          </a:xfrm>
+          <a:prstGeom prst="rect">
+            <a:avLst/>
+          </a:prstGeom>
+          <a:noFill/>
+        </p:spPr>
+        <p:txBody>
+          <a:bodyPr wrap="square" rtlCol="0">
+            <a:spAutoFit/>
+          </a:bodyPr>
+          <a:lstStyle/>
+          <a:p>
+            <a:r>
+              <a:rPr lang="en-IN" sz="3600" b="1" dirty="0">
+                <a:solidFill>
+                  <a:srgbClr val="FF0000"/>
+                </a:solidFill>
+              </a:rPr>
+              <a:t>2</a:t>
+            </a:r>
+            <a:endParaRPr lang="en-US" sz="3600" b="1" dirty="0">
+              <a:solidFill>
+                <a:srgbClr val="FF0000"/>
+              </a:solidFill>
+            </a:endParaRPr>
+          </a:p>
+        </p:txBody>
+      </p:sp>
+      <p:sp>
+        <p:nvSpPr>
+          <p:cNvPr id="12" name="TextBox 11">
+            <a:extLst>
+              <a:ext uri="{FF2B5EF4-FFF2-40B4-BE49-F238E27FC236}">
+                <a16:creationId xmlns:a16="http://schemas.microsoft.com/office/drawing/2014/main" id="{6B309EC7-170E-4A52-9D60-A554D1536E51}"/>
+              </a:ext>
+            </a:extLst>
+          </p:cNvPr>
+          <p:cNvSpPr txBox="1"/>
+          <p:nvPr/>
+        </p:nvSpPr>
+        <p:spPr>
+          <a:xfrm>
+            <a:off x="4969567" y="810548"/>
+            <a:ext cx="516835" cy="646331"/>
+          </a:xfrm>
+          <a:prstGeom prst="rect">
+            <a:avLst/>
+          </a:prstGeom>
+          <a:noFill/>
+        </p:spPr>
+        <p:txBody>
+          <a:bodyPr wrap="square" rtlCol="0">
+            <a:spAutoFit/>
+          </a:bodyPr>
+          <a:lstStyle/>
+          <a:p>
+            <a:r>
+              <a:rPr lang="en-IN" sz="3600" b="1" dirty="0">
+                <a:solidFill>
+                  <a:srgbClr val="FF0000"/>
+                </a:solidFill>
+              </a:rPr>
+              <a:t>3</a:t>
+            </a:r>
+            <a:endParaRPr lang="en-US" sz="3600" b="1" dirty="0">
+              <a:solidFill>
+                <a:srgbClr val="FF0000"/>
+              </a:solidFill>
+            </a:endParaRPr>
+          </a:p>
+        </p:txBody>
+      </p:sp>
+      <p:sp>
+        <p:nvSpPr>
+          <p:cNvPr id="13" name="TextBox 12">
+            <a:extLst>
+              <a:ext uri="{FF2B5EF4-FFF2-40B4-BE49-F238E27FC236}">
+                <a16:creationId xmlns:a16="http://schemas.microsoft.com/office/drawing/2014/main" id="{04862ACE-A698-4805-A287-35BC4A711860}"/>
+              </a:ext>
+            </a:extLst>
+          </p:cNvPr>
+          <p:cNvSpPr txBox="1"/>
+          <p:nvPr/>
+        </p:nvSpPr>
+        <p:spPr>
+          <a:xfrm>
+            <a:off x="5857461" y="810547"/>
+            <a:ext cx="516835" cy="646331"/>
+          </a:xfrm>
+          <a:prstGeom prst="rect">
+            <a:avLst/>
+          </a:prstGeom>
+          <a:noFill/>
+        </p:spPr>
+        <p:txBody>
+          <a:bodyPr wrap="square" rtlCol="0">
+            <a:spAutoFit/>
+          </a:bodyPr>
+          <a:lstStyle/>
+          <a:p>
+            <a:r>
+              <a:rPr lang="en-IN" sz="3600" b="1" dirty="0">
+                <a:solidFill>
+                  <a:srgbClr val="FF0000"/>
+                </a:solidFill>
+              </a:rPr>
+              <a:t>4</a:t>
+            </a:r>
+            <a:endParaRPr lang="en-US" sz="3600" b="1" dirty="0">
+              <a:solidFill>
+                <a:srgbClr val="FF0000"/>
+              </a:solidFill>
+            </a:endParaRPr>
+          </a:p>
+        </p:txBody>
+      </p:sp>
+      <p:sp>
+        <p:nvSpPr>
+          <p:cNvPr id="14" name="TextBox 13">
+            <a:extLst>
+              <a:ext uri="{FF2B5EF4-FFF2-40B4-BE49-F238E27FC236}">
+                <a16:creationId xmlns:a16="http://schemas.microsoft.com/office/drawing/2014/main" id="{5DBF1F9A-89EB-4B7F-BF94-2779B43F22FD}"/>
+              </a:ext>
+            </a:extLst>
+          </p:cNvPr>
+          <p:cNvSpPr txBox="1"/>
+          <p:nvPr/>
+        </p:nvSpPr>
+        <p:spPr>
+          <a:xfrm>
+            <a:off x="6833704" y="810546"/>
+            <a:ext cx="516835" cy="646331"/>
+          </a:xfrm>
+          <a:prstGeom prst="rect">
+            <a:avLst/>
+          </a:prstGeom>
+          <a:noFill/>
+        </p:spPr>
+        <p:txBody>
+          <a:bodyPr wrap="square" rtlCol="0">
+            <a:spAutoFit/>
+          </a:bodyPr>
+          <a:lstStyle/>
+          <a:p>
+            <a:r>
+              <a:rPr lang="en-IN" sz="3600" b="1" dirty="0">
+                <a:solidFill>
+                  <a:srgbClr val="FF0000"/>
+                </a:solidFill>
+              </a:rPr>
+              <a:t>5</a:t>
+            </a:r>
+            <a:endParaRPr lang="en-US" sz="3600" b="1" dirty="0">
+              <a:solidFill>
+                <a:srgbClr val="FF0000"/>
+              </a:solidFill>
+            </a:endParaRPr>
+          </a:p>
+        </p:txBody>
+      </p:sp>
+      <p:sp>
+        <p:nvSpPr>
+          <p:cNvPr id="15" name="TextBox 14">
+            <a:extLst>
+              <a:ext uri="{FF2B5EF4-FFF2-40B4-BE49-F238E27FC236}">
+                <a16:creationId xmlns:a16="http://schemas.microsoft.com/office/drawing/2014/main" id="{218BAC82-EB96-4F54-AB2C-E669D1670D3E}"/>
+              </a:ext>
+            </a:extLst>
+          </p:cNvPr>
+          <p:cNvSpPr txBox="1"/>
+          <p:nvPr/>
+        </p:nvSpPr>
+        <p:spPr>
+          <a:xfrm>
+            <a:off x="7809947" y="810546"/>
+            <a:ext cx="516835" cy="646331"/>
+          </a:xfrm>
+          <a:prstGeom prst="rect">
+            <a:avLst/>
+          </a:prstGeom>
+          <a:noFill/>
+        </p:spPr>
+        <p:txBody>
+          <a:bodyPr wrap="square" rtlCol="0">
+            <a:spAutoFit/>
+          </a:bodyPr>
+          <a:lstStyle/>
+          <a:p>
+            <a:r>
+              <a:rPr lang="en-IN" sz="3600" b="1" dirty="0">
+                <a:solidFill>
+                  <a:srgbClr val="FF0000"/>
+                </a:solidFill>
+              </a:rPr>
+              <a:t>6</a:t>
+            </a:r>
+            <a:endParaRPr lang="en-US" sz="3600" b="1" dirty="0">
+              <a:solidFill>
+                <a:srgbClr val="FF0000"/>
+              </a:solidFill>
+            </a:endParaRPr>
+          </a:p>
+        </p:txBody>
+      </p:sp>
+      <p:sp>
+        <p:nvSpPr>
+          <p:cNvPr id="16" name="TextBox 15">
+            <a:extLst>
+              <a:ext uri="{FF2B5EF4-FFF2-40B4-BE49-F238E27FC236}">
+                <a16:creationId xmlns:a16="http://schemas.microsoft.com/office/drawing/2014/main" id="{CB0FD0FC-E194-470E-8BF3-AA46740B6C05}"/>
+              </a:ext>
+            </a:extLst>
+          </p:cNvPr>
+          <p:cNvSpPr txBox="1"/>
+          <p:nvPr/>
+        </p:nvSpPr>
+        <p:spPr>
+          <a:xfrm>
+            <a:off x="8662506" y="803924"/>
+            <a:ext cx="516835" cy="646331"/>
+          </a:xfrm>
+          <a:prstGeom prst="rect">
+            <a:avLst/>
+          </a:prstGeom>
+          <a:noFill/>
+        </p:spPr>
+        <p:txBody>
+          <a:bodyPr wrap="square" rtlCol="0">
+            <a:spAutoFit/>
+          </a:bodyPr>
+          <a:lstStyle/>
+          <a:p>
+            <a:r>
+              <a:rPr lang="en-IN" sz="3600" b="1" dirty="0">
+                <a:solidFill>
+                  <a:srgbClr val="FF0000"/>
+                </a:solidFill>
+              </a:rPr>
+              <a:t>7</a:t>
+            </a:r>
+            <a:endParaRPr lang="en-US" sz="3600" b="1" dirty="0">
+              <a:solidFill>
+                <a:srgbClr val="FF0000"/>
+              </a:solidFill>
+            </a:endParaRPr>
+          </a:p>
+        </p:txBody>
+      </p:sp>
+      <p:sp>
+        <p:nvSpPr>
+          <p:cNvPr id="17" name="TextBox 16">
+            <a:extLst>
+              <a:ext uri="{FF2B5EF4-FFF2-40B4-BE49-F238E27FC236}">
+                <a16:creationId xmlns:a16="http://schemas.microsoft.com/office/drawing/2014/main" id="{0BBB06E3-58AD-4660-BAB3-708DBDB64D72}"/>
+              </a:ext>
+            </a:extLst>
+          </p:cNvPr>
+          <p:cNvSpPr txBox="1"/>
+          <p:nvPr/>
+        </p:nvSpPr>
+        <p:spPr>
+          <a:xfrm>
+            <a:off x="9488565" y="810546"/>
+            <a:ext cx="516835" cy="646331"/>
+          </a:xfrm>
+          <a:prstGeom prst="rect">
+            <a:avLst/>
+          </a:prstGeom>
+          <a:noFill/>
+        </p:spPr>
+        <p:txBody>
+          <a:bodyPr wrap="square" rtlCol="0">
+            <a:spAutoFit/>
+          </a:bodyPr>
+          <a:lstStyle/>
+          <a:p>
+            <a:r>
+              <a:rPr lang="en-IN" sz="3600" b="1" dirty="0">
+                <a:solidFill>
+                  <a:srgbClr val="FF0000"/>
+                </a:solidFill>
+              </a:rPr>
+              <a:t>8</a:t>
+            </a:r>
+            <a:endParaRPr lang="en-US" sz="3600" b="1" dirty="0">
+              <a:solidFill>
+                <a:srgbClr val="FF0000"/>
+              </a:solidFill>
+            </a:endParaRPr>
+          </a:p>
+        </p:txBody>
+      </p:sp>
+      <p:sp>
+        <p:nvSpPr>
+          <p:cNvPr id="18" name="TextBox 17">
+            <a:extLst>
+              <a:ext uri="{FF2B5EF4-FFF2-40B4-BE49-F238E27FC236}">
+                <a16:creationId xmlns:a16="http://schemas.microsoft.com/office/drawing/2014/main" id="{3F523369-B844-4AE9-A251-76639DA1B1DE}"/>
+              </a:ext>
+            </a:extLst>
+          </p:cNvPr>
+          <p:cNvSpPr txBox="1"/>
+          <p:nvPr/>
+        </p:nvSpPr>
+        <p:spPr>
+          <a:xfrm>
+            <a:off x="3094382" y="1717382"/>
+            <a:ext cx="516835" cy="646331"/>
+          </a:xfrm>
+          <a:prstGeom prst="rect">
+            <a:avLst/>
+          </a:prstGeom>
+          <a:noFill/>
+        </p:spPr>
+        <p:txBody>
+          <a:bodyPr wrap="square" rtlCol="0">
+            <a:spAutoFit/>
+          </a:bodyPr>
+          <a:lstStyle/>
+          <a:p>
+            <a:r>
+              <a:rPr lang="en-IN" sz="3600" b="1" dirty="0">
+                <a:solidFill>
+                  <a:srgbClr val="FF0000"/>
+                </a:solidFill>
+              </a:rPr>
+              <a:t>9</a:t>
+            </a:r>
+            <a:endParaRPr lang="en-US" sz="3600" b="1" dirty="0">
+              <a:solidFill>
+                <a:srgbClr val="FF0000"/>
+              </a:solidFill>
+            </a:endParaRPr>
+          </a:p>
+        </p:txBody>
+      </p:sp>
+      <p:sp>
+        <p:nvSpPr>
+          <p:cNvPr id="19" name="TextBox 18">
+            <a:extLst>
+              <a:ext uri="{FF2B5EF4-FFF2-40B4-BE49-F238E27FC236}">
+                <a16:creationId xmlns:a16="http://schemas.microsoft.com/office/drawing/2014/main" id="{04D43FDF-A54D-430A-94D8-1F684565DFDE}"/>
+              </a:ext>
+            </a:extLst>
+          </p:cNvPr>
+          <p:cNvSpPr txBox="1"/>
+          <p:nvPr/>
+        </p:nvSpPr>
+        <p:spPr>
+          <a:xfrm>
+            <a:off x="3988905" y="1717382"/>
+            <a:ext cx="682486" cy="646331"/>
+          </a:xfrm>
+          <a:prstGeom prst="rect">
+            <a:avLst/>
+          </a:prstGeom>
+          <a:noFill/>
+        </p:spPr>
+        <p:txBody>
+          <a:bodyPr wrap="square" rtlCol="0">
+            <a:spAutoFit/>
+          </a:bodyPr>
+          <a:lstStyle/>
+          <a:p>
+            <a:r>
+              <a:rPr lang="en-IN" sz="3600" b="1" dirty="0">
+                <a:solidFill>
+                  <a:srgbClr val="FF0000"/>
+                </a:solidFill>
+              </a:rPr>
+              <a:t>10</a:t>
+            </a:r>
+            <a:endParaRPr lang="en-US" sz="3600" b="1" dirty="0">
+              <a:solidFill>
+                <a:srgbClr val="FF0000"/>
+              </a:solidFill>
+            </a:endParaRPr>
+          </a:p>
+        </p:txBody>
+      </p:sp>
+      <p:sp>
+        <p:nvSpPr>
+          <p:cNvPr id="20" name="TextBox 19">
+            <a:extLst>
+              <a:ext uri="{FF2B5EF4-FFF2-40B4-BE49-F238E27FC236}">
+                <a16:creationId xmlns:a16="http://schemas.microsoft.com/office/drawing/2014/main" id="{6DA3D519-B20B-4F4F-A853-CEFA77F80ADB}"/>
+              </a:ext>
+            </a:extLst>
+          </p:cNvPr>
+          <p:cNvSpPr txBox="1"/>
+          <p:nvPr/>
+        </p:nvSpPr>
+        <p:spPr>
+          <a:xfrm>
+            <a:off x="4886741" y="1696278"/>
+            <a:ext cx="682485" cy="646331"/>
+          </a:xfrm>
+          <a:prstGeom prst="rect">
+            <a:avLst/>
+          </a:prstGeom>
+          <a:noFill/>
+        </p:spPr>
+        <p:txBody>
+          <a:bodyPr wrap="square" rtlCol="0">
+            <a:spAutoFit/>
+          </a:bodyPr>
+          <a:lstStyle/>
+          <a:p>
+            <a:r>
+              <a:rPr lang="en-IN" sz="3600" b="1" dirty="0">
+                <a:solidFill>
+                  <a:srgbClr val="FF0000"/>
+                </a:solidFill>
+              </a:rPr>
+              <a:t>11</a:t>
+            </a:r>
+            <a:endParaRPr lang="en-US" sz="3600" b="1" dirty="0">
+              <a:solidFill>
+                <a:srgbClr val="FF0000"/>
+              </a:solidFill>
+            </a:endParaRPr>
+          </a:p>
+        </p:txBody>
+      </p:sp>
+      <p:sp>
+        <p:nvSpPr>
+          <p:cNvPr id="21" name="TextBox 20">
+            <a:extLst>
+              <a:ext uri="{FF2B5EF4-FFF2-40B4-BE49-F238E27FC236}">
+                <a16:creationId xmlns:a16="http://schemas.microsoft.com/office/drawing/2014/main" id="{18728284-3E00-434A-9C34-9EEF6A78EBB3}"/>
+              </a:ext>
+            </a:extLst>
+          </p:cNvPr>
+          <p:cNvSpPr txBox="1"/>
+          <p:nvPr/>
+        </p:nvSpPr>
+        <p:spPr>
+          <a:xfrm>
+            <a:off x="5784576" y="1678566"/>
+            <a:ext cx="681382" cy="646331"/>
+          </a:xfrm>
+          <a:prstGeom prst="rect">
+            <a:avLst/>
+          </a:prstGeom>
+          <a:noFill/>
+        </p:spPr>
+        <p:txBody>
+          <a:bodyPr wrap="square" rtlCol="0">
+            <a:spAutoFit/>
+          </a:bodyPr>
+          <a:lstStyle/>
+          <a:p>
+            <a:r>
+              <a:rPr lang="en-IN" sz="3600" b="1" dirty="0">
+                <a:solidFill>
+                  <a:srgbClr val="FF0000"/>
+                </a:solidFill>
+              </a:rPr>
+              <a:t>12</a:t>
+            </a:r>
+            <a:endParaRPr lang="en-US" sz="3600" b="1" dirty="0">
+              <a:solidFill>
+                <a:srgbClr val="FF0000"/>
+              </a:solidFill>
+            </a:endParaRPr>
+          </a:p>
+        </p:txBody>
+      </p:sp>
+      <p:sp>
+        <p:nvSpPr>
+          <p:cNvPr id="22" name="TextBox 21">
+            <a:extLst>
+              <a:ext uri="{FF2B5EF4-FFF2-40B4-BE49-F238E27FC236}">
+                <a16:creationId xmlns:a16="http://schemas.microsoft.com/office/drawing/2014/main" id="{4D32DCBF-0CFF-4A71-88C3-D5CB03BB66EA}"/>
+              </a:ext>
+            </a:extLst>
+          </p:cNvPr>
+          <p:cNvSpPr txBox="1"/>
+          <p:nvPr/>
+        </p:nvSpPr>
+        <p:spPr>
+          <a:xfrm>
+            <a:off x="6708364" y="1678566"/>
+            <a:ext cx="812247" cy="646331"/>
+          </a:xfrm>
+          <a:prstGeom prst="rect">
+            <a:avLst/>
+          </a:prstGeom>
+          <a:noFill/>
+        </p:spPr>
+        <p:txBody>
+          <a:bodyPr wrap="square" rtlCol="0">
+            <a:spAutoFit/>
+          </a:bodyPr>
+          <a:lstStyle/>
+          <a:p>
+            <a:r>
+              <a:rPr lang="en-IN" sz="3600" b="1" dirty="0">
+                <a:solidFill>
+                  <a:srgbClr val="FF0000"/>
+                </a:solidFill>
+              </a:rPr>
+              <a:t>13</a:t>
+            </a:r>
+            <a:endParaRPr lang="en-US" sz="3600" b="1" dirty="0">
+              <a:solidFill>
+                <a:srgbClr val="FF0000"/>
+              </a:solidFill>
+            </a:endParaRPr>
+          </a:p>
+        </p:txBody>
+      </p:sp>
+      <p:sp>
+        <p:nvSpPr>
+          <p:cNvPr id="23" name="TextBox 22">
+            <a:extLst>
+              <a:ext uri="{FF2B5EF4-FFF2-40B4-BE49-F238E27FC236}">
+                <a16:creationId xmlns:a16="http://schemas.microsoft.com/office/drawing/2014/main" id="{F551D1B3-FD0D-4798-8061-FBA487BC3AA2}"/>
+              </a:ext>
+            </a:extLst>
+          </p:cNvPr>
+          <p:cNvSpPr txBox="1"/>
+          <p:nvPr/>
+        </p:nvSpPr>
+        <p:spPr>
+          <a:xfrm>
+            <a:off x="7606199" y="1669774"/>
+            <a:ext cx="681382" cy="646331"/>
+          </a:xfrm>
+          <a:prstGeom prst="rect">
+            <a:avLst/>
+          </a:prstGeom>
+          <a:noFill/>
+        </p:spPr>
+        <p:txBody>
+          <a:bodyPr wrap="square" rtlCol="0">
+            <a:spAutoFit/>
+          </a:bodyPr>
+          <a:lstStyle/>
+          <a:p>
+            <a:r>
+              <a:rPr lang="en-IN" sz="3600" b="1" dirty="0">
+                <a:solidFill>
+                  <a:srgbClr val="FF0000"/>
+                </a:solidFill>
+              </a:rPr>
+              <a:t>14</a:t>
+            </a:r>
+            <a:endParaRPr lang="en-US" sz="3600" b="1" dirty="0">
+              <a:solidFill>
+                <a:srgbClr val="FF0000"/>
+              </a:solidFill>
+            </a:endParaRPr>
+          </a:p>
+        </p:txBody>
+      </p:sp>
+      <p:sp>
+        <p:nvSpPr>
+          <p:cNvPr id="24" name="TextBox 23">
+            <a:extLst>
+              <a:ext uri="{FF2B5EF4-FFF2-40B4-BE49-F238E27FC236}">
+                <a16:creationId xmlns:a16="http://schemas.microsoft.com/office/drawing/2014/main" id="{517C9012-177C-4583-9466-E3097A6D11BA}"/>
+              </a:ext>
+            </a:extLst>
+          </p:cNvPr>
+          <p:cNvSpPr txBox="1"/>
+          <p:nvPr/>
+        </p:nvSpPr>
+        <p:spPr>
+          <a:xfrm>
+            <a:off x="8448541" y="1669773"/>
+            <a:ext cx="681382" cy="646331"/>
+          </a:xfrm>
+          <a:prstGeom prst="rect">
+            <a:avLst/>
+          </a:prstGeom>
+          <a:noFill/>
+        </p:spPr>
+        <p:txBody>
+          <a:bodyPr wrap="square" rtlCol="0">
+            <a:spAutoFit/>
+          </a:bodyPr>
+          <a:lstStyle/>
+          <a:p>
+            <a:r>
+              <a:rPr lang="en-IN" sz="3600" b="1" dirty="0">
+                <a:solidFill>
+                  <a:srgbClr val="FF0000"/>
+                </a:solidFill>
+              </a:rPr>
+              <a:t>15</a:t>
+            </a:r>
+            <a:endParaRPr lang="en-US" sz="3600" b="1" dirty="0">
+              <a:solidFill>
+                <a:srgbClr val="FF0000"/>
+              </a:solidFill>
+            </a:endParaRPr>
+          </a:p>
+        </p:txBody>
+      </p:sp>
+      <p:sp>
+        <p:nvSpPr>
+          <p:cNvPr id="25" name="TextBox 24">
+            <a:extLst>
+              <a:ext uri="{FF2B5EF4-FFF2-40B4-BE49-F238E27FC236}">
+                <a16:creationId xmlns:a16="http://schemas.microsoft.com/office/drawing/2014/main" id="{2EBAB210-844F-4C91-A9DE-D7F9F7C794A0}"/>
+              </a:ext>
+            </a:extLst>
+          </p:cNvPr>
+          <p:cNvSpPr txBox="1"/>
+          <p:nvPr/>
+        </p:nvSpPr>
+        <p:spPr>
+          <a:xfrm>
+            <a:off x="9374808" y="1669772"/>
+            <a:ext cx="681382" cy="646331"/>
+          </a:xfrm>
+          <a:prstGeom prst="rect">
+            <a:avLst/>
+          </a:prstGeom>
+          <a:noFill/>
+        </p:spPr>
+        <p:txBody>
+          <a:bodyPr wrap="square" rtlCol="0">
+            <a:spAutoFit/>
+          </a:bodyPr>
+          <a:lstStyle/>
+          <a:p>
+            <a:r>
+              <a:rPr lang="en-IN" sz="3600" b="1" dirty="0">
+                <a:solidFill>
+                  <a:srgbClr val="FF0000"/>
+                </a:solidFill>
+              </a:rPr>
+              <a:t>16</a:t>
+            </a:r>
+            <a:endParaRPr lang="en-US" sz="3600" b="1" dirty="0">
+              <a:solidFill>
+                <a:srgbClr val="FF0000"/>
+              </a:solidFill>
+            </a:endParaRPr>
+          </a:p>
+        </p:txBody>
+      </p:sp>
+      <p:sp>
+        <p:nvSpPr>
+          <p:cNvPr id="26" name="TextBox 25">
+            <a:extLst>
+              <a:ext uri="{FF2B5EF4-FFF2-40B4-BE49-F238E27FC236}">
+                <a16:creationId xmlns:a16="http://schemas.microsoft.com/office/drawing/2014/main" id="{61499C98-724A-4430-A176-65B034B2C524}"/>
+              </a:ext>
+            </a:extLst>
+          </p:cNvPr>
+          <p:cNvSpPr txBox="1"/>
+          <p:nvPr/>
+        </p:nvSpPr>
+        <p:spPr>
+          <a:xfrm>
+            <a:off x="3094381" y="2491409"/>
+            <a:ext cx="801758" cy="646331"/>
+          </a:xfrm>
+          <a:prstGeom prst="rect">
+            <a:avLst/>
+          </a:prstGeom>
+          <a:noFill/>
+        </p:spPr>
+        <p:txBody>
+          <a:bodyPr wrap="square" rtlCol="0">
+            <a:spAutoFit/>
+          </a:bodyPr>
+          <a:lstStyle/>
+          <a:p>
+            <a:r>
+              <a:rPr lang="en-IN" sz="3600" b="1" dirty="0">
+                <a:solidFill>
+                  <a:srgbClr val="FF0000"/>
+                </a:solidFill>
+              </a:rPr>
+              <a:t>17</a:t>
+            </a:r>
+            <a:endParaRPr lang="en-US" sz="3600" b="1" dirty="0">
+              <a:solidFill>
+                <a:srgbClr val="FF0000"/>
+              </a:solidFill>
+            </a:endParaRPr>
+          </a:p>
+        </p:txBody>
+      </p:sp>
+      <p:sp>
+        <p:nvSpPr>
+          <p:cNvPr id="27" name="TextBox 26">
+            <a:extLst>
+              <a:ext uri="{FF2B5EF4-FFF2-40B4-BE49-F238E27FC236}">
+                <a16:creationId xmlns:a16="http://schemas.microsoft.com/office/drawing/2014/main" id="{BCD4C2EF-A242-49B6-B2DB-201F989F70D1}"/>
+              </a:ext>
+            </a:extLst>
+          </p:cNvPr>
+          <p:cNvSpPr txBox="1"/>
+          <p:nvPr/>
+        </p:nvSpPr>
+        <p:spPr>
+          <a:xfrm>
+            <a:off x="3151808" y="810546"/>
+            <a:ext cx="516835" cy="646331"/>
+          </a:xfrm>
+          <a:prstGeom prst="rect">
+            <a:avLst/>
+          </a:prstGeom>
+          <a:noFill/>
+        </p:spPr>
+        <p:txBody>
+          <a:bodyPr wrap="square" rtlCol="0">
+            <a:spAutoFit/>
+          </a:bodyPr>
+          <a:lstStyle/>
+          <a:p>
+            <a:r>
+              <a:rPr lang="en-IN" sz="3600" b="1" dirty="0">
+                <a:solidFill>
+                  <a:srgbClr val="FF0000"/>
+                </a:solidFill>
+              </a:rPr>
+              <a:t>1</a:t>
+            </a:r>
+            <a:endParaRPr lang="en-US" sz="3600" b="1" dirty="0">
+              <a:solidFill>
+                <a:srgbClr val="FF0000"/>
+              </a:solidFill>
+            </a:endParaRPr>
+          </a:p>
+        </p:txBody>
+      </p:sp>
+      <p:sp>
+        <p:nvSpPr>
+          <p:cNvPr id="28" name="TextBox 27">
+            <a:extLst>
+              <a:ext uri="{FF2B5EF4-FFF2-40B4-BE49-F238E27FC236}">
+                <a16:creationId xmlns:a16="http://schemas.microsoft.com/office/drawing/2014/main" id="{7A011359-57BA-4666-BAEE-D7E34B06586F}"/>
+              </a:ext>
+            </a:extLst>
+          </p:cNvPr>
+          <p:cNvSpPr txBox="1"/>
+          <p:nvPr/>
+        </p:nvSpPr>
+        <p:spPr>
+          <a:xfrm>
+            <a:off x="4881224" y="2454596"/>
+            <a:ext cx="682484" cy="646331"/>
+          </a:xfrm>
+          <a:prstGeom prst="rect">
+            <a:avLst/>
+          </a:prstGeom>
+          <a:noFill/>
+        </p:spPr>
+        <p:txBody>
+          <a:bodyPr wrap="square" rtlCol="0">
+            <a:spAutoFit/>
+          </a:bodyPr>
+          <a:lstStyle/>
+          <a:p>
+            <a:r>
+              <a:rPr lang="en-IN" sz="3600" b="1" dirty="0">
+                <a:solidFill>
+                  <a:srgbClr val="FF0000"/>
+                </a:solidFill>
+              </a:rPr>
+              <a:t>19</a:t>
+            </a:r>
+            <a:endParaRPr lang="en-US" sz="3600" b="1" dirty="0">
+              <a:solidFill>
+                <a:srgbClr val="FF0000"/>
+              </a:solidFill>
+            </a:endParaRPr>
+          </a:p>
+        </p:txBody>
+      </p:sp>
+      <p:sp>
+        <p:nvSpPr>
+          <p:cNvPr id="29" name="TextBox 28">
+            <a:extLst>
+              <a:ext uri="{FF2B5EF4-FFF2-40B4-BE49-F238E27FC236}">
+                <a16:creationId xmlns:a16="http://schemas.microsoft.com/office/drawing/2014/main" id="{3392A9F2-E1EB-4808-BDB6-E2A98AC43892}"/>
+              </a:ext>
+            </a:extLst>
+          </p:cNvPr>
+          <p:cNvSpPr txBox="1"/>
+          <p:nvPr/>
+        </p:nvSpPr>
+        <p:spPr>
+          <a:xfrm>
+            <a:off x="5784576" y="2454595"/>
+            <a:ext cx="675866" cy="646331"/>
+          </a:xfrm>
+          <a:prstGeom prst="rect">
+            <a:avLst/>
+          </a:prstGeom>
+          <a:noFill/>
+        </p:spPr>
+        <p:txBody>
+          <a:bodyPr wrap="square" rtlCol="0">
+            <a:spAutoFit/>
+          </a:bodyPr>
+          <a:lstStyle/>
+          <a:p>
+            <a:r>
+              <a:rPr lang="en-IN" sz="3600" b="1" dirty="0">
+                <a:solidFill>
+                  <a:srgbClr val="FF0000"/>
+                </a:solidFill>
+              </a:rPr>
+              <a:t>20</a:t>
+            </a:r>
+            <a:endParaRPr lang="en-US" sz="3600" b="1" dirty="0">
+              <a:solidFill>
+                <a:srgbClr val="FF0000"/>
+              </a:solidFill>
+            </a:endParaRPr>
+          </a:p>
+        </p:txBody>
+      </p:sp>
+      <p:sp>
+        <p:nvSpPr>
+          <p:cNvPr id="30" name="TextBox 29">
+            <a:extLst>
+              <a:ext uri="{FF2B5EF4-FFF2-40B4-BE49-F238E27FC236}">
+                <a16:creationId xmlns:a16="http://schemas.microsoft.com/office/drawing/2014/main" id="{B4A3FB4F-6A46-4110-B029-268071E40FFF}"/>
+              </a:ext>
+            </a:extLst>
+          </p:cNvPr>
+          <p:cNvSpPr txBox="1"/>
+          <p:nvPr/>
+        </p:nvSpPr>
+        <p:spPr>
+          <a:xfrm>
+            <a:off x="6681310" y="2471531"/>
+            <a:ext cx="744321" cy="646331"/>
+          </a:xfrm>
+          <a:prstGeom prst="rect">
+            <a:avLst/>
+          </a:prstGeom>
+          <a:noFill/>
+        </p:spPr>
+        <p:txBody>
+          <a:bodyPr wrap="square" rtlCol="0">
+            <a:spAutoFit/>
+          </a:bodyPr>
+          <a:lstStyle/>
+          <a:p>
+            <a:r>
+              <a:rPr lang="en-IN" sz="3600" b="1" dirty="0">
+                <a:solidFill>
+                  <a:srgbClr val="FF0000"/>
+                </a:solidFill>
+              </a:rPr>
+              <a:t>21</a:t>
+            </a:r>
+            <a:endParaRPr lang="en-US" sz="3600" b="1" dirty="0">
+              <a:solidFill>
+                <a:srgbClr val="FF0000"/>
+              </a:solidFill>
+            </a:endParaRPr>
+          </a:p>
+        </p:txBody>
+      </p:sp>
+      <p:sp>
+        <p:nvSpPr>
+          <p:cNvPr id="31" name="TextBox 30">
+            <a:extLst>
+              <a:ext uri="{FF2B5EF4-FFF2-40B4-BE49-F238E27FC236}">
+                <a16:creationId xmlns:a16="http://schemas.microsoft.com/office/drawing/2014/main" id="{F5CDE61C-E75A-4B3A-8B83-15F38D5627CE}"/>
+              </a:ext>
+            </a:extLst>
+          </p:cNvPr>
+          <p:cNvSpPr txBox="1"/>
+          <p:nvPr/>
+        </p:nvSpPr>
+        <p:spPr>
+          <a:xfrm>
+            <a:off x="7569213" y="2443506"/>
+            <a:ext cx="675866" cy="646331"/>
+          </a:xfrm>
+          <a:prstGeom prst="rect">
+            <a:avLst/>
+          </a:prstGeom>
+          <a:noFill/>
+        </p:spPr>
+        <p:txBody>
+          <a:bodyPr wrap="square" rtlCol="0">
+            <a:spAutoFit/>
+          </a:bodyPr>
+          <a:lstStyle/>
+          <a:p>
+            <a:r>
+              <a:rPr lang="en-IN" sz="3600" b="1" dirty="0">
+                <a:solidFill>
+                  <a:srgbClr val="FF0000"/>
+                </a:solidFill>
+              </a:rPr>
+              <a:t>22</a:t>
+            </a:r>
+            <a:endParaRPr lang="en-US" sz="3600" b="1" dirty="0">
+              <a:solidFill>
+                <a:srgbClr val="FF0000"/>
+              </a:solidFill>
+            </a:endParaRPr>
+          </a:p>
+        </p:txBody>
+      </p:sp>
+      <p:sp>
+        <p:nvSpPr>
+          <p:cNvPr id="32" name="TextBox 31">
+            <a:extLst>
+              <a:ext uri="{FF2B5EF4-FFF2-40B4-BE49-F238E27FC236}">
+                <a16:creationId xmlns:a16="http://schemas.microsoft.com/office/drawing/2014/main" id="{3F89F842-74D3-48BA-BE32-8E29622B88B4}"/>
+              </a:ext>
+            </a:extLst>
+          </p:cNvPr>
+          <p:cNvSpPr txBox="1"/>
+          <p:nvPr/>
+        </p:nvSpPr>
+        <p:spPr>
+          <a:xfrm>
+            <a:off x="8465947" y="2454594"/>
+            <a:ext cx="663976" cy="646331"/>
+          </a:xfrm>
+          <a:prstGeom prst="rect">
+            <a:avLst/>
+          </a:prstGeom>
+          <a:noFill/>
+        </p:spPr>
+        <p:txBody>
+          <a:bodyPr wrap="square" rtlCol="0">
+            <a:spAutoFit/>
+          </a:bodyPr>
+          <a:lstStyle/>
+          <a:p>
+            <a:r>
+              <a:rPr lang="en-IN" sz="3600" b="1" dirty="0">
+                <a:solidFill>
+                  <a:srgbClr val="FF0000"/>
+                </a:solidFill>
+              </a:rPr>
+              <a:t>23</a:t>
+            </a:r>
+            <a:endParaRPr lang="en-US" sz="3600" b="1" dirty="0">
+              <a:solidFill>
+                <a:srgbClr val="FF0000"/>
+              </a:solidFill>
+            </a:endParaRPr>
+          </a:p>
+        </p:txBody>
+      </p:sp>
+      <p:sp>
+        <p:nvSpPr>
+          <p:cNvPr id="33" name="TextBox 32">
+            <a:extLst>
+              <a:ext uri="{FF2B5EF4-FFF2-40B4-BE49-F238E27FC236}">
+                <a16:creationId xmlns:a16="http://schemas.microsoft.com/office/drawing/2014/main" id="{E4B2788B-C432-4DB9-8BDC-6902F914015E}"/>
+              </a:ext>
+            </a:extLst>
+          </p:cNvPr>
+          <p:cNvSpPr txBox="1"/>
+          <p:nvPr/>
+        </p:nvSpPr>
+        <p:spPr>
+          <a:xfrm>
+            <a:off x="9457081" y="2406984"/>
+            <a:ext cx="675866" cy="646331"/>
+          </a:xfrm>
+          <a:prstGeom prst="rect">
+            <a:avLst/>
+          </a:prstGeom>
+          <a:noFill/>
+        </p:spPr>
+        <p:txBody>
+          <a:bodyPr wrap="square" rtlCol="0">
+            <a:spAutoFit/>
+          </a:bodyPr>
+          <a:lstStyle/>
+          <a:p>
+            <a:r>
+              <a:rPr lang="en-IN" sz="3600" b="1" dirty="0">
+                <a:solidFill>
+                  <a:srgbClr val="FF0000"/>
+                </a:solidFill>
+              </a:rPr>
+              <a:t>24</a:t>
+            </a:r>
+            <a:endParaRPr lang="en-US" sz="3600" b="1" dirty="0">
+              <a:solidFill>
+                <a:srgbClr val="FF0000"/>
+              </a:solidFill>
+            </a:endParaRPr>
+          </a:p>
+        </p:txBody>
+      </p:sp>
+    </p:spTree>
+    <p:extLst>
+      <p:ext uri="{BB962C8B-B14F-4D97-AF65-F5344CB8AC3E}">
+        <p14:creationId xmlns:p14="http://schemas.microsoft.com/office/powerpoint/2010/main" val="845264327"/>
+      </p:ext>
+    </p:extLst>
+  </p:cSld>
+  <p:clrMapOvr>
+    <a:masterClrMapping/>
+  </p:clrMapOvr>
+</p:sld>
+</file>
+
+<file path=ppt/slides/slide3.xml><?xml version="1.0" encoding="utf-8"?>
+<p:sld xmlns:a="http://schemas.openxmlformats.org/drawingml/2006/main" xmlns:r="http://schemas.openxmlformats.org/officeDocument/2006/relationships" xmlns:p="http://schemas.openxmlformats.org/presentationml/2006/main">
+  <p:cSld>
+    <p:spTree>
+      <p:nvGrpSpPr>
+        <p:cNvPr id="1" name=""/>
+        <p:cNvGrpSpPr/>
+        <p:nvPr/>
+      </p:nvGrpSpPr>
+      <p:grpSpPr>
+        <a:xfrm>
+          <a:off x="0" y="0"/>
+          <a:ext cx="0" cy="0"/>
+          <a:chOff x="0" y="0"/>
+          <a:chExt cx="0" cy="0"/>
+        </a:xfrm>
+      </p:grpSpPr>
+      <p:graphicFrame>
+        <p:nvGraphicFramePr>
           <p:cNvPr id="4" name="Table 3">
             <a:extLst>
               <a:ext uri="{FF2B5EF4-FFF2-40B4-BE49-F238E27FC236}">
@@ -6895,7 +9418,7 @@
 </p:sld>
 </file>
 
-<file path=ppt/slides/slide3.xml><?xml version="1.0" encoding="utf-8"?>
+<file path=ppt/slides/slide4.xml><?xml version="1.0" encoding="utf-8"?>
 <p:sld xmlns:a="http://schemas.openxmlformats.org/drawingml/2006/main" xmlns:r="http://schemas.openxmlformats.org/officeDocument/2006/relationships" xmlns:p="http://schemas.openxmlformats.org/presentationml/2006/main">
   <p:cSld>
     <p:spTree>
@@ -10350,7 +12873,7 @@
 </p:sld>
 </file>
 
-<file path=ppt/slides/slide4.xml><?xml version="1.0" encoding="utf-8"?>
+<file path=ppt/slides/slide5.xml><?xml version="1.0" encoding="utf-8"?>
 <p:sld xmlns:a="http://schemas.openxmlformats.org/drawingml/2006/main" xmlns:r="http://schemas.openxmlformats.org/officeDocument/2006/relationships" xmlns:p="http://schemas.openxmlformats.org/presentationml/2006/main">
   <p:cSld>
     <p:spTree>

</xml_diff>

<commit_message>
[TASK] Added images for strategic moves
</commit_message>
<xml_diff>
--- a/diagrams/game_play.pptx
+++ b/diagrams/game_play.pptx
@@ -10,6 +10,7 @@
     <p:sldId id="257" r:id="rId4"/>
     <p:sldId id="258" r:id="rId5"/>
     <p:sldId id="259" r:id="rId6"/>
+    <p:sldId id="261" r:id="rId7"/>
   </p:sldIdLst>
   <p:sldSz cx="12192000" cy="6858000"/>
   <p:notesSz cx="6858000" cy="9144000"/>
@@ -263,7 +264,7 @@
           <a:p>
             <a:fld id="{A24774F0-CFF4-432D-81EC-80FC546292F2}" type="datetimeFigureOut">
               <a:rPr lang="en-US" smtClean="0"/>
-              <a:t>07-Dec-18</a:t>
+              <a:t>08-Dec-18</a:t>
             </a:fld>
             <a:endParaRPr lang="en-US"/>
           </a:p>
@@ -461,7 +462,7 @@
           <a:p>
             <a:fld id="{A24774F0-CFF4-432D-81EC-80FC546292F2}" type="datetimeFigureOut">
               <a:rPr lang="en-US" smtClean="0"/>
-              <a:t>07-Dec-18</a:t>
+              <a:t>08-Dec-18</a:t>
             </a:fld>
             <a:endParaRPr lang="en-US"/>
           </a:p>
@@ -669,7 +670,7 @@
           <a:p>
             <a:fld id="{A24774F0-CFF4-432D-81EC-80FC546292F2}" type="datetimeFigureOut">
               <a:rPr lang="en-US" smtClean="0"/>
-              <a:t>07-Dec-18</a:t>
+              <a:t>08-Dec-18</a:t>
             </a:fld>
             <a:endParaRPr lang="en-US"/>
           </a:p>
@@ -867,7 +868,7 @@
           <a:p>
             <a:fld id="{A24774F0-CFF4-432D-81EC-80FC546292F2}" type="datetimeFigureOut">
               <a:rPr lang="en-US" smtClean="0"/>
-              <a:t>07-Dec-18</a:t>
+              <a:t>08-Dec-18</a:t>
             </a:fld>
             <a:endParaRPr lang="en-US"/>
           </a:p>
@@ -1142,7 +1143,7 @@
           <a:p>
             <a:fld id="{A24774F0-CFF4-432D-81EC-80FC546292F2}" type="datetimeFigureOut">
               <a:rPr lang="en-US" smtClean="0"/>
-              <a:t>07-Dec-18</a:t>
+              <a:t>08-Dec-18</a:t>
             </a:fld>
             <a:endParaRPr lang="en-US"/>
           </a:p>
@@ -1407,7 +1408,7 @@
           <a:p>
             <a:fld id="{A24774F0-CFF4-432D-81EC-80FC546292F2}" type="datetimeFigureOut">
               <a:rPr lang="en-US" smtClean="0"/>
-              <a:t>07-Dec-18</a:t>
+              <a:t>08-Dec-18</a:t>
             </a:fld>
             <a:endParaRPr lang="en-US"/>
           </a:p>
@@ -1819,7 +1820,7 @@
           <a:p>
             <a:fld id="{A24774F0-CFF4-432D-81EC-80FC546292F2}" type="datetimeFigureOut">
               <a:rPr lang="en-US" smtClean="0"/>
-              <a:t>07-Dec-18</a:t>
+              <a:t>08-Dec-18</a:t>
             </a:fld>
             <a:endParaRPr lang="en-US"/>
           </a:p>
@@ -1960,7 +1961,7 @@
           <a:p>
             <a:fld id="{A24774F0-CFF4-432D-81EC-80FC546292F2}" type="datetimeFigureOut">
               <a:rPr lang="en-US" smtClean="0"/>
-              <a:t>07-Dec-18</a:t>
+              <a:t>08-Dec-18</a:t>
             </a:fld>
             <a:endParaRPr lang="en-US"/>
           </a:p>
@@ -2073,7 +2074,7 @@
           <a:p>
             <a:fld id="{A24774F0-CFF4-432D-81EC-80FC546292F2}" type="datetimeFigureOut">
               <a:rPr lang="en-US" smtClean="0"/>
-              <a:t>07-Dec-18</a:t>
+              <a:t>08-Dec-18</a:t>
             </a:fld>
             <a:endParaRPr lang="en-US"/>
           </a:p>
@@ -2384,7 +2385,7 @@
           <a:p>
             <a:fld id="{A24774F0-CFF4-432D-81EC-80FC546292F2}" type="datetimeFigureOut">
               <a:rPr lang="en-US" smtClean="0"/>
-              <a:t>07-Dec-18</a:t>
+              <a:t>08-Dec-18</a:t>
             </a:fld>
             <a:endParaRPr lang="en-US"/>
           </a:p>
@@ -2672,7 +2673,7 @@
           <a:p>
             <a:fld id="{A24774F0-CFF4-432D-81EC-80FC546292F2}" type="datetimeFigureOut">
               <a:rPr lang="en-US" smtClean="0"/>
-              <a:t>07-Dec-18</a:t>
+              <a:t>08-Dec-18</a:t>
             </a:fld>
             <a:endParaRPr lang="en-US"/>
           </a:p>
@@ -2913,7 +2914,7 @@
           <a:p>
             <a:fld id="{A24774F0-CFF4-432D-81EC-80FC546292F2}" type="datetimeFigureOut">
               <a:rPr lang="en-US" smtClean="0"/>
-              <a:t>07-Dec-18</a:t>
+              <a:t>08-Dec-18</a:t>
             </a:fld>
             <a:endParaRPr lang="en-US"/>
           </a:p>
@@ -16316,6 +16317,1905 @@
 </p:sld>
 </file>
 
+<file path=ppt/slides/slide6.xml><?xml version="1.0" encoding="utf-8"?>
+<p:sld xmlns:a="http://schemas.openxmlformats.org/drawingml/2006/main" xmlns:r="http://schemas.openxmlformats.org/officeDocument/2006/relationships" xmlns:p="http://schemas.openxmlformats.org/presentationml/2006/main">
+  <p:cSld>
+    <p:spTree>
+      <p:nvGrpSpPr>
+        <p:cNvPr id="1" name=""/>
+        <p:cNvGrpSpPr/>
+        <p:nvPr/>
+      </p:nvGrpSpPr>
+      <p:grpSpPr>
+        <a:xfrm>
+          <a:off x="0" y="0"/>
+          <a:ext cx="0" cy="0"/>
+          <a:chOff x="0" y="0"/>
+          <a:chExt cx="0" cy="0"/>
+        </a:xfrm>
+      </p:grpSpPr>
+      <p:graphicFrame>
+        <p:nvGraphicFramePr>
+          <p:cNvPr id="4" name="Table 3">
+            <a:extLst>
+              <a:ext uri="{FF2B5EF4-FFF2-40B4-BE49-F238E27FC236}">
+                <a16:creationId xmlns:a16="http://schemas.microsoft.com/office/drawing/2014/main" id="{A7D061F5-9884-41F4-A2BF-7B8C3F199B97}"/>
+              </a:ext>
+            </a:extLst>
+          </p:cNvPr>
+          <p:cNvGraphicFramePr>
+            <a:graphicFrameLocks noGrp="1"/>
+          </p:cNvGraphicFramePr>
+          <p:nvPr>
+            <p:extLst>
+              <p:ext uri="{D42A27DB-BD31-4B8C-83A1-F6EECF244321}">
+                <p14:modId xmlns:p14="http://schemas.microsoft.com/office/powerpoint/2010/main" val="2630713996"/>
+              </p:ext>
+            </p:extLst>
+          </p:nvPr>
+        </p:nvGraphicFramePr>
+        <p:xfrm>
+          <a:off x="2491407" y="1793089"/>
+          <a:ext cx="7218027" cy="2709336"/>
+        </p:xfrm>
+        <a:graphic>
+          <a:graphicData uri="http://schemas.openxmlformats.org/drawingml/2006/table">
+            <a:tbl>
+              <a:tblPr firstRow="1" bandRow="1">
+                <a:tableStyleId>{5940675A-B579-460E-94D1-54222C63F5DA}</a:tableStyleId>
+              </a:tblPr>
+              <a:tblGrid>
+                <a:gridCol w="802003">
+                  <a:extLst>
+                    <a:ext uri="{9D8B030D-6E8A-4147-A177-3AD203B41FA5}">
+                      <a16:colId xmlns:a16="http://schemas.microsoft.com/office/drawing/2014/main" val="663328804"/>
+                    </a:ext>
+                  </a:extLst>
+                </a:gridCol>
+                <a:gridCol w="802003">
+                  <a:extLst>
+                    <a:ext uri="{9D8B030D-6E8A-4147-A177-3AD203B41FA5}">
+                      <a16:colId xmlns:a16="http://schemas.microsoft.com/office/drawing/2014/main" val="3402578565"/>
+                    </a:ext>
+                  </a:extLst>
+                </a:gridCol>
+                <a:gridCol w="802003">
+                  <a:extLst>
+                    <a:ext uri="{9D8B030D-6E8A-4147-A177-3AD203B41FA5}">
+                      <a16:colId xmlns:a16="http://schemas.microsoft.com/office/drawing/2014/main" val="3655898552"/>
+                    </a:ext>
+                  </a:extLst>
+                </a:gridCol>
+                <a:gridCol w="802003">
+                  <a:extLst>
+                    <a:ext uri="{9D8B030D-6E8A-4147-A177-3AD203B41FA5}">
+                      <a16:colId xmlns:a16="http://schemas.microsoft.com/office/drawing/2014/main" val="4139193611"/>
+                    </a:ext>
+                  </a:extLst>
+                </a:gridCol>
+                <a:gridCol w="802003">
+                  <a:extLst>
+                    <a:ext uri="{9D8B030D-6E8A-4147-A177-3AD203B41FA5}">
+                      <a16:colId xmlns:a16="http://schemas.microsoft.com/office/drawing/2014/main" val="2572578159"/>
+                    </a:ext>
+                  </a:extLst>
+                </a:gridCol>
+                <a:gridCol w="802003">
+                  <a:extLst>
+                    <a:ext uri="{9D8B030D-6E8A-4147-A177-3AD203B41FA5}">
+                      <a16:colId xmlns:a16="http://schemas.microsoft.com/office/drawing/2014/main" val="845486880"/>
+                    </a:ext>
+                  </a:extLst>
+                </a:gridCol>
+                <a:gridCol w="802003">
+                  <a:extLst>
+                    <a:ext uri="{9D8B030D-6E8A-4147-A177-3AD203B41FA5}">
+                      <a16:colId xmlns:a16="http://schemas.microsoft.com/office/drawing/2014/main" val="520765485"/>
+                    </a:ext>
+                  </a:extLst>
+                </a:gridCol>
+                <a:gridCol w="802003">
+                  <a:extLst>
+                    <a:ext uri="{9D8B030D-6E8A-4147-A177-3AD203B41FA5}">
+                      <a16:colId xmlns:a16="http://schemas.microsoft.com/office/drawing/2014/main" val="4200181324"/>
+                    </a:ext>
+                  </a:extLst>
+                </a:gridCol>
+                <a:gridCol w="802003">
+                  <a:extLst>
+                    <a:ext uri="{9D8B030D-6E8A-4147-A177-3AD203B41FA5}">
+                      <a16:colId xmlns:a16="http://schemas.microsoft.com/office/drawing/2014/main" val="3663462352"/>
+                    </a:ext>
+                  </a:extLst>
+                </a:gridCol>
+              </a:tblGrid>
+              <a:tr h="677334">
+                <a:tc>
+                  <a:txBody>
+                    <a:bodyPr/>
+                    <a:lstStyle/>
+                    <a:p>
+                      <a:pPr algn="ctr"/>
+                      <a:r>
+                        <a:rPr lang="en-US" sz="3600" dirty="0"/>
+                        <a:t>a</a:t>
+                      </a:r>
+                    </a:p>
+                  </a:txBody>
+                  <a:tcPr>
+                    <a:lnL w="12700" cmpd="sng">
+                      <a:noFill/>
+                    </a:lnL>
+                    <a:lnR w="12700" cap="flat" cmpd="sng" algn="ctr">
+                      <a:solidFill>
+                        <a:schemeClr val="tx1"/>
+                      </a:solidFill>
+                      <a:prstDash val="solid"/>
+                      <a:round/>
+                      <a:headEnd type="none" w="med" len="med"/>
+                      <a:tailEnd type="none" w="med" len="med"/>
+                    </a:lnR>
+                    <a:lnT w="12700" cmpd="sng">
+                      <a:noFill/>
+                    </a:lnT>
+                    <a:lnB w="12700" cmpd="sng">
+                      <a:noFill/>
+                    </a:lnB>
+                    <a:lnTlToBr w="12700" cmpd="sng">
+                      <a:noFill/>
+                      <a:prstDash val="solid"/>
+                    </a:lnTlToBr>
+                    <a:lnBlToTr w="12700" cmpd="sng">
+                      <a:noFill/>
+                      <a:prstDash val="solid"/>
+                    </a:lnBlToTr>
+                  </a:tcPr>
+                </a:tc>
+                <a:tc>
+                  <a:txBody>
+                    <a:bodyPr/>
+                    <a:lstStyle/>
+                    <a:p>
+                      <a:endParaRPr lang="en-US" dirty="0"/>
+                    </a:p>
+                  </a:txBody>
+                  <a:tcPr>
+                    <a:lnL w="12700" cap="flat" cmpd="sng" algn="ctr">
+                      <a:solidFill>
+                        <a:schemeClr val="tx1"/>
+                      </a:solidFill>
+                      <a:prstDash val="solid"/>
+                      <a:round/>
+                      <a:headEnd type="none" w="med" len="med"/>
+                      <a:tailEnd type="none" w="med" len="med"/>
+                    </a:lnL>
+                  </a:tcPr>
+                </a:tc>
+                <a:tc>
+                  <a:txBody>
+                    <a:bodyPr/>
+                    <a:lstStyle/>
+                    <a:p>
+                      <a:endParaRPr lang="en-US" dirty="0"/>
+                    </a:p>
+                  </a:txBody>
+                  <a:tcPr/>
+                </a:tc>
+                <a:tc>
+                  <a:txBody>
+                    <a:bodyPr/>
+                    <a:lstStyle/>
+                    <a:p>
+                      <a:endParaRPr lang="en-US"/>
+                    </a:p>
+                  </a:txBody>
+                  <a:tcPr/>
+                </a:tc>
+                <a:tc>
+                  <a:txBody>
+                    <a:bodyPr/>
+                    <a:lstStyle/>
+                    <a:p>
+                      <a:endParaRPr lang="en-US" dirty="0"/>
+                    </a:p>
+                  </a:txBody>
+                  <a:tcPr>
+                    <a:lnR w="12700" cap="flat" cmpd="sng" algn="ctr">
+                      <a:solidFill>
+                        <a:schemeClr val="tx1"/>
+                      </a:solidFill>
+                      <a:prstDash val="solid"/>
+                      <a:round/>
+                      <a:headEnd type="none" w="med" len="med"/>
+                      <a:tailEnd type="none" w="med" len="med"/>
+                    </a:lnR>
+                  </a:tcPr>
+                </a:tc>
+                <a:tc>
+                  <a:txBody>
+                    <a:bodyPr/>
+                    <a:lstStyle/>
+                    <a:p>
+                      <a:endParaRPr lang="en-US" dirty="0"/>
+                    </a:p>
+                  </a:txBody>
+                  <a:tcPr>
+                    <a:lnL w="12700" cap="flat" cmpd="sng" algn="ctr">
+                      <a:solidFill>
+                        <a:schemeClr val="tx1"/>
+                      </a:solidFill>
+                      <a:prstDash val="solid"/>
+                      <a:round/>
+                      <a:headEnd type="none" w="med" len="med"/>
+                      <a:tailEnd type="none" w="med" len="med"/>
+                    </a:lnL>
+                    <a:lnR w="12700" cap="flat" cmpd="sng" algn="ctr">
+                      <a:noFill/>
+                      <a:prstDash val="solid"/>
+                      <a:round/>
+                      <a:headEnd type="none" w="med" len="med"/>
+                      <a:tailEnd type="none" w="med" len="med"/>
+                    </a:lnR>
+                    <a:lnT w="12700" cmpd="sng">
+                      <a:noFill/>
+                    </a:lnT>
+                    <a:lnB w="12700" cap="flat" cmpd="sng" algn="ctr">
+                      <a:solidFill>
+                        <a:schemeClr val="tx1"/>
+                      </a:solidFill>
+                      <a:prstDash val="solid"/>
+                      <a:round/>
+                      <a:headEnd type="none" w="med" len="med"/>
+                      <a:tailEnd type="none" w="med" len="med"/>
+                    </a:lnB>
+                    <a:lnTlToBr w="12700" cmpd="sng">
+                      <a:noFill/>
+                      <a:prstDash val="solid"/>
+                    </a:lnTlToBr>
+                    <a:lnBlToTr w="12700" cmpd="sng">
+                      <a:noFill/>
+                      <a:prstDash val="solid"/>
+                    </a:lnBlToTr>
+                  </a:tcPr>
+                </a:tc>
+                <a:tc>
+                  <a:txBody>
+                    <a:bodyPr/>
+                    <a:lstStyle/>
+                    <a:p>
+                      <a:endParaRPr lang="en-US" dirty="0"/>
+                    </a:p>
+                  </a:txBody>
+                  <a:tcPr>
+                    <a:lnL w="12700" cap="flat" cmpd="sng" algn="ctr">
+                      <a:noFill/>
+                      <a:prstDash val="solid"/>
+                      <a:round/>
+                      <a:headEnd type="none" w="med" len="med"/>
+                      <a:tailEnd type="none" w="med" len="med"/>
+                    </a:lnL>
+                    <a:lnR w="12700" cap="flat" cmpd="sng" algn="ctr">
+                      <a:solidFill>
+                        <a:schemeClr val="tx1"/>
+                      </a:solidFill>
+                      <a:prstDash val="solid"/>
+                      <a:round/>
+                      <a:headEnd type="none" w="med" len="med"/>
+                      <a:tailEnd type="none" w="med" len="med"/>
+                    </a:lnR>
+                    <a:lnT w="12700" cmpd="sng">
+                      <a:noFill/>
+                    </a:lnT>
+                    <a:lnB w="12700" cap="flat" cmpd="sng" algn="ctr">
+                      <a:solidFill>
+                        <a:schemeClr val="tx1"/>
+                      </a:solidFill>
+                      <a:prstDash val="solid"/>
+                      <a:round/>
+                      <a:headEnd type="none" w="med" len="med"/>
+                      <a:tailEnd type="none" w="med" len="med"/>
+                    </a:lnB>
+                    <a:lnTlToBr w="12700" cmpd="sng">
+                      <a:noFill/>
+                      <a:prstDash val="solid"/>
+                    </a:lnTlToBr>
+                    <a:lnBlToTr w="12700" cmpd="sng">
+                      <a:noFill/>
+                      <a:prstDash val="solid"/>
+                    </a:lnBlToTr>
+                  </a:tcPr>
+                </a:tc>
+                <a:tc>
+                  <a:txBody>
+                    <a:bodyPr/>
+                    <a:lstStyle/>
+                    <a:p>
+                      <a:endParaRPr lang="en-US"/>
+                    </a:p>
+                  </a:txBody>
+                  <a:tcPr>
+                    <a:lnL w="12700" cap="flat" cmpd="sng" algn="ctr">
+                      <a:solidFill>
+                        <a:schemeClr val="tx1"/>
+                      </a:solidFill>
+                      <a:prstDash val="solid"/>
+                      <a:round/>
+                      <a:headEnd type="none" w="med" len="med"/>
+                      <a:tailEnd type="none" w="med" len="med"/>
+                    </a:lnL>
+                  </a:tcPr>
+                </a:tc>
+                <a:tc>
+                  <a:txBody>
+                    <a:bodyPr/>
+                    <a:lstStyle/>
+                    <a:p>
+                      <a:endParaRPr lang="en-US" dirty="0"/>
+                    </a:p>
+                  </a:txBody>
+                  <a:tcPr/>
+                </a:tc>
+                <a:extLst>
+                  <a:ext uri="{0D108BD9-81ED-4DB2-BD59-A6C34878D82A}">
+                    <a16:rowId xmlns:a16="http://schemas.microsoft.com/office/drawing/2014/main" val="903490451"/>
+                  </a:ext>
+                </a:extLst>
+              </a:tr>
+              <a:tr h="677334">
+                <a:tc>
+                  <a:txBody>
+                    <a:bodyPr/>
+                    <a:lstStyle/>
+                    <a:p>
+                      <a:pPr algn="ctr"/>
+                      <a:r>
+                        <a:rPr lang="en-US" sz="3600" dirty="0"/>
+                        <a:t>b</a:t>
+                      </a:r>
+                    </a:p>
+                  </a:txBody>
+                  <a:tcPr>
+                    <a:lnL w="12700" cmpd="sng">
+                      <a:noFill/>
+                    </a:lnL>
+                    <a:lnR w="12700" cap="flat" cmpd="sng" algn="ctr">
+                      <a:solidFill>
+                        <a:schemeClr val="tx1"/>
+                      </a:solidFill>
+                      <a:prstDash val="solid"/>
+                      <a:round/>
+                      <a:headEnd type="none" w="med" len="med"/>
+                      <a:tailEnd type="none" w="med" len="med"/>
+                    </a:lnR>
+                    <a:lnT w="12700" cmpd="sng">
+                      <a:noFill/>
+                    </a:lnT>
+                    <a:lnB w="12700" cmpd="sng">
+                      <a:noFill/>
+                    </a:lnB>
+                    <a:lnTlToBr w="12700" cmpd="sng">
+                      <a:noFill/>
+                      <a:prstDash val="solid"/>
+                    </a:lnTlToBr>
+                    <a:lnBlToTr w="12700" cmpd="sng">
+                      <a:noFill/>
+                      <a:prstDash val="solid"/>
+                    </a:lnBlToTr>
+                  </a:tcPr>
+                </a:tc>
+                <a:tc>
+                  <a:txBody>
+                    <a:bodyPr/>
+                    <a:lstStyle/>
+                    <a:p>
+                      <a:endParaRPr lang="en-US" dirty="0"/>
+                    </a:p>
+                  </a:txBody>
+                  <a:tcPr>
+                    <a:lnL w="12700" cap="flat" cmpd="sng" algn="ctr">
+                      <a:solidFill>
+                        <a:schemeClr val="tx1"/>
+                      </a:solidFill>
+                      <a:prstDash val="solid"/>
+                      <a:round/>
+                      <a:headEnd type="none" w="med" len="med"/>
+                      <a:tailEnd type="none" w="med" len="med"/>
+                    </a:lnL>
+                  </a:tcPr>
+                </a:tc>
+                <a:tc>
+                  <a:txBody>
+                    <a:bodyPr/>
+                    <a:lstStyle/>
+                    <a:p>
+                      <a:endParaRPr lang="en-US" dirty="0"/>
+                    </a:p>
+                  </a:txBody>
+                  <a:tcPr/>
+                </a:tc>
+                <a:tc>
+                  <a:txBody>
+                    <a:bodyPr/>
+                    <a:lstStyle/>
+                    <a:p>
+                      <a:endParaRPr lang="en-US"/>
+                    </a:p>
+                  </a:txBody>
+                  <a:tcPr/>
+                </a:tc>
+                <a:tc>
+                  <a:txBody>
+                    <a:bodyPr/>
+                    <a:lstStyle/>
+                    <a:p>
+                      <a:endParaRPr lang="en-US"/>
+                    </a:p>
+                  </a:txBody>
+                  <a:tcPr/>
+                </a:tc>
+                <a:tc>
+                  <a:txBody>
+                    <a:bodyPr/>
+                    <a:lstStyle/>
+                    <a:p>
+                      <a:endParaRPr lang="en-US"/>
+                    </a:p>
+                  </a:txBody>
+                  <a:tcPr>
+                    <a:lnT w="12700" cap="flat" cmpd="sng" algn="ctr">
+                      <a:solidFill>
+                        <a:schemeClr val="tx1"/>
+                      </a:solidFill>
+                      <a:prstDash val="solid"/>
+                      <a:round/>
+                      <a:headEnd type="none" w="med" len="med"/>
+                      <a:tailEnd type="none" w="med" len="med"/>
+                    </a:lnT>
+                    <a:lnB w="12700" cap="flat" cmpd="sng" algn="ctr">
+                      <a:solidFill>
+                        <a:schemeClr val="tx1"/>
+                      </a:solidFill>
+                      <a:prstDash val="solid"/>
+                      <a:round/>
+                      <a:headEnd type="none" w="med" len="med"/>
+                      <a:tailEnd type="none" w="med" len="med"/>
+                    </a:lnB>
+                  </a:tcPr>
+                </a:tc>
+                <a:tc>
+                  <a:txBody>
+                    <a:bodyPr/>
+                    <a:lstStyle/>
+                    <a:p>
+                      <a:endParaRPr lang="en-US"/>
+                    </a:p>
+                  </a:txBody>
+                  <a:tcPr>
+                    <a:lnT w="12700" cap="flat" cmpd="sng" algn="ctr">
+                      <a:solidFill>
+                        <a:schemeClr val="tx1"/>
+                      </a:solidFill>
+                      <a:prstDash val="solid"/>
+                      <a:round/>
+                      <a:headEnd type="none" w="med" len="med"/>
+                      <a:tailEnd type="none" w="med" len="med"/>
+                    </a:lnT>
+                    <a:lnB w="12700" cap="flat" cmpd="sng" algn="ctr">
+                      <a:solidFill>
+                        <a:schemeClr val="tx1"/>
+                      </a:solidFill>
+                      <a:prstDash val="solid"/>
+                      <a:round/>
+                      <a:headEnd type="none" w="med" len="med"/>
+                      <a:tailEnd type="none" w="med" len="med"/>
+                    </a:lnB>
+                  </a:tcPr>
+                </a:tc>
+                <a:tc>
+                  <a:txBody>
+                    <a:bodyPr/>
+                    <a:lstStyle/>
+                    <a:p>
+                      <a:endParaRPr lang="en-US"/>
+                    </a:p>
+                  </a:txBody>
+                  <a:tcPr/>
+                </a:tc>
+                <a:tc>
+                  <a:txBody>
+                    <a:bodyPr/>
+                    <a:lstStyle/>
+                    <a:p>
+                      <a:endParaRPr lang="en-US"/>
+                    </a:p>
+                  </a:txBody>
+                  <a:tcPr/>
+                </a:tc>
+                <a:extLst>
+                  <a:ext uri="{0D108BD9-81ED-4DB2-BD59-A6C34878D82A}">
+                    <a16:rowId xmlns:a16="http://schemas.microsoft.com/office/drawing/2014/main" val="3633229203"/>
+                  </a:ext>
+                </a:extLst>
+              </a:tr>
+              <a:tr h="677334">
+                <a:tc>
+                  <a:txBody>
+                    <a:bodyPr/>
+                    <a:lstStyle/>
+                    <a:p>
+                      <a:pPr algn="ctr"/>
+                      <a:r>
+                        <a:rPr lang="en-US" sz="3600" dirty="0"/>
+                        <a:t>c</a:t>
+                      </a:r>
+                    </a:p>
+                  </a:txBody>
+                  <a:tcPr>
+                    <a:lnL w="12700" cmpd="sng">
+                      <a:noFill/>
+                    </a:lnL>
+                    <a:lnR w="12700" cap="flat" cmpd="sng" algn="ctr">
+                      <a:solidFill>
+                        <a:schemeClr val="tx1"/>
+                      </a:solidFill>
+                      <a:prstDash val="solid"/>
+                      <a:round/>
+                      <a:headEnd type="none" w="med" len="med"/>
+                      <a:tailEnd type="none" w="med" len="med"/>
+                    </a:lnR>
+                    <a:lnT w="12700" cmpd="sng">
+                      <a:noFill/>
+                    </a:lnT>
+                    <a:lnB w="12700" cmpd="sng">
+                      <a:noFill/>
+                    </a:lnB>
+                    <a:lnTlToBr w="12700" cmpd="sng">
+                      <a:noFill/>
+                      <a:prstDash val="solid"/>
+                    </a:lnTlToBr>
+                    <a:lnBlToTr w="12700" cmpd="sng">
+                      <a:noFill/>
+                      <a:prstDash val="solid"/>
+                    </a:lnBlToTr>
+                  </a:tcPr>
+                </a:tc>
+                <a:tc>
+                  <a:txBody>
+                    <a:bodyPr/>
+                    <a:lstStyle/>
+                    <a:p>
+                      <a:endParaRPr lang="en-US" dirty="0"/>
+                    </a:p>
+                  </a:txBody>
+                  <a:tcPr>
+                    <a:lnL w="12700" cap="flat" cmpd="sng" algn="ctr">
+                      <a:solidFill>
+                        <a:schemeClr val="tx1"/>
+                      </a:solidFill>
+                      <a:prstDash val="solid"/>
+                      <a:round/>
+                      <a:headEnd type="none" w="med" len="med"/>
+                      <a:tailEnd type="none" w="med" len="med"/>
+                    </a:lnL>
+                    <a:lnB w="12700" cap="flat" cmpd="sng" algn="ctr">
+                      <a:solidFill>
+                        <a:schemeClr val="tx1"/>
+                      </a:solidFill>
+                      <a:prstDash val="solid"/>
+                      <a:round/>
+                      <a:headEnd type="none" w="med" len="med"/>
+                      <a:tailEnd type="none" w="med" len="med"/>
+                    </a:lnB>
+                  </a:tcPr>
+                </a:tc>
+                <a:tc>
+                  <a:txBody>
+                    <a:bodyPr/>
+                    <a:lstStyle/>
+                    <a:p>
+                      <a:endParaRPr lang="en-US" dirty="0"/>
+                    </a:p>
+                  </a:txBody>
+                  <a:tcPr>
+                    <a:lnB w="12700" cap="flat" cmpd="sng" algn="ctr">
+                      <a:solidFill>
+                        <a:schemeClr val="tx1"/>
+                      </a:solidFill>
+                      <a:prstDash val="solid"/>
+                      <a:round/>
+                      <a:headEnd type="none" w="med" len="med"/>
+                      <a:tailEnd type="none" w="med" len="med"/>
+                    </a:lnB>
+                  </a:tcPr>
+                </a:tc>
+                <a:tc>
+                  <a:txBody>
+                    <a:bodyPr/>
+                    <a:lstStyle/>
+                    <a:p>
+                      <a:endParaRPr lang="en-US" dirty="0"/>
+                    </a:p>
+                  </a:txBody>
+                  <a:tcPr>
+                    <a:lnB w="12700" cap="flat" cmpd="sng" algn="ctr">
+                      <a:solidFill>
+                        <a:schemeClr val="tx1"/>
+                      </a:solidFill>
+                      <a:prstDash val="solid"/>
+                      <a:round/>
+                      <a:headEnd type="none" w="med" len="med"/>
+                      <a:tailEnd type="none" w="med" len="med"/>
+                    </a:lnB>
+                  </a:tcPr>
+                </a:tc>
+                <a:tc>
+                  <a:txBody>
+                    <a:bodyPr/>
+                    <a:lstStyle/>
+                    <a:p>
+                      <a:endParaRPr lang="en-US" dirty="0"/>
+                    </a:p>
+                  </a:txBody>
+                  <a:tcPr>
+                    <a:lnR w="12700" cap="flat" cmpd="sng" algn="ctr">
+                      <a:solidFill>
+                        <a:schemeClr val="tx1"/>
+                      </a:solidFill>
+                      <a:prstDash val="solid"/>
+                      <a:round/>
+                      <a:headEnd type="none" w="med" len="med"/>
+                      <a:tailEnd type="none" w="med" len="med"/>
+                    </a:lnR>
+                    <a:lnB w="12700" cap="flat" cmpd="sng" algn="ctr">
+                      <a:solidFill>
+                        <a:schemeClr val="tx1"/>
+                      </a:solidFill>
+                      <a:prstDash val="solid"/>
+                      <a:round/>
+                      <a:headEnd type="none" w="med" len="med"/>
+                      <a:tailEnd type="none" w="med" len="med"/>
+                    </a:lnB>
+                  </a:tcPr>
+                </a:tc>
+                <a:tc>
+                  <a:txBody>
+                    <a:bodyPr/>
+                    <a:lstStyle/>
+                    <a:p>
+                      <a:endParaRPr lang="en-US" dirty="0"/>
+                    </a:p>
+                  </a:txBody>
+                  <a:tcPr>
+                    <a:lnL w="12700" cap="flat" cmpd="sng" algn="ctr">
+                      <a:solidFill>
+                        <a:schemeClr val="tx1"/>
+                      </a:solidFill>
+                      <a:prstDash val="solid"/>
+                      <a:round/>
+                      <a:headEnd type="none" w="med" len="med"/>
+                      <a:tailEnd type="none" w="med" len="med"/>
+                    </a:lnL>
+                    <a:lnR w="12700" cmpd="sng">
+                      <a:noFill/>
+                    </a:lnR>
+                    <a:lnT w="12700" cap="flat" cmpd="sng" algn="ctr">
+                      <a:solidFill>
+                        <a:schemeClr val="tx1"/>
+                      </a:solidFill>
+                      <a:prstDash val="solid"/>
+                      <a:round/>
+                      <a:headEnd type="none" w="med" len="med"/>
+                      <a:tailEnd type="none" w="med" len="med"/>
+                    </a:lnT>
+                    <a:lnB w="12700" cap="flat" cmpd="sng" algn="ctr">
+                      <a:noFill/>
+                      <a:prstDash val="solid"/>
+                      <a:round/>
+                      <a:headEnd type="none" w="med" len="med"/>
+                      <a:tailEnd type="none" w="med" len="med"/>
+                    </a:lnB>
+                    <a:lnTlToBr w="12700" cmpd="sng">
+                      <a:noFill/>
+                      <a:prstDash val="solid"/>
+                    </a:lnTlToBr>
+                    <a:lnBlToTr w="12700" cmpd="sng">
+                      <a:noFill/>
+                      <a:prstDash val="solid"/>
+                    </a:lnBlToTr>
+                  </a:tcPr>
+                </a:tc>
+                <a:tc>
+                  <a:txBody>
+                    <a:bodyPr/>
+                    <a:lstStyle/>
+                    <a:p>
+                      <a:endParaRPr lang="en-US" dirty="0"/>
+                    </a:p>
+                  </a:txBody>
+                  <a:tcPr>
+                    <a:lnL w="12700" cmpd="sng">
+                      <a:noFill/>
+                    </a:lnL>
+                    <a:lnR w="12700" cap="flat" cmpd="sng" algn="ctr">
+                      <a:solidFill>
+                        <a:schemeClr val="tx1"/>
+                      </a:solidFill>
+                      <a:prstDash val="solid"/>
+                      <a:round/>
+                      <a:headEnd type="none" w="med" len="med"/>
+                      <a:tailEnd type="none" w="med" len="med"/>
+                    </a:lnR>
+                    <a:lnT w="12700" cap="flat" cmpd="sng" algn="ctr">
+                      <a:solidFill>
+                        <a:schemeClr val="tx1"/>
+                      </a:solidFill>
+                      <a:prstDash val="solid"/>
+                      <a:round/>
+                      <a:headEnd type="none" w="med" len="med"/>
+                      <a:tailEnd type="none" w="med" len="med"/>
+                    </a:lnT>
+                    <a:lnB w="12700" cap="flat" cmpd="sng" algn="ctr">
+                      <a:noFill/>
+                      <a:prstDash val="solid"/>
+                      <a:round/>
+                      <a:headEnd type="none" w="med" len="med"/>
+                      <a:tailEnd type="none" w="med" len="med"/>
+                    </a:lnB>
+                    <a:lnTlToBr w="12700" cmpd="sng">
+                      <a:noFill/>
+                      <a:prstDash val="solid"/>
+                    </a:lnTlToBr>
+                    <a:lnBlToTr w="12700" cmpd="sng">
+                      <a:noFill/>
+                      <a:prstDash val="solid"/>
+                    </a:lnBlToTr>
+                  </a:tcPr>
+                </a:tc>
+                <a:tc>
+                  <a:txBody>
+                    <a:bodyPr/>
+                    <a:lstStyle/>
+                    <a:p>
+                      <a:endParaRPr lang="en-US"/>
+                    </a:p>
+                  </a:txBody>
+                  <a:tcPr>
+                    <a:lnL w="12700" cap="flat" cmpd="sng" algn="ctr">
+                      <a:solidFill>
+                        <a:schemeClr val="tx1"/>
+                      </a:solidFill>
+                      <a:prstDash val="solid"/>
+                      <a:round/>
+                      <a:headEnd type="none" w="med" len="med"/>
+                      <a:tailEnd type="none" w="med" len="med"/>
+                    </a:lnL>
+                    <a:lnB w="12700" cap="flat" cmpd="sng" algn="ctr">
+                      <a:solidFill>
+                        <a:schemeClr val="tx1"/>
+                      </a:solidFill>
+                      <a:prstDash val="solid"/>
+                      <a:round/>
+                      <a:headEnd type="none" w="med" len="med"/>
+                      <a:tailEnd type="none" w="med" len="med"/>
+                    </a:lnB>
+                  </a:tcPr>
+                </a:tc>
+                <a:tc>
+                  <a:txBody>
+                    <a:bodyPr/>
+                    <a:lstStyle/>
+                    <a:p>
+                      <a:endParaRPr lang="en-US" dirty="0"/>
+                    </a:p>
+                  </a:txBody>
+                  <a:tcPr>
+                    <a:lnB w="12700" cap="flat" cmpd="sng" algn="ctr">
+                      <a:solidFill>
+                        <a:schemeClr val="tx1"/>
+                      </a:solidFill>
+                      <a:prstDash val="solid"/>
+                      <a:round/>
+                      <a:headEnd type="none" w="med" len="med"/>
+                      <a:tailEnd type="none" w="med" len="med"/>
+                    </a:lnB>
+                  </a:tcPr>
+                </a:tc>
+                <a:extLst>
+                  <a:ext uri="{0D108BD9-81ED-4DB2-BD59-A6C34878D82A}">
+                    <a16:rowId xmlns:a16="http://schemas.microsoft.com/office/drawing/2014/main" val="1632319378"/>
+                  </a:ext>
+                </a:extLst>
+              </a:tr>
+              <a:tr h="677334">
+                <a:tc>
+                  <a:txBody>
+                    <a:bodyPr/>
+                    <a:lstStyle/>
+                    <a:p>
+                      <a:endParaRPr lang="en-US" dirty="0"/>
+                    </a:p>
+                  </a:txBody>
+                  <a:tcPr>
+                    <a:lnL w="12700" cmpd="sng">
+                      <a:noFill/>
+                    </a:lnL>
+                    <a:lnR w="12700" cap="flat" cmpd="sng" algn="ctr">
+                      <a:noFill/>
+                      <a:prstDash val="solid"/>
+                      <a:round/>
+                      <a:headEnd type="none" w="med" len="med"/>
+                      <a:tailEnd type="none" w="med" len="med"/>
+                    </a:lnR>
+                    <a:lnT w="12700" cmpd="sng">
+                      <a:noFill/>
+                    </a:lnT>
+                    <a:lnB w="12700" cmpd="sng">
+                      <a:noFill/>
+                    </a:lnB>
+                    <a:lnTlToBr w="12700" cmpd="sng">
+                      <a:noFill/>
+                      <a:prstDash val="solid"/>
+                    </a:lnTlToBr>
+                    <a:lnBlToTr w="12700" cmpd="sng">
+                      <a:noFill/>
+                      <a:prstDash val="solid"/>
+                    </a:lnBlToTr>
+                  </a:tcPr>
+                </a:tc>
+                <a:tc>
+                  <a:txBody>
+                    <a:bodyPr/>
+                    <a:lstStyle/>
+                    <a:p>
+                      <a:pPr algn="ctr"/>
+                      <a:r>
+                        <a:rPr lang="en-US" sz="3600" dirty="0"/>
+                        <a:t>1</a:t>
+                      </a:r>
+                    </a:p>
+                  </a:txBody>
+                  <a:tcPr>
+                    <a:lnL w="12700" cap="flat" cmpd="sng" algn="ctr">
+                      <a:noFill/>
+                      <a:prstDash val="solid"/>
+                      <a:round/>
+                      <a:headEnd type="none" w="med" len="med"/>
+                      <a:tailEnd type="none" w="med" len="med"/>
+                    </a:lnL>
+                    <a:lnR w="12700" cmpd="sng">
+                      <a:noFill/>
+                    </a:lnR>
+                    <a:lnT w="12700" cap="flat" cmpd="sng" algn="ctr">
+                      <a:solidFill>
+                        <a:schemeClr val="tx1"/>
+                      </a:solidFill>
+                      <a:prstDash val="solid"/>
+                      <a:round/>
+                      <a:headEnd type="none" w="med" len="med"/>
+                      <a:tailEnd type="none" w="med" len="med"/>
+                    </a:lnT>
+                    <a:lnB w="12700" cmpd="sng">
+                      <a:noFill/>
+                    </a:lnB>
+                    <a:lnTlToBr w="12700" cmpd="sng">
+                      <a:noFill/>
+                      <a:prstDash val="solid"/>
+                    </a:lnTlToBr>
+                    <a:lnBlToTr w="12700" cmpd="sng">
+                      <a:noFill/>
+                      <a:prstDash val="solid"/>
+                    </a:lnBlToTr>
+                  </a:tcPr>
+                </a:tc>
+                <a:tc>
+                  <a:txBody>
+                    <a:bodyPr/>
+                    <a:lstStyle/>
+                    <a:p>
+                      <a:pPr algn="ctr"/>
+                      <a:r>
+                        <a:rPr lang="en-US" sz="3600" dirty="0"/>
+                        <a:t>2</a:t>
+                      </a:r>
+                    </a:p>
+                  </a:txBody>
+                  <a:tcPr>
+                    <a:lnL w="12700" cmpd="sng">
+                      <a:noFill/>
+                    </a:lnL>
+                    <a:lnR w="12700" cmpd="sng">
+                      <a:noFill/>
+                    </a:lnR>
+                    <a:lnT w="12700" cap="flat" cmpd="sng" algn="ctr">
+                      <a:solidFill>
+                        <a:schemeClr val="tx1"/>
+                      </a:solidFill>
+                      <a:prstDash val="solid"/>
+                      <a:round/>
+                      <a:headEnd type="none" w="med" len="med"/>
+                      <a:tailEnd type="none" w="med" len="med"/>
+                    </a:lnT>
+                    <a:lnB w="12700" cmpd="sng">
+                      <a:noFill/>
+                    </a:lnB>
+                    <a:lnTlToBr w="12700" cmpd="sng">
+                      <a:noFill/>
+                      <a:prstDash val="solid"/>
+                    </a:lnTlToBr>
+                    <a:lnBlToTr w="12700" cmpd="sng">
+                      <a:noFill/>
+                      <a:prstDash val="solid"/>
+                    </a:lnBlToTr>
+                  </a:tcPr>
+                </a:tc>
+                <a:tc>
+                  <a:txBody>
+                    <a:bodyPr/>
+                    <a:lstStyle/>
+                    <a:p>
+                      <a:pPr algn="ctr"/>
+                      <a:r>
+                        <a:rPr lang="en-US" sz="3600" dirty="0"/>
+                        <a:t>3</a:t>
+                      </a:r>
+                    </a:p>
+                  </a:txBody>
+                  <a:tcPr>
+                    <a:lnL w="12700" cmpd="sng">
+                      <a:noFill/>
+                    </a:lnL>
+                    <a:lnR w="12700" cmpd="sng">
+                      <a:noFill/>
+                    </a:lnR>
+                    <a:lnT w="12700" cap="flat" cmpd="sng" algn="ctr">
+                      <a:solidFill>
+                        <a:schemeClr val="tx1"/>
+                      </a:solidFill>
+                      <a:prstDash val="solid"/>
+                      <a:round/>
+                      <a:headEnd type="none" w="med" len="med"/>
+                      <a:tailEnd type="none" w="med" len="med"/>
+                    </a:lnT>
+                    <a:lnB w="12700" cmpd="sng">
+                      <a:noFill/>
+                    </a:lnB>
+                    <a:lnTlToBr w="12700" cmpd="sng">
+                      <a:noFill/>
+                      <a:prstDash val="solid"/>
+                    </a:lnTlToBr>
+                    <a:lnBlToTr w="12700" cmpd="sng">
+                      <a:noFill/>
+                      <a:prstDash val="solid"/>
+                    </a:lnBlToTr>
+                  </a:tcPr>
+                </a:tc>
+                <a:tc>
+                  <a:txBody>
+                    <a:bodyPr/>
+                    <a:lstStyle/>
+                    <a:p>
+                      <a:pPr algn="ctr"/>
+                      <a:r>
+                        <a:rPr lang="en-US" sz="3600" dirty="0"/>
+                        <a:t>4</a:t>
+                      </a:r>
+                    </a:p>
+                  </a:txBody>
+                  <a:tcPr>
+                    <a:lnL w="12700" cmpd="sng">
+                      <a:noFill/>
+                    </a:lnL>
+                    <a:lnR w="12700" cap="flat" cmpd="sng" algn="ctr">
+                      <a:noFill/>
+                      <a:prstDash val="solid"/>
+                      <a:round/>
+                      <a:headEnd type="none" w="med" len="med"/>
+                      <a:tailEnd type="none" w="med" len="med"/>
+                    </a:lnR>
+                    <a:lnT w="12700" cap="flat" cmpd="sng" algn="ctr">
+                      <a:solidFill>
+                        <a:schemeClr val="tx1"/>
+                      </a:solidFill>
+                      <a:prstDash val="solid"/>
+                      <a:round/>
+                      <a:headEnd type="none" w="med" len="med"/>
+                      <a:tailEnd type="none" w="med" len="med"/>
+                    </a:lnT>
+                    <a:lnB w="12700" cmpd="sng">
+                      <a:noFill/>
+                    </a:lnB>
+                    <a:lnTlToBr w="12700" cmpd="sng">
+                      <a:noFill/>
+                      <a:prstDash val="solid"/>
+                    </a:lnTlToBr>
+                    <a:lnBlToTr w="12700" cmpd="sng">
+                      <a:noFill/>
+                      <a:prstDash val="solid"/>
+                    </a:lnBlToTr>
+                  </a:tcPr>
+                </a:tc>
+                <a:tc>
+                  <a:txBody>
+                    <a:bodyPr/>
+                    <a:lstStyle/>
+                    <a:p>
+                      <a:pPr algn="ctr"/>
+                      <a:r>
+                        <a:rPr lang="en-US" sz="3600" dirty="0"/>
+                        <a:t>5</a:t>
+                      </a:r>
+                    </a:p>
+                  </a:txBody>
+                  <a:tcPr>
+                    <a:lnL w="12700" cap="flat" cmpd="sng" algn="ctr">
+                      <a:noFill/>
+                      <a:prstDash val="solid"/>
+                      <a:round/>
+                      <a:headEnd type="none" w="med" len="med"/>
+                      <a:tailEnd type="none" w="med" len="med"/>
+                    </a:lnL>
+                    <a:lnR w="12700" cmpd="sng">
+                      <a:noFill/>
+                    </a:lnR>
+                    <a:lnT w="12700" cap="flat" cmpd="sng" algn="ctr">
+                      <a:noFill/>
+                      <a:prstDash val="solid"/>
+                      <a:round/>
+                      <a:headEnd type="none" w="med" len="med"/>
+                      <a:tailEnd type="none" w="med" len="med"/>
+                    </a:lnT>
+                    <a:lnB w="12700" cap="flat" cmpd="sng" algn="ctr">
+                      <a:noFill/>
+                      <a:prstDash val="solid"/>
+                      <a:round/>
+                      <a:headEnd type="none" w="med" len="med"/>
+                      <a:tailEnd type="none" w="med" len="med"/>
+                    </a:lnB>
+                    <a:lnTlToBr w="12700" cmpd="sng">
+                      <a:noFill/>
+                      <a:prstDash val="solid"/>
+                    </a:lnTlToBr>
+                    <a:lnBlToTr w="12700" cmpd="sng">
+                      <a:noFill/>
+                      <a:prstDash val="solid"/>
+                    </a:lnBlToTr>
+                  </a:tcPr>
+                </a:tc>
+                <a:tc>
+                  <a:txBody>
+                    <a:bodyPr/>
+                    <a:lstStyle/>
+                    <a:p>
+                      <a:pPr algn="ctr"/>
+                      <a:r>
+                        <a:rPr lang="en-US" sz="3600" dirty="0"/>
+                        <a:t>6</a:t>
+                      </a:r>
+                    </a:p>
+                  </a:txBody>
+                  <a:tcPr>
+                    <a:lnL w="12700" cmpd="sng">
+                      <a:noFill/>
+                    </a:lnL>
+                    <a:lnR w="12700" cap="flat" cmpd="sng" algn="ctr">
+                      <a:noFill/>
+                      <a:prstDash val="solid"/>
+                      <a:round/>
+                      <a:headEnd type="none" w="med" len="med"/>
+                      <a:tailEnd type="none" w="med" len="med"/>
+                    </a:lnR>
+                    <a:lnT w="12700" cap="flat" cmpd="sng" algn="ctr">
+                      <a:noFill/>
+                      <a:prstDash val="solid"/>
+                      <a:round/>
+                      <a:headEnd type="none" w="med" len="med"/>
+                      <a:tailEnd type="none" w="med" len="med"/>
+                    </a:lnT>
+                    <a:lnB w="12700" cap="flat" cmpd="sng" algn="ctr">
+                      <a:noFill/>
+                      <a:prstDash val="solid"/>
+                      <a:round/>
+                      <a:headEnd type="none" w="med" len="med"/>
+                      <a:tailEnd type="none" w="med" len="med"/>
+                    </a:lnB>
+                    <a:lnTlToBr w="12700" cmpd="sng">
+                      <a:noFill/>
+                      <a:prstDash val="solid"/>
+                    </a:lnTlToBr>
+                    <a:lnBlToTr w="12700" cmpd="sng">
+                      <a:noFill/>
+                      <a:prstDash val="solid"/>
+                    </a:lnBlToTr>
+                  </a:tcPr>
+                </a:tc>
+                <a:tc>
+                  <a:txBody>
+                    <a:bodyPr/>
+                    <a:lstStyle/>
+                    <a:p>
+                      <a:pPr algn="ctr"/>
+                      <a:r>
+                        <a:rPr lang="en-US" sz="3600" dirty="0"/>
+                        <a:t>7</a:t>
+                      </a:r>
+                    </a:p>
+                  </a:txBody>
+                  <a:tcPr>
+                    <a:lnL w="12700" cap="flat" cmpd="sng" algn="ctr">
+                      <a:noFill/>
+                      <a:prstDash val="solid"/>
+                      <a:round/>
+                      <a:headEnd type="none" w="med" len="med"/>
+                      <a:tailEnd type="none" w="med" len="med"/>
+                    </a:lnL>
+                    <a:lnR w="12700" cmpd="sng">
+                      <a:noFill/>
+                    </a:lnR>
+                    <a:lnT w="12700" cap="flat" cmpd="sng" algn="ctr">
+                      <a:solidFill>
+                        <a:schemeClr val="tx1"/>
+                      </a:solidFill>
+                      <a:prstDash val="solid"/>
+                      <a:round/>
+                      <a:headEnd type="none" w="med" len="med"/>
+                      <a:tailEnd type="none" w="med" len="med"/>
+                    </a:lnT>
+                    <a:lnB w="12700" cmpd="sng">
+                      <a:noFill/>
+                    </a:lnB>
+                    <a:lnTlToBr w="12700" cmpd="sng">
+                      <a:noFill/>
+                      <a:prstDash val="solid"/>
+                    </a:lnTlToBr>
+                    <a:lnBlToTr w="12700" cmpd="sng">
+                      <a:noFill/>
+                      <a:prstDash val="solid"/>
+                    </a:lnBlToTr>
+                  </a:tcPr>
+                </a:tc>
+                <a:tc>
+                  <a:txBody>
+                    <a:bodyPr/>
+                    <a:lstStyle/>
+                    <a:p>
+                      <a:pPr algn="ctr"/>
+                      <a:r>
+                        <a:rPr lang="en-US" sz="3600" dirty="0"/>
+                        <a:t>8</a:t>
+                      </a:r>
+                    </a:p>
+                  </a:txBody>
+                  <a:tcPr>
+                    <a:lnL w="12700" cmpd="sng">
+                      <a:noFill/>
+                    </a:lnL>
+                    <a:lnR w="12700" cmpd="sng">
+                      <a:noFill/>
+                    </a:lnR>
+                    <a:lnT w="12700" cap="flat" cmpd="sng" algn="ctr">
+                      <a:solidFill>
+                        <a:schemeClr val="tx1"/>
+                      </a:solidFill>
+                      <a:prstDash val="solid"/>
+                      <a:round/>
+                      <a:headEnd type="none" w="med" len="med"/>
+                      <a:tailEnd type="none" w="med" len="med"/>
+                    </a:lnT>
+                    <a:lnB w="12700" cmpd="sng">
+                      <a:noFill/>
+                    </a:lnB>
+                    <a:lnTlToBr w="12700" cmpd="sng">
+                      <a:noFill/>
+                      <a:prstDash val="solid"/>
+                    </a:lnTlToBr>
+                    <a:lnBlToTr w="12700" cmpd="sng">
+                      <a:noFill/>
+                      <a:prstDash val="solid"/>
+                    </a:lnBlToTr>
+                  </a:tcPr>
+                </a:tc>
+                <a:extLst>
+                  <a:ext uri="{0D108BD9-81ED-4DB2-BD59-A6C34878D82A}">
+                    <a16:rowId xmlns:a16="http://schemas.microsoft.com/office/drawing/2014/main" val="461059762"/>
+                  </a:ext>
+                </a:extLst>
+              </a:tr>
+            </a:tbl>
+          </a:graphicData>
+        </a:graphic>
+      </p:graphicFrame>
+      <p:sp>
+        <p:nvSpPr>
+          <p:cNvPr id="5" name="Star: 5 Points 4">
+            <a:extLst>
+              <a:ext uri="{FF2B5EF4-FFF2-40B4-BE49-F238E27FC236}">
+                <a16:creationId xmlns:a16="http://schemas.microsoft.com/office/drawing/2014/main" id="{47FB9592-3A69-4BD7-A514-EE98B4719CE3}"/>
+              </a:ext>
+            </a:extLst>
+          </p:cNvPr>
+          <p:cNvSpPr/>
+          <p:nvPr/>
+        </p:nvSpPr>
+        <p:spPr>
+          <a:xfrm>
+            <a:off x="5799714" y="2633468"/>
+            <a:ext cx="458972" cy="369059"/>
+          </a:xfrm>
+          <a:prstGeom prst="star5">
+            <a:avLst/>
+          </a:prstGeom>
+          <a:solidFill>
+            <a:schemeClr val="tx1"/>
+          </a:solidFill>
+        </p:spPr>
+        <p:style>
+          <a:lnRef idx="2">
+            <a:schemeClr val="accent1">
+              <a:shade val="50000"/>
+            </a:schemeClr>
+          </a:lnRef>
+          <a:fillRef idx="1">
+            <a:schemeClr val="accent1"/>
+          </a:fillRef>
+          <a:effectRef idx="0">
+            <a:schemeClr val="accent1"/>
+          </a:effectRef>
+          <a:fontRef idx="minor">
+            <a:schemeClr val="lt1"/>
+          </a:fontRef>
+        </p:style>
+        <p:txBody>
+          <a:bodyPr rtlCol="0" anchor="ctr"/>
+          <a:lstStyle/>
+          <a:p>
+            <a:pPr algn="ctr"/>
+            <a:endParaRPr lang="en-US"/>
+          </a:p>
+        </p:txBody>
+      </p:sp>
+      <p:sp>
+        <p:nvSpPr>
+          <p:cNvPr id="6" name="Star: 5 Points 5">
+            <a:extLst>
+              <a:ext uri="{FF2B5EF4-FFF2-40B4-BE49-F238E27FC236}">
+                <a16:creationId xmlns:a16="http://schemas.microsoft.com/office/drawing/2014/main" id="{3C7BF510-9798-4848-86EE-F1F72E211F76}"/>
+              </a:ext>
+            </a:extLst>
+          </p:cNvPr>
+          <p:cNvSpPr/>
+          <p:nvPr/>
+        </p:nvSpPr>
+        <p:spPr>
+          <a:xfrm>
+            <a:off x="3466163" y="1895059"/>
+            <a:ext cx="458972" cy="369059"/>
+          </a:xfrm>
+          <a:prstGeom prst="star5">
+            <a:avLst/>
+          </a:prstGeom>
+          <a:solidFill>
+            <a:schemeClr val="tx1"/>
+          </a:solidFill>
+        </p:spPr>
+        <p:style>
+          <a:lnRef idx="2">
+            <a:schemeClr val="accent1">
+              <a:shade val="50000"/>
+            </a:schemeClr>
+          </a:lnRef>
+          <a:fillRef idx="1">
+            <a:schemeClr val="accent1"/>
+          </a:fillRef>
+          <a:effectRef idx="0">
+            <a:schemeClr val="accent1"/>
+          </a:effectRef>
+          <a:fontRef idx="minor">
+            <a:schemeClr val="lt1"/>
+          </a:fontRef>
+        </p:style>
+        <p:txBody>
+          <a:bodyPr rtlCol="0" anchor="ctr"/>
+          <a:lstStyle/>
+          <a:p>
+            <a:pPr algn="ctr"/>
+            <a:endParaRPr lang="en-US"/>
+          </a:p>
+        </p:txBody>
+      </p:sp>
+      <p:sp>
+        <p:nvSpPr>
+          <p:cNvPr id="7" name="Star: 5 Points 6">
+            <a:extLst>
+              <a:ext uri="{FF2B5EF4-FFF2-40B4-BE49-F238E27FC236}">
+                <a16:creationId xmlns:a16="http://schemas.microsoft.com/office/drawing/2014/main" id="{9CB2FA0B-8EC8-4D56-9DCC-44839EAC13D0}"/>
+              </a:ext>
+            </a:extLst>
+          </p:cNvPr>
+          <p:cNvSpPr/>
+          <p:nvPr/>
+        </p:nvSpPr>
+        <p:spPr>
+          <a:xfrm>
+            <a:off x="3466163" y="3360425"/>
+            <a:ext cx="458972" cy="369059"/>
+          </a:xfrm>
+          <a:prstGeom prst="star5">
+            <a:avLst/>
+          </a:prstGeom>
+          <a:solidFill>
+            <a:schemeClr val="tx1"/>
+          </a:solidFill>
+        </p:spPr>
+        <p:style>
+          <a:lnRef idx="2">
+            <a:schemeClr val="accent1">
+              <a:shade val="50000"/>
+            </a:schemeClr>
+          </a:lnRef>
+          <a:fillRef idx="1">
+            <a:schemeClr val="accent1"/>
+          </a:fillRef>
+          <a:effectRef idx="0">
+            <a:schemeClr val="accent1"/>
+          </a:effectRef>
+          <a:fontRef idx="minor">
+            <a:schemeClr val="lt1"/>
+          </a:fontRef>
+        </p:style>
+        <p:txBody>
+          <a:bodyPr rtlCol="0" anchor="ctr"/>
+          <a:lstStyle/>
+          <a:p>
+            <a:pPr algn="ctr"/>
+            <a:endParaRPr lang="en-US"/>
+          </a:p>
+        </p:txBody>
+      </p:sp>
+      <p:sp>
+        <p:nvSpPr>
+          <p:cNvPr id="8" name="Star: 5 Points 7">
+            <a:extLst>
+              <a:ext uri="{FF2B5EF4-FFF2-40B4-BE49-F238E27FC236}">
+                <a16:creationId xmlns:a16="http://schemas.microsoft.com/office/drawing/2014/main" id="{53C63601-95C9-45B8-8537-20EA6BADDD23}"/>
+              </a:ext>
+            </a:extLst>
+          </p:cNvPr>
+          <p:cNvSpPr/>
+          <p:nvPr/>
+        </p:nvSpPr>
+        <p:spPr>
+          <a:xfrm>
+            <a:off x="8265814" y="1973570"/>
+            <a:ext cx="458972" cy="369059"/>
+          </a:xfrm>
+          <a:prstGeom prst="star5">
+            <a:avLst/>
+          </a:prstGeom>
+          <a:solidFill>
+            <a:schemeClr val="tx1"/>
+          </a:solidFill>
+        </p:spPr>
+        <p:style>
+          <a:lnRef idx="2">
+            <a:schemeClr val="accent1">
+              <a:shade val="50000"/>
+            </a:schemeClr>
+          </a:lnRef>
+          <a:fillRef idx="1">
+            <a:schemeClr val="accent1"/>
+          </a:fillRef>
+          <a:effectRef idx="0">
+            <a:schemeClr val="accent1"/>
+          </a:effectRef>
+          <a:fontRef idx="minor">
+            <a:schemeClr val="lt1"/>
+          </a:fontRef>
+        </p:style>
+        <p:txBody>
+          <a:bodyPr rtlCol="0" anchor="ctr"/>
+          <a:lstStyle/>
+          <a:p>
+            <a:pPr algn="ctr"/>
+            <a:endParaRPr lang="en-US"/>
+          </a:p>
+        </p:txBody>
+      </p:sp>
+      <p:sp>
+        <p:nvSpPr>
+          <p:cNvPr id="9" name="Star: 5 Points 8">
+            <a:extLst>
+              <a:ext uri="{FF2B5EF4-FFF2-40B4-BE49-F238E27FC236}">
+                <a16:creationId xmlns:a16="http://schemas.microsoft.com/office/drawing/2014/main" id="{86FE0F92-3B1A-4AD3-8277-EE1FCE285613}"/>
+              </a:ext>
+            </a:extLst>
+          </p:cNvPr>
+          <p:cNvSpPr/>
+          <p:nvPr/>
+        </p:nvSpPr>
+        <p:spPr>
+          <a:xfrm>
+            <a:off x="8283264" y="3341413"/>
+            <a:ext cx="458972" cy="369059"/>
+          </a:xfrm>
+          <a:prstGeom prst="star5">
+            <a:avLst/>
+          </a:prstGeom>
+          <a:solidFill>
+            <a:schemeClr val="tx1"/>
+          </a:solidFill>
+        </p:spPr>
+        <p:style>
+          <a:lnRef idx="2">
+            <a:schemeClr val="accent1">
+              <a:shade val="50000"/>
+            </a:schemeClr>
+          </a:lnRef>
+          <a:fillRef idx="1">
+            <a:schemeClr val="accent1"/>
+          </a:fillRef>
+          <a:effectRef idx="0">
+            <a:schemeClr val="accent1"/>
+          </a:effectRef>
+          <a:fontRef idx="minor">
+            <a:schemeClr val="lt1"/>
+          </a:fontRef>
+        </p:style>
+        <p:txBody>
+          <a:bodyPr rtlCol="0" anchor="ctr"/>
+          <a:lstStyle/>
+          <a:p>
+            <a:pPr algn="ctr"/>
+            <a:endParaRPr lang="en-US"/>
+          </a:p>
+        </p:txBody>
+      </p:sp>
+      <p:sp>
+        <p:nvSpPr>
+          <p:cNvPr id="12" name="Oval 11">
+            <a:extLst>
+              <a:ext uri="{FF2B5EF4-FFF2-40B4-BE49-F238E27FC236}">
+                <a16:creationId xmlns:a16="http://schemas.microsoft.com/office/drawing/2014/main" id="{698D9373-77BB-49FF-A7C5-AD27E33B19A6}"/>
+              </a:ext>
+            </a:extLst>
+          </p:cNvPr>
+          <p:cNvSpPr/>
+          <p:nvPr/>
+        </p:nvSpPr>
+        <p:spPr>
+          <a:xfrm>
+            <a:off x="3519403" y="1994450"/>
+            <a:ext cx="311866" cy="285183"/>
+          </a:xfrm>
+          <a:prstGeom prst="ellipse">
+            <a:avLst/>
+          </a:prstGeom>
+          <a:solidFill>
+            <a:srgbClr val="92D050"/>
+          </a:solidFill>
+        </p:spPr>
+        <p:style>
+          <a:lnRef idx="2">
+            <a:schemeClr val="accent1">
+              <a:shade val="50000"/>
+            </a:schemeClr>
+          </a:lnRef>
+          <a:fillRef idx="1">
+            <a:schemeClr val="accent1"/>
+          </a:fillRef>
+          <a:effectRef idx="0">
+            <a:schemeClr val="accent1"/>
+          </a:effectRef>
+          <a:fontRef idx="minor">
+            <a:schemeClr val="lt1"/>
+          </a:fontRef>
+        </p:style>
+        <p:txBody>
+          <a:bodyPr rtlCol="0" anchor="ctr"/>
+          <a:lstStyle/>
+          <a:p>
+            <a:pPr algn="ctr"/>
+            <a:endParaRPr lang="en-US"/>
+          </a:p>
+        </p:txBody>
+      </p:sp>
+      <p:sp>
+        <p:nvSpPr>
+          <p:cNvPr id="39" name="TextBox 38">
+            <a:extLst>
+              <a:ext uri="{FF2B5EF4-FFF2-40B4-BE49-F238E27FC236}">
+                <a16:creationId xmlns:a16="http://schemas.microsoft.com/office/drawing/2014/main" id="{3824B90C-8F9D-4E96-88B6-57AC9F0A9A4F}"/>
+              </a:ext>
+            </a:extLst>
+          </p:cNvPr>
+          <p:cNvSpPr txBox="1"/>
+          <p:nvPr/>
+        </p:nvSpPr>
+        <p:spPr>
+          <a:xfrm>
+            <a:off x="6461714" y="1973297"/>
+            <a:ext cx="615879" cy="369332"/>
+          </a:xfrm>
+          <a:prstGeom prst="rect">
+            <a:avLst/>
+          </a:prstGeom>
+          <a:noFill/>
+        </p:spPr>
+        <p:txBody>
+          <a:bodyPr wrap="square" rtlCol="0">
+            <a:spAutoFit/>
+          </a:bodyPr>
+          <a:lstStyle/>
+          <a:p>
+            <a:r>
+              <a:rPr lang="en-US" dirty="0"/>
+              <a:t>start</a:t>
+            </a:r>
+          </a:p>
+        </p:txBody>
+      </p:sp>
+      <p:sp>
+        <p:nvSpPr>
+          <p:cNvPr id="40" name="TextBox 39">
+            <a:extLst>
+              <a:ext uri="{FF2B5EF4-FFF2-40B4-BE49-F238E27FC236}">
+                <a16:creationId xmlns:a16="http://schemas.microsoft.com/office/drawing/2014/main" id="{CB68968B-51E0-4C1E-B9E7-BD620F90E6D6}"/>
+              </a:ext>
+            </a:extLst>
+          </p:cNvPr>
+          <p:cNvSpPr txBox="1"/>
+          <p:nvPr/>
+        </p:nvSpPr>
+        <p:spPr>
+          <a:xfrm>
+            <a:off x="6470924" y="3360425"/>
+            <a:ext cx="615879" cy="369332"/>
+          </a:xfrm>
+          <a:prstGeom prst="rect">
+            <a:avLst/>
+          </a:prstGeom>
+          <a:noFill/>
+        </p:spPr>
+        <p:txBody>
+          <a:bodyPr wrap="square" rtlCol="0">
+            <a:spAutoFit/>
+          </a:bodyPr>
+          <a:lstStyle/>
+          <a:p>
+            <a:r>
+              <a:rPr lang="en-US" dirty="0"/>
+              <a:t>start</a:t>
+            </a:r>
+          </a:p>
+        </p:txBody>
+      </p:sp>
+      <p:sp>
+        <p:nvSpPr>
+          <p:cNvPr id="41" name="TextBox 40">
+            <a:extLst>
+              <a:ext uri="{FF2B5EF4-FFF2-40B4-BE49-F238E27FC236}">
+                <a16:creationId xmlns:a16="http://schemas.microsoft.com/office/drawing/2014/main" id="{B06D0491-D555-47E5-8676-229BBA8D9BA0}"/>
+              </a:ext>
+            </a:extLst>
+          </p:cNvPr>
+          <p:cNvSpPr txBox="1"/>
+          <p:nvPr/>
+        </p:nvSpPr>
+        <p:spPr>
+          <a:xfrm>
+            <a:off x="7575990" y="3342279"/>
+            <a:ext cx="615879" cy="369332"/>
+          </a:xfrm>
+          <a:prstGeom prst="rect">
+            <a:avLst/>
+          </a:prstGeom>
+          <a:noFill/>
+        </p:spPr>
+        <p:txBody>
+          <a:bodyPr wrap="square" rtlCol="0">
+            <a:spAutoFit/>
+          </a:bodyPr>
+          <a:lstStyle/>
+          <a:p>
+            <a:r>
+              <a:rPr lang="en-US" dirty="0"/>
+              <a:t>end</a:t>
+            </a:r>
+          </a:p>
+        </p:txBody>
+      </p:sp>
+      <p:sp>
+        <p:nvSpPr>
+          <p:cNvPr id="42" name="TextBox 41">
+            <a:extLst>
+              <a:ext uri="{FF2B5EF4-FFF2-40B4-BE49-F238E27FC236}">
+                <a16:creationId xmlns:a16="http://schemas.microsoft.com/office/drawing/2014/main" id="{E8D7FE4D-B7E0-4F46-8F8C-E97AA9304AD7}"/>
+              </a:ext>
+            </a:extLst>
+          </p:cNvPr>
+          <p:cNvSpPr txBox="1"/>
+          <p:nvPr/>
+        </p:nvSpPr>
+        <p:spPr>
+          <a:xfrm>
+            <a:off x="7599767" y="1973297"/>
+            <a:ext cx="615879" cy="369332"/>
+          </a:xfrm>
+          <a:prstGeom prst="rect">
+            <a:avLst/>
+          </a:prstGeom>
+          <a:noFill/>
+        </p:spPr>
+        <p:txBody>
+          <a:bodyPr wrap="square" rtlCol="0">
+            <a:spAutoFit/>
+          </a:bodyPr>
+          <a:lstStyle/>
+          <a:p>
+            <a:r>
+              <a:rPr lang="en-US" dirty="0"/>
+              <a:t>end</a:t>
+            </a:r>
+          </a:p>
+        </p:txBody>
+      </p:sp>
+      <p:sp>
+        <p:nvSpPr>
+          <p:cNvPr id="43" name="Oval 42">
+            <a:extLst>
+              <a:ext uri="{FF2B5EF4-FFF2-40B4-BE49-F238E27FC236}">
+                <a16:creationId xmlns:a16="http://schemas.microsoft.com/office/drawing/2014/main" id="{72E681AF-8840-45B3-8F77-D75D2A77D2C4}"/>
+              </a:ext>
+            </a:extLst>
+          </p:cNvPr>
+          <p:cNvSpPr/>
+          <p:nvPr/>
+        </p:nvSpPr>
+        <p:spPr>
+          <a:xfrm>
+            <a:off x="3541601" y="2717344"/>
+            <a:ext cx="311866" cy="285183"/>
+          </a:xfrm>
+          <a:prstGeom prst="ellipse">
+            <a:avLst/>
+          </a:prstGeom>
+          <a:solidFill>
+            <a:srgbClr val="FF0000"/>
+          </a:solidFill>
+        </p:spPr>
+        <p:style>
+          <a:lnRef idx="2">
+            <a:schemeClr val="accent1">
+              <a:shade val="50000"/>
+            </a:schemeClr>
+          </a:lnRef>
+          <a:fillRef idx="1">
+            <a:schemeClr val="accent1"/>
+          </a:fillRef>
+          <a:effectRef idx="0">
+            <a:schemeClr val="accent1"/>
+          </a:effectRef>
+          <a:fontRef idx="minor">
+            <a:schemeClr val="lt1"/>
+          </a:fontRef>
+        </p:style>
+        <p:txBody>
+          <a:bodyPr rtlCol="0" anchor="ctr"/>
+          <a:lstStyle/>
+          <a:p>
+            <a:pPr algn="ctr"/>
+            <a:endParaRPr lang="en-US"/>
+          </a:p>
+        </p:txBody>
+      </p:sp>
+      <p:sp>
+        <p:nvSpPr>
+          <p:cNvPr id="28" name="Oval 27">
+            <a:extLst>
+              <a:ext uri="{FF2B5EF4-FFF2-40B4-BE49-F238E27FC236}">
+                <a16:creationId xmlns:a16="http://schemas.microsoft.com/office/drawing/2014/main" id="{1BD75407-5FDA-4799-8B19-6E486C9187C5}"/>
+              </a:ext>
+            </a:extLst>
+          </p:cNvPr>
+          <p:cNvSpPr/>
+          <p:nvPr/>
+        </p:nvSpPr>
+        <p:spPr>
+          <a:xfrm>
+            <a:off x="5152403" y="2694971"/>
+            <a:ext cx="311866" cy="285183"/>
+          </a:xfrm>
+          <a:prstGeom prst="ellipse">
+            <a:avLst/>
+          </a:prstGeom>
+          <a:solidFill>
+            <a:srgbClr val="92D050"/>
+          </a:solidFill>
+        </p:spPr>
+        <p:style>
+          <a:lnRef idx="2">
+            <a:schemeClr val="accent1">
+              <a:shade val="50000"/>
+            </a:schemeClr>
+          </a:lnRef>
+          <a:fillRef idx="1">
+            <a:schemeClr val="accent1"/>
+          </a:fillRef>
+          <a:effectRef idx="0">
+            <a:schemeClr val="accent1"/>
+          </a:effectRef>
+          <a:fontRef idx="minor">
+            <a:schemeClr val="lt1"/>
+          </a:fontRef>
+        </p:style>
+        <p:txBody>
+          <a:bodyPr rtlCol="0" anchor="ctr"/>
+          <a:lstStyle/>
+          <a:p>
+            <a:pPr algn="ctr"/>
+            <a:endParaRPr lang="en-US"/>
+          </a:p>
+        </p:txBody>
+      </p:sp>
+      <p:sp>
+        <p:nvSpPr>
+          <p:cNvPr id="29" name="Oval 28">
+            <a:extLst>
+              <a:ext uri="{FF2B5EF4-FFF2-40B4-BE49-F238E27FC236}">
+                <a16:creationId xmlns:a16="http://schemas.microsoft.com/office/drawing/2014/main" id="{2C5CA71A-1A66-4615-A55A-B6C6B3CD394E}"/>
+              </a:ext>
+            </a:extLst>
+          </p:cNvPr>
+          <p:cNvSpPr/>
+          <p:nvPr/>
+        </p:nvSpPr>
+        <p:spPr>
+          <a:xfrm>
+            <a:off x="6600418" y="1786990"/>
+            <a:ext cx="311866" cy="285183"/>
+          </a:xfrm>
+          <a:prstGeom prst="ellipse">
+            <a:avLst/>
+          </a:prstGeom>
+          <a:solidFill>
+            <a:srgbClr val="92D050"/>
+          </a:solidFill>
+        </p:spPr>
+        <p:style>
+          <a:lnRef idx="2">
+            <a:schemeClr val="accent1">
+              <a:shade val="50000"/>
+            </a:schemeClr>
+          </a:lnRef>
+          <a:fillRef idx="1">
+            <a:schemeClr val="accent1"/>
+          </a:fillRef>
+          <a:effectRef idx="0">
+            <a:schemeClr val="accent1"/>
+          </a:effectRef>
+          <a:fontRef idx="minor">
+            <a:schemeClr val="lt1"/>
+          </a:fontRef>
+        </p:style>
+        <p:txBody>
+          <a:bodyPr rtlCol="0" anchor="ctr"/>
+          <a:lstStyle/>
+          <a:p>
+            <a:pPr algn="ctr"/>
+            <a:endParaRPr lang="en-US"/>
+          </a:p>
+        </p:txBody>
+      </p:sp>
+      <p:sp>
+        <p:nvSpPr>
+          <p:cNvPr id="30" name="Oval 29">
+            <a:extLst>
+              <a:ext uri="{FF2B5EF4-FFF2-40B4-BE49-F238E27FC236}">
+                <a16:creationId xmlns:a16="http://schemas.microsoft.com/office/drawing/2014/main" id="{AAFFB6DF-3C66-4C7C-BF2F-F2B762A916AC}"/>
+              </a:ext>
+            </a:extLst>
+          </p:cNvPr>
+          <p:cNvSpPr/>
+          <p:nvPr/>
+        </p:nvSpPr>
+        <p:spPr>
+          <a:xfrm>
+            <a:off x="9144951" y="2675405"/>
+            <a:ext cx="311866" cy="285183"/>
+          </a:xfrm>
+          <a:prstGeom prst="ellipse">
+            <a:avLst/>
+          </a:prstGeom>
+          <a:solidFill>
+            <a:srgbClr val="92D050"/>
+          </a:solidFill>
+        </p:spPr>
+        <p:style>
+          <a:lnRef idx="2">
+            <a:schemeClr val="accent1">
+              <a:shade val="50000"/>
+            </a:schemeClr>
+          </a:lnRef>
+          <a:fillRef idx="1">
+            <a:schemeClr val="accent1"/>
+          </a:fillRef>
+          <a:effectRef idx="0">
+            <a:schemeClr val="accent1"/>
+          </a:effectRef>
+          <a:fontRef idx="minor">
+            <a:schemeClr val="lt1"/>
+          </a:fontRef>
+        </p:style>
+        <p:txBody>
+          <a:bodyPr rtlCol="0" anchor="ctr"/>
+          <a:lstStyle/>
+          <a:p>
+            <a:pPr algn="ctr"/>
+            <a:endParaRPr lang="en-US"/>
+          </a:p>
+        </p:txBody>
+      </p:sp>
+      <p:sp>
+        <p:nvSpPr>
+          <p:cNvPr id="31" name="Oval 30">
+            <a:extLst>
+              <a:ext uri="{FF2B5EF4-FFF2-40B4-BE49-F238E27FC236}">
+                <a16:creationId xmlns:a16="http://schemas.microsoft.com/office/drawing/2014/main" id="{CBC7CF70-D192-4BC4-AB6F-07FDE52FA121}"/>
+              </a:ext>
+            </a:extLst>
+          </p:cNvPr>
+          <p:cNvSpPr/>
+          <p:nvPr/>
+        </p:nvSpPr>
+        <p:spPr>
+          <a:xfrm>
+            <a:off x="6622930" y="3198821"/>
+            <a:ext cx="311866" cy="285183"/>
+          </a:xfrm>
+          <a:prstGeom prst="ellipse">
+            <a:avLst/>
+          </a:prstGeom>
+          <a:solidFill>
+            <a:srgbClr val="FF0000"/>
+          </a:solidFill>
+        </p:spPr>
+        <p:style>
+          <a:lnRef idx="2">
+            <a:schemeClr val="accent1">
+              <a:shade val="50000"/>
+            </a:schemeClr>
+          </a:lnRef>
+          <a:fillRef idx="1">
+            <a:schemeClr val="accent1"/>
+          </a:fillRef>
+          <a:effectRef idx="0">
+            <a:schemeClr val="accent1"/>
+          </a:effectRef>
+          <a:fontRef idx="minor">
+            <a:schemeClr val="lt1"/>
+          </a:fontRef>
+        </p:style>
+        <p:txBody>
+          <a:bodyPr rtlCol="0" anchor="ctr"/>
+          <a:lstStyle/>
+          <a:p>
+            <a:pPr algn="ctr"/>
+            <a:endParaRPr lang="en-US"/>
+          </a:p>
+        </p:txBody>
+      </p:sp>
+    </p:spTree>
+    <p:extLst>
+      <p:ext uri="{BB962C8B-B14F-4D97-AF65-F5344CB8AC3E}">
+        <p14:creationId xmlns:p14="http://schemas.microsoft.com/office/powerpoint/2010/main" val="2602154724"/>
+      </p:ext>
+    </p:extLst>
+  </p:cSld>
+  <p:clrMapOvr>
+    <a:masterClrMapping/>
+  </p:clrMapOvr>
+</p:sld>
+</file>
+
 <file path=ppt/theme/theme1.xml><?xml version="1.0" encoding="utf-8"?>
 <a:theme xmlns:a="http://schemas.openxmlformats.org/drawingml/2006/main" name="Office Theme">
   <a:themeElements>

</xml_diff>

<commit_message>
[FIX] Updated Strategy move diagrams
</commit_message>
<xml_diff>
--- a/diagrams/game_play.pptx
+++ b/diagrams/game_play.pptx
@@ -11,6 +11,7 @@
     <p:sldId id="258" r:id="rId5"/>
     <p:sldId id="259" r:id="rId6"/>
     <p:sldId id="261" r:id="rId7"/>
+    <p:sldId id="262" r:id="rId8"/>
   </p:sldIdLst>
   <p:sldSz cx="12192000" cy="6858000"/>
   <p:notesSz cx="6858000" cy="9144000"/>
@@ -264,7 +265,7 @@
           <a:p>
             <a:fld id="{A24774F0-CFF4-432D-81EC-80FC546292F2}" type="datetimeFigureOut">
               <a:rPr lang="en-US" smtClean="0"/>
-              <a:t>08-Dec-18</a:t>
+              <a:t>09-Dec-18</a:t>
             </a:fld>
             <a:endParaRPr lang="en-US"/>
           </a:p>
@@ -462,7 +463,7 @@
           <a:p>
             <a:fld id="{A24774F0-CFF4-432D-81EC-80FC546292F2}" type="datetimeFigureOut">
               <a:rPr lang="en-US" smtClean="0"/>
-              <a:t>08-Dec-18</a:t>
+              <a:t>09-Dec-18</a:t>
             </a:fld>
             <a:endParaRPr lang="en-US"/>
           </a:p>
@@ -670,7 +671,7 @@
           <a:p>
             <a:fld id="{A24774F0-CFF4-432D-81EC-80FC546292F2}" type="datetimeFigureOut">
               <a:rPr lang="en-US" smtClean="0"/>
-              <a:t>08-Dec-18</a:t>
+              <a:t>09-Dec-18</a:t>
             </a:fld>
             <a:endParaRPr lang="en-US"/>
           </a:p>
@@ -868,7 +869,7 @@
           <a:p>
             <a:fld id="{A24774F0-CFF4-432D-81EC-80FC546292F2}" type="datetimeFigureOut">
               <a:rPr lang="en-US" smtClean="0"/>
-              <a:t>08-Dec-18</a:t>
+              <a:t>09-Dec-18</a:t>
             </a:fld>
             <a:endParaRPr lang="en-US"/>
           </a:p>
@@ -1143,7 +1144,7 @@
           <a:p>
             <a:fld id="{A24774F0-CFF4-432D-81EC-80FC546292F2}" type="datetimeFigureOut">
               <a:rPr lang="en-US" smtClean="0"/>
-              <a:t>08-Dec-18</a:t>
+              <a:t>09-Dec-18</a:t>
             </a:fld>
             <a:endParaRPr lang="en-US"/>
           </a:p>
@@ -1408,7 +1409,7 @@
           <a:p>
             <a:fld id="{A24774F0-CFF4-432D-81EC-80FC546292F2}" type="datetimeFigureOut">
               <a:rPr lang="en-US" smtClean="0"/>
-              <a:t>08-Dec-18</a:t>
+              <a:t>09-Dec-18</a:t>
             </a:fld>
             <a:endParaRPr lang="en-US"/>
           </a:p>
@@ -1820,7 +1821,7 @@
           <a:p>
             <a:fld id="{A24774F0-CFF4-432D-81EC-80FC546292F2}" type="datetimeFigureOut">
               <a:rPr lang="en-US" smtClean="0"/>
-              <a:t>08-Dec-18</a:t>
+              <a:t>09-Dec-18</a:t>
             </a:fld>
             <a:endParaRPr lang="en-US"/>
           </a:p>
@@ -1961,7 +1962,7 @@
           <a:p>
             <a:fld id="{A24774F0-CFF4-432D-81EC-80FC546292F2}" type="datetimeFigureOut">
               <a:rPr lang="en-US" smtClean="0"/>
-              <a:t>08-Dec-18</a:t>
+              <a:t>09-Dec-18</a:t>
             </a:fld>
             <a:endParaRPr lang="en-US"/>
           </a:p>
@@ -2074,7 +2075,7 @@
           <a:p>
             <a:fld id="{A24774F0-CFF4-432D-81EC-80FC546292F2}" type="datetimeFigureOut">
               <a:rPr lang="en-US" smtClean="0"/>
-              <a:t>08-Dec-18</a:t>
+              <a:t>09-Dec-18</a:t>
             </a:fld>
             <a:endParaRPr lang="en-US"/>
           </a:p>
@@ -2385,7 +2386,7 @@
           <a:p>
             <a:fld id="{A24774F0-CFF4-432D-81EC-80FC546292F2}" type="datetimeFigureOut">
               <a:rPr lang="en-US" smtClean="0"/>
-              <a:t>08-Dec-18</a:t>
+              <a:t>09-Dec-18</a:t>
             </a:fld>
             <a:endParaRPr lang="en-US"/>
           </a:p>
@@ -2673,7 +2674,7 @@
           <a:p>
             <a:fld id="{A24774F0-CFF4-432D-81EC-80FC546292F2}" type="datetimeFigureOut">
               <a:rPr lang="en-US" smtClean="0"/>
-              <a:t>08-Dec-18</a:t>
+              <a:t>09-Dec-18</a:t>
             </a:fld>
             <a:endParaRPr lang="en-US"/>
           </a:p>
@@ -2914,7 +2915,7 @@
           <a:p>
             <a:fld id="{A24774F0-CFF4-432D-81EC-80FC546292F2}" type="datetimeFigureOut">
               <a:rPr lang="en-US" smtClean="0"/>
-              <a:t>08-Dec-18</a:t>
+              <a:t>09-Dec-18</a:t>
             </a:fld>
             <a:endParaRPr lang="en-US"/>
           </a:p>
@@ -18203,10 +18204,2003 @@
           </a:p>
         </p:txBody>
       </p:sp>
+      <p:sp>
+        <p:nvSpPr>
+          <p:cNvPr id="18" name="Oval 17">
+            <a:extLst>
+              <a:ext uri="{FF2B5EF4-FFF2-40B4-BE49-F238E27FC236}">
+                <a16:creationId xmlns:a16="http://schemas.microsoft.com/office/drawing/2014/main" id="{D8511E94-D8AC-419D-83E9-67DE8EF79239}"/>
+              </a:ext>
+            </a:extLst>
+          </p:cNvPr>
+          <p:cNvSpPr/>
+          <p:nvPr/>
+        </p:nvSpPr>
+        <p:spPr>
+          <a:xfrm>
+            <a:off x="6622930" y="2700779"/>
+            <a:ext cx="311866" cy="285183"/>
+          </a:xfrm>
+          <a:prstGeom prst="ellipse">
+            <a:avLst/>
+          </a:prstGeom>
+          <a:solidFill>
+            <a:srgbClr val="FF0000"/>
+          </a:solidFill>
+        </p:spPr>
+        <p:style>
+          <a:lnRef idx="2">
+            <a:schemeClr val="accent1">
+              <a:shade val="50000"/>
+            </a:schemeClr>
+          </a:lnRef>
+          <a:fillRef idx="1">
+            <a:schemeClr val="accent1"/>
+          </a:fillRef>
+          <a:effectRef idx="0">
+            <a:schemeClr val="accent1"/>
+          </a:effectRef>
+          <a:fontRef idx="minor">
+            <a:schemeClr val="lt1"/>
+          </a:fontRef>
+        </p:style>
+        <p:txBody>
+          <a:bodyPr rtlCol="0" anchor="ctr"/>
+          <a:lstStyle/>
+          <a:p>
+            <a:pPr algn="ctr"/>
+            <a:endParaRPr lang="en-US"/>
+          </a:p>
+        </p:txBody>
+      </p:sp>
     </p:spTree>
     <p:extLst>
       <p:ext uri="{BB962C8B-B14F-4D97-AF65-F5344CB8AC3E}">
         <p14:creationId xmlns:p14="http://schemas.microsoft.com/office/powerpoint/2010/main" val="2602154724"/>
+      </p:ext>
+    </p:extLst>
+  </p:cSld>
+  <p:clrMapOvr>
+    <a:masterClrMapping/>
+  </p:clrMapOvr>
+</p:sld>
+</file>
+
+<file path=ppt/slides/slide7.xml><?xml version="1.0" encoding="utf-8"?>
+<p:sld xmlns:a="http://schemas.openxmlformats.org/drawingml/2006/main" xmlns:r="http://schemas.openxmlformats.org/officeDocument/2006/relationships" xmlns:p="http://schemas.openxmlformats.org/presentationml/2006/main">
+  <p:cSld>
+    <p:spTree>
+      <p:nvGrpSpPr>
+        <p:cNvPr id="1" name=""/>
+        <p:cNvGrpSpPr/>
+        <p:nvPr/>
+      </p:nvGrpSpPr>
+      <p:grpSpPr>
+        <a:xfrm>
+          <a:off x="0" y="0"/>
+          <a:ext cx="0" cy="0"/>
+          <a:chOff x="0" y="0"/>
+          <a:chExt cx="0" cy="0"/>
+        </a:xfrm>
+      </p:grpSpPr>
+      <p:graphicFrame>
+        <p:nvGraphicFramePr>
+          <p:cNvPr id="4" name="Table 3">
+            <a:extLst>
+              <a:ext uri="{FF2B5EF4-FFF2-40B4-BE49-F238E27FC236}">
+                <a16:creationId xmlns:a16="http://schemas.microsoft.com/office/drawing/2014/main" id="{A7D061F5-9884-41F4-A2BF-7B8C3F199B97}"/>
+              </a:ext>
+            </a:extLst>
+          </p:cNvPr>
+          <p:cNvGraphicFramePr>
+            <a:graphicFrameLocks noGrp="1"/>
+          </p:cNvGraphicFramePr>
+          <p:nvPr>
+            <p:extLst/>
+          </p:nvPr>
+        </p:nvGraphicFramePr>
+        <p:xfrm>
+          <a:off x="2491407" y="1793089"/>
+          <a:ext cx="7218027" cy="2709336"/>
+        </p:xfrm>
+        <a:graphic>
+          <a:graphicData uri="http://schemas.openxmlformats.org/drawingml/2006/table">
+            <a:tbl>
+              <a:tblPr firstRow="1" bandRow="1">
+                <a:tableStyleId>{5940675A-B579-460E-94D1-54222C63F5DA}</a:tableStyleId>
+              </a:tblPr>
+              <a:tblGrid>
+                <a:gridCol w="802003">
+                  <a:extLst>
+                    <a:ext uri="{9D8B030D-6E8A-4147-A177-3AD203B41FA5}">
+                      <a16:colId xmlns:a16="http://schemas.microsoft.com/office/drawing/2014/main" val="663328804"/>
+                    </a:ext>
+                  </a:extLst>
+                </a:gridCol>
+                <a:gridCol w="802003">
+                  <a:extLst>
+                    <a:ext uri="{9D8B030D-6E8A-4147-A177-3AD203B41FA5}">
+                      <a16:colId xmlns:a16="http://schemas.microsoft.com/office/drawing/2014/main" val="3402578565"/>
+                    </a:ext>
+                  </a:extLst>
+                </a:gridCol>
+                <a:gridCol w="802003">
+                  <a:extLst>
+                    <a:ext uri="{9D8B030D-6E8A-4147-A177-3AD203B41FA5}">
+                      <a16:colId xmlns:a16="http://schemas.microsoft.com/office/drawing/2014/main" val="3655898552"/>
+                    </a:ext>
+                  </a:extLst>
+                </a:gridCol>
+                <a:gridCol w="802003">
+                  <a:extLst>
+                    <a:ext uri="{9D8B030D-6E8A-4147-A177-3AD203B41FA5}">
+                      <a16:colId xmlns:a16="http://schemas.microsoft.com/office/drawing/2014/main" val="4139193611"/>
+                    </a:ext>
+                  </a:extLst>
+                </a:gridCol>
+                <a:gridCol w="802003">
+                  <a:extLst>
+                    <a:ext uri="{9D8B030D-6E8A-4147-A177-3AD203B41FA5}">
+                      <a16:colId xmlns:a16="http://schemas.microsoft.com/office/drawing/2014/main" val="2572578159"/>
+                    </a:ext>
+                  </a:extLst>
+                </a:gridCol>
+                <a:gridCol w="802003">
+                  <a:extLst>
+                    <a:ext uri="{9D8B030D-6E8A-4147-A177-3AD203B41FA5}">
+                      <a16:colId xmlns:a16="http://schemas.microsoft.com/office/drawing/2014/main" val="845486880"/>
+                    </a:ext>
+                  </a:extLst>
+                </a:gridCol>
+                <a:gridCol w="802003">
+                  <a:extLst>
+                    <a:ext uri="{9D8B030D-6E8A-4147-A177-3AD203B41FA5}">
+                      <a16:colId xmlns:a16="http://schemas.microsoft.com/office/drawing/2014/main" val="520765485"/>
+                    </a:ext>
+                  </a:extLst>
+                </a:gridCol>
+                <a:gridCol w="802003">
+                  <a:extLst>
+                    <a:ext uri="{9D8B030D-6E8A-4147-A177-3AD203B41FA5}">
+                      <a16:colId xmlns:a16="http://schemas.microsoft.com/office/drawing/2014/main" val="4200181324"/>
+                    </a:ext>
+                  </a:extLst>
+                </a:gridCol>
+                <a:gridCol w="802003">
+                  <a:extLst>
+                    <a:ext uri="{9D8B030D-6E8A-4147-A177-3AD203B41FA5}">
+                      <a16:colId xmlns:a16="http://schemas.microsoft.com/office/drawing/2014/main" val="3663462352"/>
+                    </a:ext>
+                  </a:extLst>
+                </a:gridCol>
+              </a:tblGrid>
+              <a:tr h="677334">
+                <a:tc>
+                  <a:txBody>
+                    <a:bodyPr/>
+                    <a:lstStyle/>
+                    <a:p>
+                      <a:pPr algn="ctr"/>
+                      <a:r>
+                        <a:rPr lang="en-US" sz="3600" dirty="0"/>
+                        <a:t>a</a:t>
+                      </a:r>
+                    </a:p>
+                  </a:txBody>
+                  <a:tcPr>
+                    <a:lnL w="12700" cmpd="sng">
+                      <a:noFill/>
+                    </a:lnL>
+                    <a:lnR w="12700" cap="flat" cmpd="sng" algn="ctr">
+                      <a:solidFill>
+                        <a:schemeClr val="tx1"/>
+                      </a:solidFill>
+                      <a:prstDash val="solid"/>
+                      <a:round/>
+                      <a:headEnd type="none" w="med" len="med"/>
+                      <a:tailEnd type="none" w="med" len="med"/>
+                    </a:lnR>
+                    <a:lnT w="12700" cmpd="sng">
+                      <a:noFill/>
+                    </a:lnT>
+                    <a:lnB w="12700" cmpd="sng">
+                      <a:noFill/>
+                    </a:lnB>
+                    <a:lnTlToBr w="12700" cmpd="sng">
+                      <a:noFill/>
+                      <a:prstDash val="solid"/>
+                    </a:lnTlToBr>
+                    <a:lnBlToTr w="12700" cmpd="sng">
+                      <a:noFill/>
+                      <a:prstDash val="solid"/>
+                    </a:lnBlToTr>
+                  </a:tcPr>
+                </a:tc>
+                <a:tc>
+                  <a:txBody>
+                    <a:bodyPr/>
+                    <a:lstStyle/>
+                    <a:p>
+                      <a:endParaRPr lang="en-US" dirty="0"/>
+                    </a:p>
+                  </a:txBody>
+                  <a:tcPr>
+                    <a:lnL w="12700" cap="flat" cmpd="sng" algn="ctr">
+                      <a:solidFill>
+                        <a:schemeClr val="tx1"/>
+                      </a:solidFill>
+                      <a:prstDash val="solid"/>
+                      <a:round/>
+                      <a:headEnd type="none" w="med" len="med"/>
+                      <a:tailEnd type="none" w="med" len="med"/>
+                    </a:lnL>
+                  </a:tcPr>
+                </a:tc>
+                <a:tc>
+                  <a:txBody>
+                    <a:bodyPr/>
+                    <a:lstStyle/>
+                    <a:p>
+                      <a:endParaRPr lang="en-US" dirty="0"/>
+                    </a:p>
+                  </a:txBody>
+                  <a:tcPr/>
+                </a:tc>
+                <a:tc>
+                  <a:txBody>
+                    <a:bodyPr/>
+                    <a:lstStyle/>
+                    <a:p>
+                      <a:endParaRPr lang="en-US"/>
+                    </a:p>
+                  </a:txBody>
+                  <a:tcPr/>
+                </a:tc>
+                <a:tc>
+                  <a:txBody>
+                    <a:bodyPr/>
+                    <a:lstStyle/>
+                    <a:p>
+                      <a:endParaRPr lang="en-US" dirty="0"/>
+                    </a:p>
+                  </a:txBody>
+                  <a:tcPr>
+                    <a:lnR w="12700" cap="flat" cmpd="sng" algn="ctr">
+                      <a:solidFill>
+                        <a:schemeClr val="tx1"/>
+                      </a:solidFill>
+                      <a:prstDash val="solid"/>
+                      <a:round/>
+                      <a:headEnd type="none" w="med" len="med"/>
+                      <a:tailEnd type="none" w="med" len="med"/>
+                    </a:lnR>
+                  </a:tcPr>
+                </a:tc>
+                <a:tc>
+                  <a:txBody>
+                    <a:bodyPr/>
+                    <a:lstStyle/>
+                    <a:p>
+                      <a:endParaRPr lang="en-US" dirty="0"/>
+                    </a:p>
+                  </a:txBody>
+                  <a:tcPr>
+                    <a:lnL w="12700" cap="flat" cmpd="sng" algn="ctr">
+                      <a:solidFill>
+                        <a:schemeClr val="tx1"/>
+                      </a:solidFill>
+                      <a:prstDash val="solid"/>
+                      <a:round/>
+                      <a:headEnd type="none" w="med" len="med"/>
+                      <a:tailEnd type="none" w="med" len="med"/>
+                    </a:lnL>
+                    <a:lnR w="12700" cap="flat" cmpd="sng" algn="ctr">
+                      <a:noFill/>
+                      <a:prstDash val="solid"/>
+                      <a:round/>
+                      <a:headEnd type="none" w="med" len="med"/>
+                      <a:tailEnd type="none" w="med" len="med"/>
+                    </a:lnR>
+                    <a:lnT w="12700" cmpd="sng">
+                      <a:noFill/>
+                    </a:lnT>
+                    <a:lnB w="12700" cap="flat" cmpd="sng" algn="ctr">
+                      <a:solidFill>
+                        <a:schemeClr val="tx1"/>
+                      </a:solidFill>
+                      <a:prstDash val="solid"/>
+                      <a:round/>
+                      <a:headEnd type="none" w="med" len="med"/>
+                      <a:tailEnd type="none" w="med" len="med"/>
+                    </a:lnB>
+                    <a:lnTlToBr w="12700" cmpd="sng">
+                      <a:noFill/>
+                      <a:prstDash val="solid"/>
+                    </a:lnTlToBr>
+                    <a:lnBlToTr w="12700" cmpd="sng">
+                      <a:noFill/>
+                      <a:prstDash val="solid"/>
+                    </a:lnBlToTr>
+                  </a:tcPr>
+                </a:tc>
+                <a:tc>
+                  <a:txBody>
+                    <a:bodyPr/>
+                    <a:lstStyle/>
+                    <a:p>
+                      <a:endParaRPr lang="en-US" dirty="0"/>
+                    </a:p>
+                  </a:txBody>
+                  <a:tcPr>
+                    <a:lnL w="12700" cap="flat" cmpd="sng" algn="ctr">
+                      <a:noFill/>
+                      <a:prstDash val="solid"/>
+                      <a:round/>
+                      <a:headEnd type="none" w="med" len="med"/>
+                      <a:tailEnd type="none" w="med" len="med"/>
+                    </a:lnL>
+                    <a:lnR w="12700" cap="flat" cmpd="sng" algn="ctr">
+                      <a:solidFill>
+                        <a:schemeClr val="tx1"/>
+                      </a:solidFill>
+                      <a:prstDash val="solid"/>
+                      <a:round/>
+                      <a:headEnd type="none" w="med" len="med"/>
+                      <a:tailEnd type="none" w="med" len="med"/>
+                    </a:lnR>
+                    <a:lnT w="12700" cmpd="sng">
+                      <a:noFill/>
+                    </a:lnT>
+                    <a:lnB w="12700" cap="flat" cmpd="sng" algn="ctr">
+                      <a:solidFill>
+                        <a:schemeClr val="tx1"/>
+                      </a:solidFill>
+                      <a:prstDash val="solid"/>
+                      <a:round/>
+                      <a:headEnd type="none" w="med" len="med"/>
+                      <a:tailEnd type="none" w="med" len="med"/>
+                    </a:lnB>
+                    <a:lnTlToBr w="12700" cmpd="sng">
+                      <a:noFill/>
+                      <a:prstDash val="solid"/>
+                    </a:lnTlToBr>
+                    <a:lnBlToTr w="12700" cmpd="sng">
+                      <a:noFill/>
+                      <a:prstDash val="solid"/>
+                    </a:lnBlToTr>
+                  </a:tcPr>
+                </a:tc>
+                <a:tc>
+                  <a:txBody>
+                    <a:bodyPr/>
+                    <a:lstStyle/>
+                    <a:p>
+                      <a:endParaRPr lang="en-US"/>
+                    </a:p>
+                  </a:txBody>
+                  <a:tcPr>
+                    <a:lnL w="12700" cap="flat" cmpd="sng" algn="ctr">
+                      <a:solidFill>
+                        <a:schemeClr val="tx1"/>
+                      </a:solidFill>
+                      <a:prstDash val="solid"/>
+                      <a:round/>
+                      <a:headEnd type="none" w="med" len="med"/>
+                      <a:tailEnd type="none" w="med" len="med"/>
+                    </a:lnL>
+                  </a:tcPr>
+                </a:tc>
+                <a:tc>
+                  <a:txBody>
+                    <a:bodyPr/>
+                    <a:lstStyle/>
+                    <a:p>
+                      <a:endParaRPr lang="en-US" dirty="0"/>
+                    </a:p>
+                  </a:txBody>
+                  <a:tcPr/>
+                </a:tc>
+                <a:extLst>
+                  <a:ext uri="{0D108BD9-81ED-4DB2-BD59-A6C34878D82A}">
+                    <a16:rowId xmlns:a16="http://schemas.microsoft.com/office/drawing/2014/main" val="903490451"/>
+                  </a:ext>
+                </a:extLst>
+              </a:tr>
+              <a:tr h="677334">
+                <a:tc>
+                  <a:txBody>
+                    <a:bodyPr/>
+                    <a:lstStyle/>
+                    <a:p>
+                      <a:pPr algn="ctr"/>
+                      <a:r>
+                        <a:rPr lang="en-US" sz="3600" dirty="0"/>
+                        <a:t>b</a:t>
+                      </a:r>
+                    </a:p>
+                  </a:txBody>
+                  <a:tcPr>
+                    <a:lnL w="12700" cmpd="sng">
+                      <a:noFill/>
+                    </a:lnL>
+                    <a:lnR w="12700" cap="flat" cmpd="sng" algn="ctr">
+                      <a:solidFill>
+                        <a:schemeClr val="tx1"/>
+                      </a:solidFill>
+                      <a:prstDash val="solid"/>
+                      <a:round/>
+                      <a:headEnd type="none" w="med" len="med"/>
+                      <a:tailEnd type="none" w="med" len="med"/>
+                    </a:lnR>
+                    <a:lnT w="12700" cmpd="sng">
+                      <a:noFill/>
+                    </a:lnT>
+                    <a:lnB w="12700" cmpd="sng">
+                      <a:noFill/>
+                    </a:lnB>
+                    <a:lnTlToBr w="12700" cmpd="sng">
+                      <a:noFill/>
+                      <a:prstDash val="solid"/>
+                    </a:lnTlToBr>
+                    <a:lnBlToTr w="12700" cmpd="sng">
+                      <a:noFill/>
+                      <a:prstDash val="solid"/>
+                    </a:lnBlToTr>
+                  </a:tcPr>
+                </a:tc>
+                <a:tc>
+                  <a:txBody>
+                    <a:bodyPr/>
+                    <a:lstStyle/>
+                    <a:p>
+                      <a:endParaRPr lang="en-US" dirty="0"/>
+                    </a:p>
+                  </a:txBody>
+                  <a:tcPr>
+                    <a:lnL w="12700" cap="flat" cmpd="sng" algn="ctr">
+                      <a:solidFill>
+                        <a:schemeClr val="tx1"/>
+                      </a:solidFill>
+                      <a:prstDash val="solid"/>
+                      <a:round/>
+                      <a:headEnd type="none" w="med" len="med"/>
+                      <a:tailEnd type="none" w="med" len="med"/>
+                    </a:lnL>
+                  </a:tcPr>
+                </a:tc>
+                <a:tc>
+                  <a:txBody>
+                    <a:bodyPr/>
+                    <a:lstStyle/>
+                    <a:p>
+                      <a:endParaRPr lang="en-US" dirty="0"/>
+                    </a:p>
+                  </a:txBody>
+                  <a:tcPr/>
+                </a:tc>
+                <a:tc>
+                  <a:txBody>
+                    <a:bodyPr/>
+                    <a:lstStyle/>
+                    <a:p>
+                      <a:endParaRPr lang="en-US"/>
+                    </a:p>
+                  </a:txBody>
+                  <a:tcPr/>
+                </a:tc>
+                <a:tc>
+                  <a:txBody>
+                    <a:bodyPr/>
+                    <a:lstStyle/>
+                    <a:p>
+                      <a:endParaRPr lang="en-US"/>
+                    </a:p>
+                  </a:txBody>
+                  <a:tcPr/>
+                </a:tc>
+                <a:tc>
+                  <a:txBody>
+                    <a:bodyPr/>
+                    <a:lstStyle/>
+                    <a:p>
+                      <a:endParaRPr lang="en-US"/>
+                    </a:p>
+                  </a:txBody>
+                  <a:tcPr>
+                    <a:lnT w="12700" cap="flat" cmpd="sng" algn="ctr">
+                      <a:solidFill>
+                        <a:schemeClr val="tx1"/>
+                      </a:solidFill>
+                      <a:prstDash val="solid"/>
+                      <a:round/>
+                      <a:headEnd type="none" w="med" len="med"/>
+                      <a:tailEnd type="none" w="med" len="med"/>
+                    </a:lnT>
+                    <a:lnB w="12700" cap="flat" cmpd="sng" algn="ctr">
+                      <a:solidFill>
+                        <a:schemeClr val="tx1"/>
+                      </a:solidFill>
+                      <a:prstDash val="solid"/>
+                      <a:round/>
+                      <a:headEnd type="none" w="med" len="med"/>
+                      <a:tailEnd type="none" w="med" len="med"/>
+                    </a:lnB>
+                  </a:tcPr>
+                </a:tc>
+                <a:tc>
+                  <a:txBody>
+                    <a:bodyPr/>
+                    <a:lstStyle/>
+                    <a:p>
+                      <a:endParaRPr lang="en-US"/>
+                    </a:p>
+                  </a:txBody>
+                  <a:tcPr>
+                    <a:lnT w="12700" cap="flat" cmpd="sng" algn="ctr">
+                      <a:solidFill>
+                        <a:schemeClr val="tx1"/>
+                      </a:solidFill>
+                      <a:prstDash val="solid"/>
+                      <a:round/>
+                      <a:headEnd type="none" w="med" len="med"/>
+                      <a:tailEnd type="none" w="med" len="med"/>
+                    </a:lnT>
+                    <a:lnB w="12700" cap="flat" cmpd="sng" algn="ctr">
+                      <a:solidFill>
+                        <a:schemeClr val="tx1"/>
+                      </a:solidFill>
+                      <a:prstDash val="solid"/>
+                      <a:round/>
+                      <a:headEnd type="none" w="med" len="med"/>
+                      <a:tailEnd type="none" w="med" len="med"/>
+                    </a:lnB>
+                  </a:tcPr>
+                </a:tc>
+                <a:tc>
+                  <a:txBody>
+                    <a:bodyPr/>
+                    <a:lstStyle/>
+                    <a:p>
+                      <a:endParaRPr lang="en-US"/>
+                    </a:p>
+                  </a:txBody>
+                  <a:tcPr/>
+                </a:tc>
+                <a:tc>
+                  <a:txBody>
+                    <a:bodyPr/>
+                    <a:lstStyle/>
+                    <a:p>
+                      <a:endParaRPr lang="en-US"/>
+                    </a:p>
+                  </a:txBody>
+                  <a:tcPr/>
+                </a:tc>
+                <a:extLst>
+                  <a:ext uri="{0D108BD9-81ED-4DB2-BD59-A6C34878D82A}">
+                    <a16:rowId xmlns:a16="http://schemas.microsoft.com/office/drawing/2014/main" val="3633229203"/>
+                  </a:ext>
+                </a:extLst>
+              </a:tr>
+              <a:tr h="677334">
+                <a:tc>
+                  <a:txBody>
+                    <a:bodyPr/>
+                    <a:lstStyle/>
+                    <a:p>
+                      <a:pPr algn="ctr"/>
+                      <a:r>
+                        <a:rPr lang="en-US" sz="3600" dirty="0"/>
+                        <a:t>c</a:t>
+                      </a:r>
+                    </a:p>
+                  </a:txBody>
+                  <a:tcPr>
+                    <a:lnL w="12700" cmpd="sng">
+                      <a:noFill/>
+                    </a:lnL>
+                    <a:lnR w="12700" cap="flat" cmpd="sng" algn="ctr">
+                      <a:solidFill>
+                        <a:schemeClr val="tx1"/>
+                      </a:solidFill>
+                      <a:prstDash val="solid"/>
+                      <a:round/>
+                      <a:headEnd type="none" w="med" len="med"/>
+                      <a:tailEnd type="none" w="med" len="med"/>
+                    </a:lnR>
+                    <a:lnT w="12700" cmpd="sng">
+                      <a:noFill/>
+                    </a:lnT>
+                    <a:lnB w="12700" cmpd="sng">
+                      <a:noFill/>
+                    </a:lnB>
+                    <a:lnTlToBr w="12700" cmpd="sng">
+                      <a:noFill/>
+                      <a:prstDash val="solid"/>
+                    </a:lnTlToBr>
+                    <a:lnBlToTr w="12700" cmpd="sng">
+                      <a:noFill/>
+                      <a:prstDash val="solid"/>
+                    </a:lnBlToTr>
+                  </a:tcPr>
+                </a:tc>
+                <a:tc>
+                  <a:txBody>
+                    <a:bodyPr/>
+                    <a:lstStyle/>
+                    <a:p>
+                      <a:endParaRPr lang="en-US" dirty="0"/>
+                    </a:p>
+                  </a:txBody>
+                  <a:tcPr>
+                    <a:lnL w="12700" cap="flat" cmpd="sng" algn="ctr">
+                      <a:solidFill>
+                        <a:schemeClr val="tx1"/>
+                      </a:solidFill>
+                      <a:prstDash val="solid"/>
+                      <a:round/>
+                      <a:headEnd type="none" w="med" len="med"/>
+                      <a:tailEnd type="none" w="med" len="med"/>
+                    </a:lnL>
+                    <a:lnB w="12700" cap="flat" cmpd="sng" algn="ctr">
+                      <a:solidFill>
+                        <a:schemeClr val="tx1"/>
+                      </a:solidFill>
+                      <a:prstDash val="solid"/>
+                      <a:round/>
+                      <a:headEnd type="none" w="med" len="med"/>
+                      <a:tailEnd type="none" w="med" len="med"/>
+                    </a:lnB>
+                  </a:tcPr>
+                </a:tc>
+                <a:tc>
+                  <a:txBody>
+                    <a:bodyPr/>
+                    <a:lstStyle/>
+                    <a:p>
+                      <a:endParaRPr lang="en-US" dirty="0"/>
+                    </a:p>
+                  </a:txBody>
+                  <a:tcPr>
+                    <a:lnB w="12700" cap="flat" cmpd="sng" algn="ctr">
+                      <a:solidFill>
+                        <a:schemeClr val="tx1"/>
+                      </a:solidFill>
+                      <a:prstDash val="solid"/>
+                      <a:round/>
+                      <a:headEnd type="none" w="med" len="med"/>
+                      <a:tailEnd type="none" w="med" len="med"/>
+                    </a:lnB>
+                  </a:tcPr>
+                </a:tc>
+                <a:tc>
+                  <a:txBody>
+                    <a:bodyPr/>
+                    <a:lstStyle/>
+                    <a:p>
+                      <a:endParaRPr lang="en-US" dirty="0"/>
+                    </a:p>
+                  </a:txBody>
+                  <a:tcPr>
+                    <a:lnB w="12700" cap="flat" cmpd="sng" algn="ctr">
+                      <a:solidFill>
+                        <a:schemeClr val="tx1"/>
+                      </a:solidFill>
+                      <a:prstDash val="solid"/>
+                      <a:round/>
+                      <a:headEnd type="none" w="med" len="med"/>
+                      <a:tailEnd type="none" w="med" len="med"/>
+                    </a:lnB>
+                  </a:tcPr>
+                </a:tc>
+                <a:tc>
+                  <a:txBody>
+                    <a:bodyPr/>
+                    <a:lstStyle/>
+                    <a:p>
+                      <a:endParaRPr lang="en-US" dirty="0"/>
+                    </a:p>
+                  </a:txBody>
+                  <a:tcPr>
+                    <a:lnR w="12700" cap="flat" cmpd="sng" algn="ctr">
+                      <a:solidFill>
+                        <a:schemeClr val="tx1"/>
+                      </a:solidFill>
+                      <a:prstDash val="solid"/>
+                      <a:round/>
+                      <a:headEnd type="none" w="med" len="med"/>
+                      <a:tailEnd type="none" w="med" len="med"/>
+                    </a:lnR>
+                    <a:lnB w="12700" cap="flat" cmpd="sng" algn="ctr">
+                      <a:solidFill>
+                        <a:schemeClr val="tx1"/>
+                      </a:solidFill>
+                      <a:prstDash val="solid"/>
+                      <a:round/>
+                      <a:headEnd type="none" w="med" len="med"/>
+                      <a:tailEnd type="none" w="med" len="med"/>
+                    </a:lnB>
+                  </a:tcPr>
+                </a:tc>
+                <a:tc>
+                  <a:txBody>
+                    <a:bodyPr/>
+                    <a:lstStyle/>
+                    <a:p>
+                      <a:endParaRPr lang="en-US" dirty="0"/>
+                    </a:p>
+                  </a:txBody>
+                  <a:tcPr>
+                    <a:lnL w="12700" cap="flat" cmpd="sng" algn="ctr">
+                      <a:solidFill>
+                        <a:schemeClr val="tx1"/>
+                      </a:solidFill>
+                      <a:prstDash val="solid"/>
+                      <a:round/>
+                      <a:headEnd type="none" w="med" len="med"/>
+                      <a:tailEnd type="none" w="med" len="med"/>
+                    </a:lnL>
+                    <a:lnR w="12700" cmpd="sng">
+                      <a:noFill/>
+                    </a:lnR>
+                    <a:lnT w="12700" cap="flat" cmpd="sng" algn="ctr">
+                      <a:solidFill>
+                        <a:schemeClr val="tx1"/>
+                      </a:solidFill>
+                      <a:prstDash val="solid"/>
+                      <a:round/>
+                      <a:headEnd type="none" w="med" len="med"/>
+                      <a:tailEnd type="none" w="med" len="med"/>
+                    </a:lnT>
+                    <a:lnB w="12700" cap="flat" cmpd="sng" algn="ctr">
+                      <a:noFill/>
+                      <a:prstDash val="solid"/>
+                      <a:round/>
+                      <a:headEnd type="none" w="med" len="med"/>
+                      <a:tailEnd type="none" w="med" len="med"/>
+                    </a:lnB>
+                    <a:lnTlToBr w="12700" cmpd="sng">
+                      <a:noFill/>
+                      <a:prstDash val="solid"/>
+                    </a:lnTlToBr>
+                    <a:lnBlToTr w="12700" cmpd="sng">
+                      <a:noFill/>
+                      <a:prstDash val="solid"/>
+                    </a:lnBlToTr>
+                  </a:tcPr>
+                </a:tc>
+                <a:tc>
+                  <a:txBody>
+                    <a:bodyPr/>
+                    <a:lstStyle/>
+                    <a:p>
+                      <a:endParaRPr lang="en-US" dirty="0"/>
+                    </a:p>
+                  </a:txBody>
+                  <a:tcPr>
+                    <a:lnL w="12700" cmpd="sng">
+                      <a:noFill/>
+                    </a:lnL>
+                    <a:lnR w="12700" cap="flat" cmpd="sng" algn="ctr">
+                      <a:solidFill>
+                        <a:schemeClr val="tx1"/>
+                      </a:solidFill>
+                      <a:prstDash val="solid"/>
+                      <a:round/>
+                      <a:headEnd type="none" w="med" len="med"/>
+                      <a:tailEnd type="none" w="med" len="med"/>
+                    </a:lnR>
+                    <a:lnT w="12700" cap="flat" cmpd="sng" algn="ctr">
+                      <a:solidFill>
+                        <a:schemeClr val="tx1"/>
+                      </a:solidFill>
+                      <a:prstDash val="solid"/>
+                      <a:round/>
+                      <a:headEnd type="none" w="med" len="med"/>
+                      <a:tailEnd type="none" w="med" len="med"/>
+                    </a:lnT>
+                    <a:lnB w="12700" cap="flat" cmpd="sng" algn="ctr">
+                      <a:noFill/>
+                      <a:prstDash val="solid"/>
+                      <a:round/>
+                      <a:headEnd type="none" w="med" len="med"/>
+                      <a:tailEnd type="none" w="med" len="med"/>
+                    </a:lnB>
+                    <a:lnTlToBr w="12700" cmpd="sng">
+                      <a:noFill/>
+                      <a:prstDash val="solid"/>
+                    </a:lnTlToBr>
+                    <a:lnBlToTr w="12700" cmpd="sng">
+                      <a:noFill/>
+                      <a:prstDash val="solid"/>
+                    </a:lnBlToTr>
+                  </a:tcPr>
+                </a:tc>
+                <a:tc>
+                  <a:txBody>
+                    <a:bodyPr/>
+                    <a:lstStyle/>
+                    <a:p>
+                      <a:endParaRPr lang="en-US"/>
+                    </a:p>
+                  </a:txBody>
+                  <a:tcPr>
+                    <a:lnL w="12700" cap="flat" cmpd="sng" algn="ctr">
+                      <a:solidFill>
+                        <a:schemeClr val="tx1"/>
+                      </a:solidFill>
+                      <a:prstDash val="solid"/>
+                      <a:round/>
+                      <a:headEnd type="none" w="med" len="med"/>
+                      <a:tailEnd type="none" w="med" len="med"/>
+                    </a:lnL>
+                    <a:lnB w="12700" cap="flat" cmpd="sng" algn="ctr">
+                      <a:solidFill>
+                        <a:schemeClr val="tx1"/>
+                      </a:solidFill>
+                      <a:prstDash val="solid"/>
+                      <a:round/>
+                      <a:headEnd type="none" w="med" len="med"/>
+                      <a:tailEnd type="none" w="med" len="med"/>
+                    </a:lnB>
+                  </a:tcPr>
+                </a:tc>
+                <a:tc>
+                  <a:txBody>
+                    <a:bodyPr/>
+                    <a:lstStyle/>
+                    <a:p>
+                      <a:endParaRPr lang="en-US" dirty="0"/>
+                    </a:p>
+                  </a:txBody>
+                  <a:tcPr>
+                    <a:lnB w="12700" cap="flat" cmpd="sng" algn="ctr">
+                      <a:solidFill>
+                        <a:schemeClr val="tx1"/>
+                      </a:solidFill>
+                      <a:prstDash val="solid"/>
+                      <a:round/>
+                      <a:headEnd type="none" w="med" len="med"/>
+                      <a:tailEnd type="none" w="med" len="med"/>
+                    </a:lnB>
+                  </a:tcPr>
+                </a:tc>
+                <a:extLst>
+                  <a:ext uri="{0D108BD9-81ED-4DB2-BD59-A6C34878D82A}">
+                    <a16:rowId xmlns:a16="http://schemas.microsoft.com/office/drawing/2014/main" val="1632319378"/>
+                  </a:ext>
+                </a:extLst>
+              </a:tr>
+              <a:tr h="677334">
+                <a:tc>
+                  <a:txBody>
+                    <a:bodyPr/>
+                    <a:lstStyle/>
+                    <a:p>
+                      <a:endParaRPr lang="en-US" dirty="0"/>
+                    </a:p>
+                  </a:txBody>
+                  <a:tcPr>
+                    <a:lnL w="12700" cmpd="sng">
+                      <a:noFill/>
+                    </a:lnL>
+                    <a:lnR w="12700" cap="flat" cmpd="sng" algn="ctr">
+                      <a:noFill/>
+                      <a:prstDash val="solid"/>
+                      <a:round/>
+                      <a:headEnd type="none" w="med" len="med"/>
+                      <a:tailEnd type="none" w="med" len="med"/>
+                    </a:lnR>
+                    <a:lnT w="12700" cmpd="sng">
+                      <a:noFill/>
+                    </a:lnT>
+                    <a:lnB w="12700" cmpd="sng">
+                      <a:noFill/>
+                    </a:lnB>
+                    <a:lnTlToBr w="12700" cmpd="sng">
+                      <a:noFill/>
+                      <a:prstDash val="solid"/>
+                    </a:lnTlToBr>
+                    <a:lnBlToTr w="12700" cmpd="sng">
+                      <a:noFill/>
+                      <a:prstDash val="solid"/>
+                    </a:lnBlToTr>
+                  </a:tcPr>
+                </a:tc>
+                <a:tc>
+                  <a:txBody>
+                    <a:bodyPr/>
+                    <a:lstStyle/>
+                    <a:p>
+                      <a:pPr algn="ctr"/>
+                      <a:r>
+                        <a:rPr lang="en-US" sz="3600" dirty="0"/>
+                        <a:t>1</a:t>
+                      </a:r>
+                    </a:p>
+                  </a:txBody>
+                  <a:tcPr>
+                    <a:lnL w="12700" cap="flat" cmpd="sng" algn="ctr">
+                      <a:noFill/>
+                      <a:prstDash val="solid"/>
+                      <a:round/>
+                      <a:headEnd type="none" w="med" len="med"/>
+                      <a:tailEnd type="none" w="med" len="med"/>
+                    </a:lnL>
+                    <a:lnR w="12700" cmpd="sng">
+                      <a:noFill/>
+                    </a:lnR>
+                    <a:lnT w="12700" cap="flat" cmpd="sng" algn="ctr">
+                      <a:solidFill>
+                        <a:schemeClr val="tx1"/>
+                      </a:solidFill>
+                      <a:prstDash val="solid"/>
+                      <a:round/>
+                      <a:headEnd type="none" w="med" len="med"/>
+                      <a:tailEnd type="none" w="med" len="med"/>
+                    </a:lnT>
+                    <a:lnB w="12700" cmpd="sng">
+                      <a:noFill/>
+                    </a:lnB>
+                    <a:lnTlToBr w="12700" cmpd="sng">
+                      <a:noFill/>
+                      <a:prstDash val="solid"/>
+                    </a:lnTlToBr>
+                    <a:lnBlToTr w="12700" cmpd="sng">
+                      <a:noFill/>
+                      <a:prstDash val="solid"/>
+                    </a:lnBlToTr>
+                  </a:tcPr>
+                </a:tc>
+                <a:tc>
+                  <a:txBody>
+                    <a:bodyPr/>
+                    <a:lstStyle/>
+                    <a:p>
+                      <a:pPr algn="ctr"/>
+                      <a:r>
+                        <a:rPr lang="en-US" sz="3600" dirty="0"/>
+                        <a:t>2</a:t>
+                      </a:r>
+                    </a:p>
+                  </a:txBody>
+                  <a:tcPr>
+                    <a:lnL w="12700" cmpd="sng">
+                      <a:noFill/>
+                    </a:lnL>
+                    <a:lnR w="12700" cmpd="sng">
+                      <a:noFill/>
+                    </a:lnR>
+                    <a:lnT w="12700" cap="flat" cmpd="sng" algn="ctr">
+                      <a:solidFill>
+                        <a:schemeClr val="tx1"/>
+                      </a:solidFill>
+                      <a:prstDash val="solid"/>
+                      <a:round/>
+                      <a:headEnd type="none" w="med" len="med"/>
+                      <a:tailEnd type="none" w="med" len="med"/>
+                    </a:lnT>
+                    <a:lnB w="12700" cmpd="sng">
+                      <a:noFill/>
+                    </a:lnB>
+                    <a:lnTlToBr w="12700" cmpd="sng">
+                      <a:noFill/>
+                      <a:prstDash val="solid"/>
+                    </a:lnTlToBr>
+                    <a:lnBlToTr w="12700" cmpd="sng">
+                      <a:noFill/>
+                      <a:prstDash val="solid"/>
+                    </a:lnBlToTr>
+                  </a:tcPr>
+                </a:tc>
+                <a:tc>
+                  <a:txBody>
+                    <a:bodyPr/>
+                    <a:lstStyle/>
+                    <a:p>
+                      <a:pPr algn="ctr"/>
+                      <a:r>
+                        <a:rPr lang="en-US" sz="3600" dirty="0"/>
+                        <a:t>3</a:t>
+                      </a:r>
+                    </a:p>
+                  </a:txBody>
+                  <a:tcPr>
+                    <a:lnL w="12700" cmpd="sng">
+                      <a:noFill/>
+                    </a:lnL>
+                    <a:lnR w="12700" cmpd="sng">
+                      <a:noFill/>
+                    </a:lnR>
+                    <a:lnT w="12700" cap="flat" cmpd="sng" algn="ctr">
+                      <a:solidFill>
+                        <a:schemeClr val="tx1"/>
+                      </a:solidFill>
+                      <a:prstDash val="solid"/>
+                      <a:round/>
+                      <a:headEnd type="none" w="med" len="med"/>
+                      <a:tailEnd type="none" w="med" len="med"/>
+                    </a:lnT>
+                    <a:lnB w="12700" cmpd="sng">
+                      <a:noFill/>
+                    </a:lnB>
+                    <a:lnTlToBr w="12700" cmpd="sng">
+                      <a:noFill/>
+                      <a:prstDash val="solid"/>
+                    </a:lnTlToBr>
+                    <a:lnBlToTr w="12700" cmpd="sng">
+                      <a:noFill/>
+                      <a:prstDash val="solid"/>
+                    </a:lnBlToTr>
+                  </a:tcPr>
+                </a:tc>
+                <a:tc>
+                  <a:txBody>
+                    <a:bodyPr/>
+                    <a:lstStyle/>
+                    <a:p>
+                      <a:pPr algn="ctr"/>
+                      <a:r>
+                        <a:rPr lang="en-US" sz="3600" dirty="0"/>
+                        <a:t>4</a:t>
+                      </a:r>
+                    </a:p>
+                  </a:txBody>
+                  <a:tcPr>
+                    <a:lnL w="12700" cmpd="sng">
+                      <a:noFill/>
+                    </a:lnL>
+                    <a:lnR w="12700" cap="flat" cmpd="sng" algn="ctr">
+                      <a:noFill/>
+                      <a:prstDash val="solid"/>
+                      <a:round/>
+                      <a:headEnd type="none" w="med" len="med"/>
+                      <a:tailEnd type="none" w="med" len="med"/>
+                    </a:lnR>
+                    <a:lnT w="12700" cap="flat" cmpd="sng" algn="ctr">
+                      <a:solidFill>
+                        <a:schemeClr val="tx1"/>
+                      </a:solidFill>
+                      <a:prstDash val="solid"/>
+                      <a:round/>
+                      <a:headEnd type="none" w="med" len="med"/>
+                      <a:tailEnd type="none" w="med" len="med"/>
+                    </a:lnT>
+                    <a:lnB w="12700" cmpd="sng">
+                      <a:noFill/>
+                    </a:lnB>
+                    <a:lnTlToBr w="12700" cmpd="sng">
+                      <a:noFill/>
+                      <a:prstDash val="solid"/>
+                    </a:lnTlToBr>
+                    <a:lnBlToTr w="12700" cmpd="sng">
+                      <a:noFill/>
+                      <a:prstDash val="solid"/>
+                    </a:lnBlToTr>
+                  </a:tcPr>
+                </a:tc>
+                <a:tc>
+                  <a:txBody>
+                    <a:bodyPr/>
+                    <a:lstStyle/>
+                    <a:p>
+                      <a:pPr algn="ctr"/>
+                      <a:r>
+                        <a:rPr lang="en-US" sz="3600" dirty="0"/>
+                        <a:t>5</a:t>
+                      </a:r>
+                    </a:p>
+                  </a:txBody>
+                  <a:tcPr>
+                    <a:lnL w="12700" cap="flat" cmpd="sng" algn="ctr">
+                      <a:noFill/>
+                      <a:prstDash val="solid"/>
+                      <a:round/>
+                      <a:headEnd type="none" w="med" len="med"/>
+                      <a:tailEnd type="none" w="med" len="med"/>
+                    </a:lnL>
+                    <a:lnR w="12700" cmpd="sng">
+                      <a:noFill/>
+                    </a:lnR>
+                    <a:lnT w="12700" cap="flat" cmpd="sng" algn="ctr">
+                      <a:noFill/>
+                      <a:prstDash val="solid"/>
+                      <a:round/>
+                      <a:headEnd type="none" w="med" len="med"/>
+                      <a:tailEnd type="none" w="med" len="med"/>
+                    </a:lnT>
+                    <a:lnB w="12700" cap="flat" cmpd="sng" algn="ctr">
+                      <a:noFill/>
+                      <a:prstDash val="solid"/>
+                      <a:round/>
+                      <a:headEnd type="none" w="med" len="med"/>
+                      <a:tailEnd type="none" w="med" len="med"/>
+                    </a:lnB>
+                    <a:lnTlToBr w="12700" cmpd="sng">
+                      <a:noFill/>
+                      <a:prstDash val="solid"/>
+                    </a:lnTlToBr>
+                    <a:lnBlToTr w="12700" cmpd="sng">
+                      <a:noFill/>
+                      <a:prstDash val="solid"/>
+                    </a:lnBlToTr>
+                  </a:tcPr>
+                </a:tc>
+                <a:tc>
+                  <a:txBody>
+                    <a:bodyPr/>
+                    <a:lstStyle/>
+                    <a:p>
+                      <a:pPr algn="ctr"/>
+                      <a:r>
+                        <a:rPr lang="en-US" sz="3600" dirty="0"/>
+                        <a:t>6</a:t>
+                      </a:r>
+                    </a:p>
+                  </a:txBody>
+                  <a:tcPr>
+                    <a:lnL w="12700" cmpd="sng">
+                      <a:noFill/>
+                    </a:lnL>
+                    <a:lnR w="12700" cap="flat" cmpd="sng" algn="ctr">
+                      <a:noFill/>
+                      <a:prstDash val="solid"/>
+                      <a:round/>
+                      <a:headEnd type="none" w="med" len="med"/>
+                      <a:tailEnd type="none" w="med" len="med"/>
+                    </a:lnR>
+                    <a:lnT w="12700" cap="flat" cmpd="sng" algn="ctr">
+                      <a:noFill/>
+                      <a:prstDash val="solid"/>
+                      <a:round/>
+                      <a:headEnd type="none" w="med" len="med"/>
+                      <a:tailEnd type="none" w="med" len="med"/>
+                    </a:lnT>
+                    <a:lnB w="12700" cap="flat" cmpd="sng" algn="ctr">
+                      <a:noFill/>
+                      <a:prstDash val="solid"/>
+                      <a:round/>
+                      <a:headEnd type="none" w="med" len="med"/>
+                      <a:tailEnd type="none" w="med" len="med"/>
+                    </a:lnB>
+                    <a:lnTlToBr w="12700" cmpd="sng">
+                      <a:noFill/>
+                      <a:prstDash val="solid"/>
+                    </a:lnTlToBr>
+                    <a:lnBlToTr w="12700" cmpd="sng">
+                      <a:noFill/>
+                      <a:prstDash val="solid"/>
+                    </a:lnBlToTr>
+                  </a:tcPr>
+                </a:tc>
+                <a:tc>
+                  <a:txBody>
+                    <a:bodyPr/>
+                    <a:lstStyle/>
+                    <a:p>
+                      <a:pPr algn="ctr"/>
+                      <a:r>
+                        <a:rPr lang="en-US" sz="3600" dirty="0"/>
+                        <a:t>7</a:t>
+                      </a:r>
+                    </a:p>
+                  </a:txBody>
+                  <a:tcPr>
+                    <a:lnL w="12700" cap="flat" cmpd="sng" algn="ctr">
+                      <a:noFill/>
+                      <a:prstDash val="solid"/>
+                      <a:round/>
+                      <a:headEnd type="none" w="med" len="med"/>
+                      <a:tailEnd type="none" w="med" len="med"/>
+                    </a:lnL>
+                    <a:lnR w="12700" cmpd="sng">
+                      <a:noFill/>
+                    </a:lnR>
+                    <a:lnT w="12700" cap="flat" cmpd="sng" algn="ctr">
+                      <a:solidFill>
+                        <a:schemeClr val="tx1"/>
+                      </a:solidFill>
+                      <a:prstDash val="solid"/>
+                      <a:round/>
+                      <a:headEnd type="none" w="med" len="med"/>
+                      <a:tailEnd type="none" w="med" len="med"/>
+                    </a:lnT>
+                    <a:lnB w="12700" cmpd="sng">
+                      <a:noFill/>
+                    </a:lnB>
+                    <a:lnTlToBr w="12700" cmpd="sng">
+                      <a:noFill/>
+                      <a:prstDash val="solid"/>
+                    </a:lnTlToBr>
+                    <a:lnBlToTr w="12700" cmpd="sng">
+                      <a:noFill/>
+                      <a:prstDash val="solid"/>
+                    </a:lnBlToTr>
+                  </a:tcPr>
+                </a:tc>
+                <a:tc>
+                  <a:txBody>
+                    <a:bodyPr/>
+                    <a:lstStyle/>
+                    <a:p>
+                      <a:pPr algn="ctr"/>
+                      <a:r>
+                        <a:rPr lang="en-US" sz="3600" dirty="0"/>
+                        <a:t>8</a:t>
+                      </a:r>
+                    </a:p>
+                  </a:txBody>
+                  <a:tcPr>
+                    <a:lnL w="12700" cmpd="sng">
+                      <a:noFill/>
+                    </a:lnL>
+                    <a:lnR w="12700" cmpd="sng">
+                      <a:noFill/>
+                    </a:lnR>
+                    <a:lnT w="12700" cap="flat" cmpd="sng" algn="ctr">
+                      <a:solidFill>
+                        <a:schemeClr val="tx1"/>
+                      </a:solidFill>
+                      <a:prstDash val="solid"/>
+                      <a:round/>
+                      <a:headEnd type="none" w="med" len="med"/>
+                      <a:tailEnd type="none" w="med" len="med"/>
+                    </a:lnT>
+                    <a:lnB w="12700" cmpd="sng">
+                      <a:noFill/>
+                    </a:lnB>
+                    <a:lnTlToBr w="12700" cmpd="sng">
+                      <a:noFill/>
+                      <a:prstDash val="solid"/>
+                    </a:lnTlToBr>
+                    <a:lnBlToTr w="12700" cmpd="sng">
+                      <a:noFill/>
+                      <a:prstDash val="solid"/>
+                    </a:lnBlToTr>
+                  </a:tcPr>
+                </a:tc>
+                <a:extLst>
+                  <a:ext uri="{0D108BD9-81ED-4DB2-BD59-A6C34878D82A}">
+                    <a16:rowId xmlns:a16="http://schemas.microsoft.com/office/drawing/2014/main" val="461059762"/>
+                  </a:ext>
+                </a:extLst>
+              </a:tr>
+            </a:tbl>
+          </a:graphicData>
+        </a:graphic>
+      </p:graphicFrame>
+      <p:sp>
+        <p:nvSpPr>
+          <p:cNvPr id="5" name="Star: 5 Points 4">
+            <a:extLst>
+              <a:ext uri="{FF2B5EF4-FFF2-40B4-BE49-F238E27FC236}">
+                <a16:creationId xmlns:a16="http://schemas.microsoft.com/office/drawing/2014/main" id="{47FB9592-3A69-4BD7-A514-EE98B4719CE3}"/>
+              </a:ext>
+            </a:extLst>
+          </p:cNvPr>
+          <p:cNvSpPr/>
+          <p:nvPr/>
+        </p:nvSpPr>
+        <p:spPr>
+          <a:xfrm>
+            <a:off x="5799714" y="2633468"/>
+            <a:ext cx="458972" cy="369059"/>
+          </a:xfrm>
+          <a:prstGeom prst="star5">
+            <a:avLst/>
+          </a:prstGeom>
+          <a:solidFill>
+            <a:schemeClr val="tx1"/>
+          </a:solidFill>
+        </p:spPr>
+        <p:style>
+          <a:lnRef idx="2">
+            <a:schemeClr val="accent1">
+              <a:shade val="50000"/>
+            </a:schemeClr>
+          </a:lnRef>
+          <a:fillRef idx="1">
+            <a:schemeClr val="accent1"/>
+          </a:fillRef>
+          <a:effectRef idx="0">
+            <a:schemeClr val="accent1"/>
+          </a:effectRef>
+          <a:fontRef idx="minor">
+            <a:schemeClr val="lt1"/>
+          </a:fontRef>
+        </p:style>
+        <p:txBody>
+          <a:bodyPr rtlCol="0" anchor="ctr"/>
+          <a:lstStyle/>
+          <a:p>
+            <a:pPr algn="ctr"/>
+            <a:endParaRPr lang="en-US"/>
+          </a:p>
+        </p:txBody>
+      </p:sp>
+      <p:sp>
+        <p:nvSpPr>
+          <p:cNvPr id="6" name="Star: 5 Points 5">
+            <a:extLst>
+              <a:ext uri="{FF2B5EF4-FFF2-40B4-BE49-F238E27FC236}">
+                <a16:creationId xmlns:a16="http://schemas.microsoft.com/office/drawing/2014/main" id="{3C7BF510-9798-4848-86EE-F1F72E211F76}"/>
+              </a:ext>
+            </a:extLst>
+          </p:cNvPr>
+          <p:cNvSpPr/>
+          <p:nvPr/>
+        </p:nvSpPr>
+        <p:spPr>
+          <a:xfrm>
+            <a:off x="3466163" y="1895059"/>
+            <a:ext cx="458972" cy="369059"/>
+          </a:xfrm>
+          <a:prstGeom prst="star5">
+            <a:avLst/>
+          </a:prstGeom>
+          <a:solidFill>
+            <a:schemeClr val="tx1"/>
+          </a:solidFill>
+        </p:spPr>
+        <p:style>
+          <a:lnRef idx="2">
+            <a:schemeClr val="accent1">
+              <a:shade val="50000"/>
+            </a:schemeClr>
+          </a:lnRef>
+          <a:fillRef idx="1">
+            <a:schemeClr val="accent1"/>
+          </a:fillRef>
+          <a:effectRef idx="0">
+            <a:schemeClr val="accent1"/>
+          </a:effectRef>
+          <a:fontRef idx="minor">
+            <a:schemeClr val="lt1"/>
+          </a:fontRef>
+        </p:style>
+        <p:txBody>
+          <a:bodyPr rtlCol="0" anchor="ctr"/>
+          <a:lstStyle/>
+          <a:p>
+            <a:pPr algn="ctr"/>
+            <a:endParaRPr lang="en-US"/>
+          </a:p>
+        </p:txBody>
+      </p:sp>
+      <p:sp>
+        <p:nvSpPr>
+          <p:cNvPr id="7" name="Star: 5 Points 6">
+            <a:extLst>
+              <a:ext uri="{FF2B5EF4-FFF2-40B4-BE49-F238E27FC236}">
+                <a16:creationId xmlns:a16="http://schemas.microsoft.com/office/drawing/2014/main" id="{9CB2FA0B-8EC8-4D56-9DCC-44839EAC13D0}"/>
+              </a:ext>
+            </a:extLst>
+          </p:cNvPr>
+          <p:cNvSpPr/>
+          <p:nvPr/>
+        </p:nvSpPr>
+        <p:spPr>
+          <a:xfrm>
+            <a:off x="3466163" y="3360425"/>
+            <a:ext cx="458972" cy="369059"/>
+          </a:xfrm>
+          <a:prstGeom prst="star5">
+            <a:avLst/>
+          </a:prstGeom>
+          <a:solidFill>
+            <a:schemeClr val="tx1"/>
+          </a:solidFill>
+        </p:spPr>
+        <p:style>
+          <a:lnRef idx="2">
+            <a:schemeClr val="accent1">
+              <a:shade val="50000"/>
+            </a:schemeClr>
+          </a:lnRef>
+          <a:fillRef idx="1">
+            <a:schemeClr val="accent1"/>
+          </a:fillRef>
+          <a:effectRef idx="0">
+            <a:schemeClr val="accent1"/>
+          </a:effectRef>
+          <a:fontRef idx="minor">
+            <a:schemeClr val="lt1"/>
+          </a:fontRef>
+        </p:style>
+        <p:txBody>
+          <a:bodyPr rtlCol="0" anchor="ctr"/>
+          <a:lstStyle/>
+          <a:p>
+            <a:pPr algn="ctr"/>
+            <a:endParaRPr lang="en-US"/>
+          </a:p>
+        </p:txBody>
+      </p:sp>
+      <p:sp>
+        <p:nvSpPr>
+          <p:cNvPr id="8" name="Star: 5 Points 7">
+            <a:extLst>
+              <a:ext uri="{FF2B5EF4-FFF2-40B4-BE49-F238E27FC236}">
+                <a16:creationId xmlns:a16="http://schemas.microsoft.com/office/drawing/2014/main" id="{53C63601-95C9-45B8-8537-20EA6BADDD23}"/>
+              </a:ext>
+            </a:extLst>
+          </p:cNvPr>
+          <p:cNvSpPr/>
+          <p:nvPr/>
+        </p:nvSpPr>
+        <p:spPr>
+          <a:xfrm>
+            <a:off x="8265814" y="1973570"/>
+            <a:ext cx="458972" cy="369059"/>
+          </a:xfrm>
+          <a:prstGeom prst="star5">
+            <a:avLst/>
+          </a:prstGeom>
+          <a:solidFill>
+            <a:schemeClr val="tx1"/>
+          </a:solidFill>
+        </p:spPr>
+        <p:style>
+          <a:lnRef idx="2">
+            <a:schemeClr val="accent1">
+              <a:shade val="50000"/>
+            </a:schemeClr>
+          </a:lnRef>
+          <a:fillRef idx="1">
+            <a:schemeClr val="accent1"/>
+          </a:fillRef>
+          <a:effectRef idx="0">
+            <a:schemeClr val="accent1"/>
+          </a:effectRef>
+          <a:fontRef idx="minor">
+            <a:schemeClr val="lt1"/>
+          </a:fontRef>
+        </p:style>
+        <p:txBody>
+          <a:bodyPr rtlCol="0" anchor="ctr"/>
+          <a:lstStyle/>
+          <a:p>
+            <a:pPr algn="ctr"/>
+            <a:endParaRPr lang="en-US"/>
+          </a:p>
+        </p:txBody>
+      </p:sp>
+      <p:sp>
+        <p:nvSpPr>
+          <p:cNvPr id="9" name="Star: 5 Points 8">
+            <a:extLst>
+              <a:ext uri="{FF2B5EF4-FFF2-40B4-BE49-F238E27FC236}">
+                <a16:creationId xmlns:a16="http://schemas.microsoft.com/office/drawing/2014/main" id="{86FE0F92-3B1A-4AD3-8277-EE1FCE285613}"/>
+              </a:ext>
+            </a:extLst>
+          </p:cNvPr>
+          <p:cNvSpPr/>
+          <p:nvPr/>
+        </p:nvSpPr>
+        <p:spPr>
+          <a:xfrm>
+            <a:off x="8283264" y="3341413"/>
+            <a:ext cx="458972" cy="369059"/>
+          </a:xfrm>
+          <a:prstGeom prst="star5">
+            <a:avLst/>
+          </a:prstGeom>
+          <a:solidFill>
+            <a:schemeClr val="tx1"/>
+          </a:solidFill>
+        </p:spPr>
+        <p:style>
+          <a:lnRef idx="2">
+            <a:schemeClr val="accent1">
+              <a:shade val="50000"/>
+            </a:schemeClr>
+          </a:lnRef>
+          <a:fillRef idx="1">
+            <a:schemeClr val="accent1"/>
+          </a:fillRef>
+          <a:effectRef idx="0">
+            <a:schemeClr val="accent1"/>
+          </a:effectRef>
+          <a:fontRef idx="minor">
+            <a:schemeClr val="lt1"/>
+          </a:fontRef>
+        </p:style>
+        <p:txBody>
+          <a:bodyPr rtlCol="0" anchor="ctr"/>
+          <a:lstStyle/>
+          <a:p>
+            <a:pPr algn="ctr"/>
+            <a:endParaRPr lang="en-US"/>
+          </a:p>
+        </p:txBody>
+      </p:sp>
+      <p:sp>
+        <p:nvSpPr>
+          <p:cNvPr id="12" name="Oval 11">
+            <a:extLst>
+              <a:ext uri="{FF2B5EF4-FFF2-40B4-BE49-F238E27FC236}">
+                <a16:creationId xmlns:a16="http://schemas.microsoft.com/office/drawing/2014/main" id="{698D9373-77BB-49FF-A7C5-AD27E33B19A6}"/>
+              </a:ext>
+            </a:extLst>
+          </p:cNvPr>
+          <p:cNvSpPr/>
+          <p:nvPr/>
+        </p:nvSpPr>
+        <p:spPr>
+          <a:xfrm>
+            <a:off x="3519403" y="1994450"/>
+            <a:ext cx="311866" cy="285183"/>
+          </a:xfrm>
+          <a:prstGeom prst="ellipse">
+            <a:avLst/>
+          </a:prstGeom>
+          <a:solidFill>
+            <a:srgbClr val="92D050"/>
+          </a:solidFill>
+        </p:spPr>
+        <p:style>
+          <a:lnRef idx="2">
+            <a:schemeClr val="accent1">
+              <a:shade val="50000"/>
+            </a:schemeClr>
+          </a:lnRef>
+          <a:fillRef idx="1">
+            <a:schemeClr val="accent1"/>
+          </a:fillRef>
+          <a:effectRef idx="0">
+            <a:schemeClr val="accent1"/>
+          </a:effectRef>
+          <a:fontRef idx="minor">
+            <a:schemeClr val="lt1"/>
+          </a:fontRef>
+        </p:style>
+        <p:txBody>
+          <a:bodyPr rtlCol="0" anchor="ctr"/>
+          <a:lstStyle/>
+          <a:p>
+            <a:pPr algn="ctr"/>
+            <a:endParaRPr lang="en-US"/>
+          </a:p>
+        </p:txBody>
+      </p:sp>
+      <p:sp>
+        <p:nvSpPr>
+          <p:cNvPr id="39" name="TextBox 38">
+            <a:extLst>
+              <a:ext uri="{FF2B5EF4-FFF2-40B4-BE49-F238E27FC236}">
+                <a16:creationId xmlns:a16="http://schemas.microsoft.com/office/drawing/2014/main" id="{3824B90C-8F9D-4E96-88B6-57AC9F0A9A4F}"/>
+              </a:ext>
+            </a:extLst>
+          </p:cNvPr>
+          <p:cNvSpPr txBox="1"/>
+          <p:nvPr/>
+        </p:nvSpPr>
+        <p:spPr>
+          <a:xfrm>
+            <a:off x="6461714" y="1973297"/>
+            <a:ext cx="615879" cy="369332"/>
+          </a:xfrm>
+          <a:prstGeom prst="rect">
+            <a:avLst/>
+          </a:prstGeom>
+          <a:noFill/>
+        </p:spPr>
+        <p:txBody>
+          <a:bodyPr wrap="square" rtlCol="0">
+            <a:spAutoFit/>
+          </a:bodyPr>
+          <a:lstStyle/>
+          <a:p>
+            <a:r>
+              <a:rPr lang="en-US" dirty="0"/>
+              <a:t>start</a:t>
+            </a:r>
+          </a:p>
+        </p:txBody>
+      </p:sp>
+      <p:sp>
+        <p:nvSpPr>
+          <p:cNvPr id="40" name="TextBox 39">
+            <a:extLst>
+              <a:ext uri="{FF2B5EF4-FFF2-40B4-BE49-F238E27FC236}">
+                <a16:creationId xmlns:a16="http://schemas.microsoft.com/office/drawing/2014/main" id="{CB68968B-51E0-4C1E-B9E7-BD620F90E6D6}"/>
+              </a:ext>
+            </a:extLst>
+          </p:cNvPr>
+          <p:cNvSpPr txBox="1"/>
+          <p:nvPr/>
+        </p:nvSpPr>
+        <p:spPr>
+          <a:xfrm>
+            <a:off x="6470924" y="3360425"/>
+            <a:ext cx="615879" cy="369332"/>
+          </a:xfrm>
+          <a:prstGeom prst="rect">
+            <a:avLst/>
+          </a:prstGeom>
+          <a:noFill/>
+        </p:spPr>
+        <p:txBody>
+          <a:bodyPr wrap="square" rtlCol="0">
+            <a:spAutoFit/>
+          </a:bodyPr>
+          <a:lstStyle/>
+          <a:p>
+            <a:r>
+              <a:rPr lang="en-US" dirty="0"/>
+              <a:t>start</a:t>
+            </a:r>
+          </a:p>
+        </p:txBody>
+      </p:sp>
+      <p:sp>
+        <p:nvSpPr>
+          <p:cNvPr id="41" name="TextBox 40">
+            <a:extLst>
+              <a:ext uri="{FF2B5EF4-FFF2-40B4-BE49-F238E27FC236}">
+                <a16:creationId xmlns:a16="http://schemas.microsoft.com/office/drawing/2014/main" id="{B06D0491-D555-47E5-8676-229BBA8D9BA0}"/>
+              </a:ext>
+            </a:extLst>
+          </p:cNvPr>
+          <p:cNvSpPr txBox="1"/>
+          <p:nvPr/>
+        </p:nvSpPr>
+        <p:spPr>
+          <a:xfrm>
+            <a:off x="7575990" y="3342279"/>
+            <a:ext cx="615879" cy="369332"/>
+          </a:xfrm>
+          <a:prstGeom prst="rect">
+            <a:avLst/>
+          </a:prstGeom>
+          <a:noFill/>
+        </p:spPr>
+        <p:txBody>
+          <a:bodyPr wrap="square" rtlCol="0">
+            <a:spAutoFit/>
+          </a:bodyPr>
+          <a:lstStyle/>
+          <a:p>
+            <a:r>
+              <a:rPr lang="en-US" dirty="0"/>
+              <a:t>end</a:t>
+            </a:r>
+          </a:p>
+        </p:txBody>
+      </p:sp>
+      <p:sp>
+        <p:nvSpPr>
+          <p:cNvPr id="42" name="TextBox 41">
+            <a:extLst>
+              <a:ext uri="{FF2B5EF4-FFF2-40B4-BE49-F238E27FC236}">
+                <a16:creationId xmlns:a16="http://schemas.microsoft.com/office/drawing/2014/main" id="{E8D7FE4D-B7E0-4F46-8F8C-E97AA9304AD7}"/>
+              </a:ext>
+            </a:extLst>
+          </p:cNvPr>
+          <p:cNvSpPr txBox="1"/>
+          <p:nvPr/>
+        </p:nvSpPr>
+        <p:spPr>
+          <a:xfrm>
+            <a:off x="7599767" y="1973297"/>
+            <a:ext cx="615879" cy="369332"/>
+          </a:xfrm>
+          <a:prstGeom prst="rect">
+            <a:avLst/>
+          </a:prstGeom>
+          <a:noFill/>
+        </p:spPr>
+        <p:txBody>
+          <a:bodyPr wrap="square" rtlCol="0">
+            <a:spAutoFit/>
+          </a:bodyPr>
+          <a:lstStyle/>
+          <a:p>
+            <a:r>
+              <a:rPr lang="en-US" dirty="0"/>
+              <a:t>end</a:t>
+            </a:r>
+          </a:p>
+        </p:txBody>
+      </p:sp>
+      <p:sp>
+        <p:nvSpPr>
+          <p:cNvPr id="43" name="Oval 42">
+            <a:extLst>
+              <a:ext uri="{FF2B5EF4-FFF2-40B4-BE49-F238E27FC236}">
+                <a16:creationId xmlns:a16="http://schemas.microsoft.com/office/drawing/2014/main" id="{72E681AF-8840-45B3-8F77-D75D2A77D2C4}"/>
+              </a:ext>
+            </a:extLst>
+          </p:cNvPr>
+          <p:cNvSpPr/>
+          <p:nvPr/>
+        </p:nvSpPr>
+        <p:spPr>
+          <a:xfrm>
+            <a:off x="3541601" y="2717344"/>
+            <a:ext cx="311866" cy="285183"/>
+          </a:xfrm>
+          <a:prstGeom prst="ellipse">
+            <a:avLst/>
+          </a:prstGeom>
+          <a:solidFill>
+            <a:srgbClr val="FF0000"/>
+          </a:solidFill>
+        </p:spPr>
+        <p:style>
+          <a:lnRef idx="2">
+            <a:schemeClr val="accent1">
+              <a:shade val="50000"/>
+            </a:schemeClr>
+          </a:lnRef>
+          <a:fillRef idx="1">
+            <a:schemeClr val="accent1"/>
+          </a:fillRef>
+          <a:effectRef idx="0">
+            <a:schemeClr val="accent1"/>
+          </a:effectRef>
+          <a:fontRef idx="minor">
+            <a:schemeClr val="lt1"/>
+          </a:fontRef>
+        </p:style>
+        <p:txBody>
+          <a:bodyPr rtlCol="0" anchor="ctr"/>
+          <a:lstStyle/>
+          <a:p>
+            <a:pPr algn="ctr"/>
+            <a:endParaRPr lang="en-US"/>
+          </a:p>
+        </p:txBody>
+      </p:sp>
+      <p:sp>
+        <p:nvSpPr>
+          <p:cNvPr id="28" name="Oval 27">
+            <a:extLst>
+              <a:ext uri="{FF2B5EF4-FFF2-40B4-BE49-F238E27FC236}">
+                <a16:creationId xmlns:a16="http://schemas.microsoft.com/office/drawing/2014/main" id="{1BD75407-5FDA-4799-8B19-6E486C9187C5}"/>
+              </a:ext>
+            </a:extLst>
+          </p:cNvPr>
+          <p:cNvSpPr/>
+          <p:nvPr/>
+        </p:nvSpPr>
+        <p:spPr>
+          <a:xfrm>
+            <a:off x="5152403" y="2694971"/>
+            <a:ext cx="311866" cy="285183"/>
+          </a:xfrm>
+          <a:prstGeom prst="ellipse">
+            <a:avLst/>
+          </a:prstGeom>
+          <a:solidFill>
+            <a:srgbClr val="92D050"/>
+          </a:solidFill>
+        </p:spPr>
+        <p:style>
+          <a:lnRef idx="2">
+            <a:schemeClr val="accent1">
+              <a:shade val="50000"/>
+            </a:schemeClr>
+          </a:lnRef>
+          <a:fillRef idx="1">
+            <a:schemeClr val="accent1"/>
+          </a:fillRef>
+          <a:effectRef idx="0">
+            <a:schemeClr val="accent1"/>
+          </a:effectRef>
+          <a:fontRef idx="minor">
+            <a:schemeClr val="lt1"/>
+          </a:fontRef>
+        </p:style>
+        <p:txBody>
+          <a:bodyPr rtlCol="0" anchor="ctr"/>
+          <a:lstStyle/>
+          <a:p>
+            <a:pPr algn="ctr"/>
+            <a:endParaRPr lang="en-US"/>
+          </a:p>
+        </p:txBody>
+      </p:sp>
+      <p:sp>
+        <p:nvSpPr>
+          <p:cNvPr id="29" name="Oval 28">
+            <a:extLst>
+              <a:ext uri="{FF2B5EF4-FFF2-40B4-BE49-F238E27FC236}">
+                <a16:creationId xmlns:a16="http://schemas.microsoft.com/office/drawing/2014/main" id="{2C5CA71A-1A66-4615-A55A-B6C6B3CD394E}"/>
+              </a:ext>
+            </a:extLst>
+          </p:cNvPr>
+          <p:cNvSpPr/>
+          <p:nvPr/>
+        </p:nvSpPr>
+        <p:spPr>
+          <a:xfrm>
+            <a:off x="6600418" y="1786990"/>
+            <a:ext cx="311866" cy="285183"/>
+          </a:xfrm>
+          <a:prstGeom prst="ellipse">
+            <a:avLst/>
+          </a:prstGeom>
+          <a:solidFill>
+            <a:srgbClr val="92D050"/>
+          </a:solidFill>
+        </p:spPr>
+        <p:style>
+          <a:lnRef idx="2">
+            <a:schemeClr val="accent1">
+              <a:shade val="50000"/>
+            </a:schemeClr>
+          </a:lnRef>
+          <a:fillRef idx="1">
+            <a:schemeClr val="accent1"/>
+          </a:fillRef>
+          <a:effectRef idx="0">
+            <a:schemeClr val="accent1"/>
+          </a:effectRef>
+          <a:fontRef idx="minor">
+            <a:schemeClr val="lt1"/>
+          </a:fontRef>
+        </p:style>
+        <p:txBody>
+          <a:bodyPr rtlCol="0" anchor="ctr"/>
+          <a:lstStyle/>
+          <a:p>
+            <a:pPr algn="ctr"/>
+            <a:endParaRPr lang="en-US"/>
+          </a:p>
+        </p:txBody>
+      </p:sp>
+      <p:sp>
+        <p:nvSpPr>
+          <p:cNvPr id="30" name="Oval 29">
+            <a:extLst>
+              <a:ext uri="{FF2B5EF4-FFF2-40B4-BE49-F238E27FC236}">
+                <a16:creationId xmlns:a16="http://schemas.microsoft.com/office/drawing/2014/main" id="{AAFFB6DF-3C66-4C7C-BF2F-F2B762A916AC}"/>
+              </a:ext>
+            </a:extLst>
+          </p:cNvPr>
+          <p:cNvSpPr/>
+          <p:nvPr/>
+        </p:nvSpPr>
+        <p:spPr>
+          <a:xfrm>
+            <a:off x="9158204" y="1978935"/>
+            <a:ext cx="311866" cy="285183"/>
+          </a:xfrm>
+          <a:prstGeom prst="ellipse">
+            <a:avLst/>
+          </a:prstGeom>
+          <a:solidFill>
+            <a:srgbClr val="92D050"/>
+          </a:solidFill>
+        </p:spPr>
+        <p:style>
+          <a:lnRef idx="2">
+            <a:schemeClr val="accent1">
+              <a:shade val="50000"/>
+            </a:schemeClr>
+          </a:lnRef>
+          <a:fillRef idx="1">
+            <a:schemeClr val="accent1"/>
+          </a:fillRef>
+          <a:effectRef idx="0">
+            <a:schemeClr val="accent1"/>
+          </a:effectRef>
+          <a:fontRef idx="minor">
+            <a:schemeClr val="lt1"/>
+          </a:fontRef>
+        </p:style>
+        <p:txBody>
+          <a:bodyPr rtlCol="0" anchor="ctr"/>
+          <a:lstStyle/>
+          <a:p>
+            <a:pPr algn="ctr"/>
+            <a:endParaRPr lang="en-US"/>
+          </a:p>
+        </p:txBody>
+      </p:sp>
+      <p:sp>
+        <p:nvSpPr>
+          <p:cNvPr id="31" name="Oval 30">
+            <a:extLst>
+              <a:ext uri="{FF2B5EF4-FFF2-40B4-BE49-F238E27FC236}">
+                <a16:creationId xmlns:a16="http://schemas.microsoft.com/office/drawing/2014/main" id="{CBC7CF70-D192-4BC4-AB6F-07FDE52FA121}"/>
+              </a:ext>
+            </a:extLst>
+          </p:cNvPr>
+          <p:cNvSpPr/>
+          <p:nvPr/>
+        </p:nvSpPr>
+        <p:spPr>
+          <a:xfrm>
+            <a:off x="6622930" y="3198821"/>
+            <a:ext cx="311866" cy="285183"/>
+          </a:xfrm>
+          <a:prstGeom prst="ellipse">
+            <a:avLst/>
+          </a:prstGeom>
+          <a:solidFill>
+            <a:srgbClr val="FF0000"/>
+          </a:solidFill>
+        </p:spPr>
+        <p:style>
+          <a:lnRef idx="2">
+            <a:schemeClr val="accent1">
+              <a:shade val="50000"/>
+            </a:schemeClr>
+          </a:lnRef>
+          <a:fillRef idx="1">
+            <a:schemeClr val="accent1"/>
+          </a:fillRef>
+          <a:effectRef idx="0">
+            <a:schemeClr val="accent1"/>
+          </a:effectRef>
+          <a:fontRef idx="minor">
+            <a:schemeClr val="lt1"/>
+          </a:fontRef>
+        </p:style>
+        <p:txBody>
+          <a:bodyPr rtlCol="0" anchor="ctr"/>
+          <a:lstStyle/>
+          <a:p>
+            <a:pPr algn="ctr"/>
+            <a:endParaRPr lang="en-US"/>
+          </a:p>
+        </p:txBody>
+      </p:sp>
+      <p:sp>
+        <p:nvSpPr>
+          <p:cNvPr id="18" name="Oval 17">
+            <a:extLst>
+              <a:ext uri="{FF2B5EF4-FFF2-40B4-BE49-F238E27FC236}">
+                <a16:creationId xmlns:a16="http://schemas.microsoft.com/office/drawing/2014/main" id="{D8511E94-D8AC-419D-83E9-67DE8EF79239}"/>
+              </a:ext>
+            </a:extLst>
+          </p:cNvPr>
+          <p:cNvSpPr/>
+          <p:nvPr/>
+        </p:nvSpPr>
+        <p:spPr>
+          <a:xfrm>
+            <a:off x="6622930" y="2700779"/>
+            <a:ext cx="311866" cy="285183"/>
+          </a:xfrm>
+          <a:prstGeom prst="ellipse">
+            <a:avLst/>
+          </a:prstGeom>
+          <a:solidFill>
+            <a:srgbClr val="FF0000"/>
+          </a:solidFill>
+        </p:spPr>
+        <p:style>
+          <a:lnRef idx="2">
+            <a:schemeClr val="accent1">
+              <a:shade val="50000"/>
+            </a:schemeClr>
+          </a:lnRef>
+          <a:fillRef idx="1">
+            <a:schemeClr val="accent1"/>
+          </a:fillRef>
+          <a:effectRef idx="0">
+            <a:schemeClr val="accent1"/>
+          </a:effectRef>
+          <a:fontRef idx="minor">
+            <a:schemeClr val="lt1"/>
+          </a:fontRef>
+        </p:style>
+        <p:txBody>
+          <a:bodyPr rtlCol="0" anchor="ctr"/>
+          <a:lstStyle/>
+          <a:p>
+            <a:pPr algn="ctr"/>
+            <a:endParaRPr lang="en-US"/>
+          </a:p>
+        </p:txBody>
+      </p:sp>
+    </p:spTree>
+    <p:extLst>
+      <p:ext uri="{BB962C8B-B14F-4D97-AF65-F5344CB8AC3E}">
+        <p14:creationId xmlns:p14="http://schemas.microsoft.com/office/powerpoint/2010/main" val="3279578945"/>
       </p:ext>
     </p:extLst>
   </p:cSld>

</xml_diff>